<commit_message>
Updated slidedeck and demo code for EmailService
</commit_message>
<xml_diff>
--- a/tdd/TDD.pptx
+++ b/tdd/TDD.pptx
@@ -3115,7 +3115,7 @@
     </p:spTree>
     <p:extLst>
       <p:ext uri="{BB962C8B-B14F-4D97-AF65-F5344CB8AC3E}">
-        <p14:creationId xmlns:p14="http://schemas.microsoft.com/office/powerpoint/2010/main" xmlns="" val="2280443481"/>
+        <p14:creationId xmlns="" xmlns:p14="http://schemas.microsoft.com/office/powerpoint/2010/main" val="2280443481"/>
       </p:ext>
     </p:extLst>
   </p:cSld>
@@ -3285,7 +3285,7 @@
     </p:spTree>
     <p:extLst>
       <p:ext uri="{BB962C8B-B14F-4D97-AF65-F5344CB8AC3E}">
-        <p14:creationId xmlns:p14="http://schemas.microsoft.com/office/powerpoint/2010/main" xmlns="" val="1996866432"/>
+        <p14:creationId xmlns="" xmlns:p14="http://schemas.microsoft.com/office/powerpoint/2010/main" val="1996866432"/>
       </p:ext>
     </p:extLst>
   </p:cSld>
@@ -4676,7 +4676,7 @@
     </p:spTree>
     <p:extLst>
       <p:ext uri="{BB962C8B-B14F-4D97-AF65-F5344CB8AC3E}">
-        <p14:creationId xmlns:p14="http://schemas.microsoft.com/office/powerpoint/2010/main" xmlns="" val="1631701370"/>
+        <p14:creationId xmlns="" xmlns:p14="http://schemas.microsoft.com/office/powerpoint/2010/main" val="1631701370"/>
       </p:ext>
     </p:extLst>
   </p:cSld>
@@ -4997,7 +4997,7 @@
     </p:spTree>
     <p:extLst>
       <p:ext uri="{BB962C8B-B14F-4D97-AF65-F5344CB8AC3E}">
-        <p14:creationId xmlns:p14="http://schemas.microsoft.com/office/powerpoint/2010/main" xmlns="" val="2627694574"/>
+        <p14:creationId xmlns="" xmlns:p14="http://schemas.microsoft.com/office/powerpoint/2010/main" val="2627694574"/>
       </p:ext>
     </p:extLst>
   </p:cSld>
@@ -5316,7 +5316,7 @@
     </p:spTree>
     <p:extLst>
       <p:ext uri="{BB962C8B-B14F-4D97-AF65-F5344CB8AC3E}">
-        <p14:creationId xmlns:p14="http://schemas.microsoft.com/office/powerpoint/2010/main" xmlns="" val="2472564093"/>
+        <p14:creationId xmlns="" xmlns:p14="http://schemas.microsoft.com/office/powerpoint/2010/main" val="2472564093"/>
       </p:ext>
     </p:extLst>
   </p:cSld>
@@ -5801,7 +5801,7 @@
     </p:spTree>
     <p:extLst>
       <p:ext uri="{BB962C8B-B14F-4D97-AF65-F5344CB8AC3E}">
-        <p14:creationId xmlns:p14="http://schemas.microsoft.com/office/powerpoint/2010/main" xmlns="" val="844442129"/>
+        <p14:creationId xmlns="" xmlns:p14="http://schemas.microsoft.com/office/powerpoint/2010/main" val="844442129"/>
       </p:ext>
     </p:extLst>
   </p:cSld>
@@ -6131,7 +6131,7 @@
     </p:spTree>
     <p:extLst>
       <p:ext uri="{BB962C8B-B14F-4D97-AF65-F5344CB8AC3E}">
-        <p14:creationId xmlns:p14="http://schemas.microsoft.com/office/powerpoint/2010/main" xmlns="" val="1607786633"/>
+        <p14:creationId xmlns="" xmlns:p14="http://schemas.microsoft.com/office/powerpoint/2010/main" val="1607786633"/>
       </p:ext>
     </p:extLst>
   </p:cSld>
@@ -6461,7 +6461,7 @@
     </p:spTree>
     <p:extLst>
       <p:ext uri="{BB962C8B-B14F-4D97-AF65-F5344CB8AC3E}">
-        <p14:creationId xmlns:p14="http://schemas.microsoft.com/office/powerpoint/2010/main" xmlns="" val="3400319444"/>
+        <p14:creationId xmlns="" xmlns:p14="http://schemas.microsoft.com/office/powerpoint/2010/main" val="3400319444"/>
       </p:ext>
     </p:extLst>
   </p:cSld>
@@ -8331,7 +8331,7 @@
     </p:spTree>
     <p:extLst>
       <p:ext uri="{BB962C8B-B14F-4D97-AF65-F5344CB8AC3E}">
-        <p14:creationId xmlns:p14="http://schemas.microsoft.com/office/powerpoint/2010/main" xmlns="" val="1273682958"/>
+        <p14:creationId xmlns="" xmlns:p14="http://schemas.microsoft.com/office/powerpoint/2010/main" val="1273682958"/>
       </p:ext>
     </p:extLst>
   </p:cSld>
@@ -8436,7 +8436,7 @@
     </p:spTree>
     <p:extLst>
       <p:ext uri="{BB962C8B-B14F-4D97-AF65-F5344CB8AC3E}">
-        <p14:creationId xmlns:p14="http://schemas.microsoft.com/office/powerpoint/2010/main" xmlns="" val="3654216826"/>
+        <p14:creationId xmlns="" xmlns:p14="http://schemas.microsoft.com/office/powerpoint/2010/main" val="3654216826"/>
       </p:ext>
     </p:extLst>
   </p:cSld>
@@ -8692,7 +8692,7 @@
     </p:spTree>
     <p:extLst>
       <p:ext uri="{BB962C8B-B14F-4D97-AF65-F5344CB8AC3E}">
-        <p14:creationId xmlns:p14="http://schemas.microsoft.com/office/powerpoint/2010/main" xmlns="" val="2837040887"/>
+        <p14:creationId xmlns="" xmlns:p14="http://schemas.microsoft.com/office/powerpoint/2010/main" val="2837040887"/>
       </p:ext>
     </p:extLst>
   </p:cSld>
@@ -8725,7 +8725,7 @@
     </p:spTree>
     <p:extLst>
       <p:ext uri="{BB962C8B-B14F-4D97-AF65-F5344CB8AC3E}">
-        <p14:creationId xmlns:p14="http://schemas.microsoft.com/office/powerpoint/2010/main" xmlns="" val="3283581558"/>
+        <p14:creationId xmlns="" xmlns:p14="http://schemas.microsoft.com/office/powerpoint/2010/main" val="3283581558"/>
       </p:ext>
     </p:extLst>
   </p:cSld>
@@ -9039,7 +9039,7 @@
     </p:spTree>
     <p:extLst>
       <p:ext uri="{BB962C8B-B14F-4D97-AF65-F5344CB8AC3E}">
-        <p14:creationId xmlns:p14="http://schemas.microsoft.com/office/powerpoint/2010/main" xmlns="" val="3151533342"/>
+        <p14:creationId xmlns="" xmlns:p14="http://schemas.microsoft.com/office/powerpoint/2010/main" val="3151533342"/>
       </p:ext>
     </p:extLst>
   </p:cSld>
@@ -9182,7 +9182,7 @@
     </p:spTree>
     <p:extLst>
       <p:ext uri="{BB962C8B-B14F-4D97-AF65-F5344CB8AC3E}">
-        <p14:creationId xmlns:p14="http://schemas.microsoft.com/office/powerpoint/2010/main" xmlns="" val="894352273"/>
+        <p14:creationId xmlns="" xmlns:p14="http://schemas.microsoft.com/office/powerpoint/2010/main" val="894352273"/>
       </p:ext>
     </p:extLst>
   </p:cSld>
@@ -9348,7 +9348,7 @@
     </p:spTree>
     <p:extLst>
       <p:ext uri="{BB962C8B-B14F-4D97-AF65-F5344CB8AC3E}">
-        <p14:creationId xmlns:p14="http://schemas.microsoft.com/office/powerpoint/2010/main" xmlns="" val="351067674"/>
+        <p14:creationId xmlns="" xmlns:p14="http://schemas.microsoft.com/office/powerpoint/2010/main" val="351067674"/>
       </p:ext>
     </p:extLst>
   </p:cSld>
@@ -9668,7 +9668,7 @@
     </p:spTree>
     <p:extLst>
       <p:ext uri="{BB962C8B-B14F-4D97-AF65-F5344CB8AC3E}">
-        <p14:creationId xmlns:p14="http://schemas.microsoft.com/office/powerpoint/2010/main" xmlns="" val="3938044995"/>
+        <p14:creationId xmlns="" xmlns:p14="http://schemas.microsoft.com/office/powerpoint/2010/main" val="3938044995"/>
       </p:ext>
     </p:extLst>
   </p:cSld>
@@ -10254,7 +10254,7 @@
     </p:spTree>
     <p:extLst>
       <p:ext uri="{BB962C8B-B14F-4D97-AF65-F5344CB8AC3E}">
-        <p14:creationId xmlns:p14="http://schemas.microsoft.com/office/powerpoint/2010/main" xmlns="" val="3192118728"/>
+        <p14:creationId xmlns="" xmlns:p14="http://schemas.microsoft.com/office/powerpoint/2010/main" val="3192118728"/>
       </p:ext>
     </p:extLst>
   </p:cSld>
@@ -10652,7 +10652,7 @@
     </p:spTree>
     <p:extLst>
       <p:ext uri="{BB962C8B-B14F-4D97-AF65-F5344CB8AC3E}">
-        <p14:creationId xmlns:p14="http://schemas.microsoft.com/office/powerpoint/2010/main" xmlns="" val="2190527855"/>
+        <p14:creationId xmlns="" xmlns:p14="http://schemas.microsoft.com/office/powerpoint/2010/main" val="2190527855"/>
       </p:ext>
     </p:extLst>
   </p:cSld>
@@ -11449,7 +11449,7 @@
     </p:spTree>
     <p:extLst>
       <p:ext uri="{BB962C8B-B14F-4D97-AF65-F5344CB8AC3E}">
-        <p14:creationId xmlns:p14="http://schemas.microsoft.com/office/powerpoint/2010/main" xmlns="" val="69886873"/>
+        <p14:creationId xmlns="" xmlns:p14="http://schemas.microsoft.com/office/powerpoint/2010/main" val="69886873"/>
       </p:ext>
     </p:extLst>
   </p:cSld>
@@ -12540,7 +12540,7 @@
     </p:spTree>
     <p:extLst>
       <p:ext uri="{BB962C8B-B14F-4D97-AF65-F5344CB8AC3E}">
-        <p14:creationId xmlns:p14="http://schemas.microsoft.com/office/powerpoint/2010/main" xmlns="" val="593901232"/>
+        <p14:creationId xmlns="" xmlns:p14="http://schemas.microsoft.com/office/powerpoint/2010/main" val="593901232"/>
       </p:ext>
     </p:extLst>
   </p:cSld>
@@ -12796,7 +12796,7 @@
     </p:spTree>
     <p:extLst>
       <p:ext uri="{BB962C8B-B14F-4D97-AF65-F5344CB8AC3E}">
-        <p14:creationId xmlns:p14="http://schemas.microsoft.com/office/powerpoint/2010/main" xmlns="" val="925662914"/>
+        <p14:creationId xmlns="" xmlns:p14="http://schemas.microsoft.com/office/powerpoint/2010/main" val="925662914"/>
       </p:ext>
     </p:extLst>
   </p:cSld>
@@ -13038,7 +13038,7 @@
     </p:spTree>
     <p:extLst>
       <p:ext uri="{BB962C8B-B14F-4D97-AF65-F5344CB8AC3E}">
-        <p14:creationId xmlns:p14="http://schemas.microsoft.com/office/powerpoint/2010/main" xmlns="" val="2463004899"/>
+        <p14:creationId xmlns="" xmlns:p14="http://schemas.microsoft.com/office/powerpoint/2010/main" val="2463004899"/>
       </p:ext>
     </p:extLst>
   </p:cSld>
@@ -13463,7 +13463,7 @@
     </p:spTree>
     <p:extLst>
       <p:ext uri="{BB962C8B-B14F-4D97-AF65-F5344CB8AC3E}">
-        <p14:creationId xmlns:p14="http://schemas.microsoft.com/office/powerpoint/2010/main" xmlns="" val="1193520387"/>
+        <p14:creationId xmlns="" xmlns:p14="http://schemas.microsoft.com/office/powerpoint/2010/main" val="1193520387"/>
       </p:ext>
     </p:extLst>
   </p:cSld>
@@ -13537,15 +13537,7 @@
                   <a:schemeClr val="bg1"/>
                 </a:solidFill>
               </a:rPr>
-              <a:t>Oppgave </a:t>
-            </a:r>
-            <a:r>
-              <a:rPr lang="nb-NO" dirty="0" smtClean="0">
-                <a:solidFill>
-                  <a:schemeClr val="bg1"/>
-                </a:solidFill>
-              </a:rPr>
-              <a:t>2</a:t>
+              <a:t>Oppgave 2</a:t>
             </a:r>
             <a:endParaRPr lang="en-US" dirty="0">
               <a:solidFill>
@@ -13659,6 +13651,8 @@
               </a:rPr>
               <a:t> </a:t>
             </a:r>
+          </a:p>
+          <a:p>
             <a:endParaRPr lang="nb-NO" sz="2000" dirty="0" smtClean="0">
               <a:solidFill>
                 <a:schemeClr val="bg1"/>
@@ -13666,28 +13660,13 @@
             </a:endParaRPr>
           </a:p>
           <a:p>
-            <a:endParaRPr lang="nb-NO" sz="2000" dirty="0" smtClean="0">
-              <a:solidFill>
-                <a:schemeClr val="bg1"/>
-              </a:solidFill>
-            </a:endParaRPr>
-          </a:p>
-          <a:p>
             <a:r>
               <a:rPr lang="nb-NO" sz="2000" dirty="0" smtClean="0">
                 <a:solidFill>
                   <a:schemeClr val="bg1"/>
                 </a:solidFill>
               </a:rPr>
-              <a:t>Kataen </a:t>
-            </a:r>
-            <a:r>
-              <a:rPr lang="nb-NO" sz="2000" dirty="0" smtClean="0">
-                <a:solidFill>
-                  <a:schemeClr val="bg1"/>
-                </a:solidFill>
-              </a:rPr>
-              <a:t>går på å implementere en String Calculator, løs èn og èn av oppgavene, prøv å ikke ”se fremover”.</a:t>
+              <a:t>Kataen går på å implementere en String Calculator, løs èn og èn av oppgavene, prøv å ikke ”se fremover”.</a:t>
             </a:r>
             <a:endParaRPr lang="en-US" sz="2000" dirty="0" smtClean="0">
               <a:solidFill>
@@ -14754,15 +14733,7 @@
                   <a:schemeClr val="bg1"/>
                 </a:solidFill>
               </a:rPr>
-              <a:t>Oppgave </a:t>
-            </a:r>
-            <a:r>
-              <a:rPr lang="nb-NO" dirty="0" smtClean="0">
-                <a:solidFill>
-                  <a:schemeClr val="bg1"/>
-                </a:solidFill>
-              </a:rPr>
-              <a:t>3</a:t>
+              <a:t>Oppgave 3</a:t>
             </a:r>
             <a:endParaRPr lang="en-US" dirty="0">
               <a:solidFill>
@@ -14891,11 +14862,6 @@
               </a:rPr>
               <a:t>). </a:t>
             </a:r>
-            <a:endParaRPr lang="nb-NO" sz="2000" dirty="0" smtClean="0">
-              <a:solidFill>
-                <a:schemeClr val="bg1"/>
-              </a:solidFill>
-            </a:endParaRPr>
           </a:p>
           <a:p>
             <a:pPr algn="just"/>
@@ -14913,23 +14879,7 @@
                   <a:schemeClr val="bg1"/>
                 </a:solidFill>
               </a:rPr>
-              <a:t>Loggeren </a:t>
-            </a:r>
-            <a:r>
-              <a:rPr lang="nb-NO" sz="2000" dirty="0" smtClean="0">
-                <a:solidFill>
-                  <a:schemeClr val="bg1"/>
-                </a:solidFill>
-              </a:rPr>
-              <a:t>bør konstruere et format på meldingen som skal skrives, dette formatet bør inneholde dato, klokkeslett, type melding og selvfølgelig meldingen selv. F.eks</a:t>
-            </a:r>
-            <a:r>
-              <a:rPr lang="nb-NO" sz="2000" dirty="0" smtClean="0">
-                <a:solidFill>
-                  <a:schemeClr val="bg1"/>
-                </a:solidFill>
-              </a:rPr>
-              <a:t>:</a:t>
+              <a:t>Loggeren bør konstruere et format på meldingen som skal skrives, dette formatet bør inneholde dato, klokkeslett, type melding og selvfølgelig meldingen selv. F.eks:</a:t>
             </a:r>
           </a:p>
           <a:p>
@@ -14989,15 +14939,7 @@
                   <a:schemeClr val="bg1"/>
                 </a:solidFill>
               </a:rPr>
-              <a:t>Denne </a:t>
-            </a:r>
-            <a:r>
-              <a:rPr lang="nb-NO" sz="2000" dirty="0" smtClean="0">
-                <a:solidFill>
-                  <a:schemeClr val="bg1"/>
-                </a:solidFill>
-              </a:rPr>
-              <a:t>informasjonen skal skrives til fil.</a:t>
+              <a:t>Denne informasjonen skal skrives til fil.</a:t>
             </a:r>
             <a:endParaRPr lang="en-US" sz="2000" dirty="0" smtClean="0">
               <a:solidFill>
@@ -15103,15 +15045,7 @@
                   <a:schemeClr val="bg1"/>
                 </a:solidFill>
               </a:rPr>
-              <a:t>Oppgave </a:t>
-            </a:r>
-            <a:r>
-              <a:rPr lang="nb-NO" dirty="0" smtClean="0">
-                <a:solidFill>
-                  <a:schemeClr val="bg1"/>
-                </a:solidFill>
-              </a:rPr>
-              <a:t>4</a:t>
+              <a:t>Oppgave 4</a:t>
             </a:r>
             <a:endParaRPr lang="en-US" dirty="0">
               <a:solidFill>
@@ -15225,6 +15159,8 @@
               </a:rPr>
               <a:t> </a:t>
             </a:r>
+          </a:p>
+          <a:p>
             <a:endParaRPr lang="nb-NO" sz="2000" dirty="0" smtClean="0">
               <a:solidFill>
                 <a:schemeClr val="bg1"/>
@@ -15232,44 +15168,13 @@
             </a:endParaRPr>
           </a:p>
           <a:p>
-            <a:endParaRPr lang="nb-NO" sz="2000" dirty="0" smtClean="0">
-              <a:solidFill>
-                <a:schemeClr val="bg1"/>
-              </a:solidFill>
-            </a:endParaRPr>
-          </a:p>
-          <a:p>
             <a:r>
               <a:rPr lang="nb-NO" sz="2000" dirty="0" smtClean="0">
                 <a:solidFill>
                   <a:schemeClr val="bg1"/>
                 </a:solidFill>
               </a:rPr>
-              <a:t>Kataen </a:t>
-            </a:r>
-            <a:r>
-              <a:rPr lang="nb-NO" sz="2000" dirty="0" smtClean="0">
-                <a:solidFill>
-                  <a:schemeClr val="bg1"/>
-                </a:solidFill>
-              </a:rPr>
-              <a:t>går på </a:t>
-            </a:r>
-            <a:r>
-              <a:rPr lang="nb-NO" sz="2000" dirty="0" smtClean="0">
-                <a:solidFill>
-                  <a:schemeClr val="bg1"/>
-                </a:solidFill>
-              </a:rPr>
-              <a:t>å utvide funksjonaliteten til StringCalculator som ble opprettet i oppgave 2, </a:t>
-            </a:r>
-            <a:r>
-              <a:rPr lang="nb-NO" sz="2000" dirty="0" smtClean="0">
-                <a:solidFill>
-                  <a:schemeClr val="bg1"/>
-                </a:solidFill>
-              </a:rPr>
-              <a:t>løs èn og èn av oppgavene, prøv å ikke ”se fremover”.</a:t>
+              <a:t>Kataen går på å utvide funksjonaliteten til StringCalculator som ble opprettet i oppgave 2, løs èn og èn av oppgavene, prøv å ikke ”se fremover”.</a:t>
             </a:r>
             <a:endParaRPr lang="en-US" sz="2000" dirty="0" smtClean="0">
               <a:solidFill>
@@ -21388,15 +21293,7 @@
                   <a:schemeClr val="bg1"/>
                 </a:solidFill>
               </a:rPr>
-              <a:t>Oppgave </a:t>
-            </a:r>
-            <a:r>
-              <a:rPr lang="nb-NO" dirty="0" smtClean="0">
-                <a:solidFill>
-                  <a:schemeClr val="bg1"/>
-                </a:solidFill>
-              </a:rPr>
-              <a:t>1</a:t>
+              <a:t>Oppgave 1</a:t>
             </a:r>
             <a:endParaRPr lang="en-US" dirty="0">
               <a:solidFill>
@@ -21475,7 +21372,15 @@
                   <a:schemeClr val="bg1"/>
                 </a:solidFill>
               </a:rPr>
-              <a:t>I denne oppgaven skal vi implementere en enkel Stack. </a:t>
+              <a:t>I denne oppgaven skal vi implementere en enkel Stack. Det skal være mulig å gjøre </a:t>
+            </a:r>
+            <a:r>
+              <a:rPr lang="nb-NO" sz="2000" i="1" dirty="0" smtClean="0">
+                <a:solidFill>
+                  <a:schemeClr val="bg1"/>
+                </a:solidFill>
+              </a:rPr>
+              <a:t>Push</a:t>
             </a:r>
             <a:r>
               <a:rPr lang="nb-NO" sz="2000" dirty="0" smtClean="0">
@@ -21483,7 +21388,15 @@
                   <a:schemeClr val="bg1"/>
                 </a:solidFill>
               </a:rPr>
-              <a:t>Det </a:t>
+              <a:t> for å få elementer på stacken og </a:t>
+            </a:r>
+            <a:r>
+              <a:rPr lang="nb-NO" sz="2000" i="1" dirty="0" smtClean="0">
+                <a:solidFill>
+                  <a:schemeClr val="bg1"/>
+                </a:solidFill>
+              </a:rPr>
+              <a:t>Pop</a:t>
             </a:r>
             <a:r>
               <a:rPr lang="nb-NO" sz="2000" dirty="0" smtClean="0">
@@ -21491,7 +21404,18 @@
                   <a:schemeClr val="bg1"/>
                 </a:solidFill>
               </a:rPr>
-              <a:t>skal være mulig å gjøre </a:t>
+              <a:t> for å få de av. </a:t>
+            </a:r>
+          </a:p>
+          <a:p>
+            <a:pPr algn="just"/>
+            <a:r>
+              <a:rPr lang="nb-NO" sz="2000" dirty="0" smtClean="0">
+                <a:solidFill>
+                  <a:schemeClr val="bg1"/>
+                </a:solidFill>
+              </a:rPr>
+              <a:t>I tillegg ønsker vi funksjonalitet for å se om stacken har noen elementer (f.eks </a:t>
             </a:r>
             <a:r>
               <a:rPr lang="nb-NO" sz="2000" i="1" dirty="0" smtClean="0">
@@ -21499,7 +21423,7 @@
                   <a:schemeClr val="bg1"/>
                 </a:solidFill>
               </a:rPr>
-              <a:t>Push</a:t>
+              <a:t>IsEmpty</a:t>
             </a:r>
             <a:r>
               <a:rPr lang="nb-NO" sz="2000" dirty="0" smtClean="0">
@@ -21507,79 +21431,7 @@
                   <a:schemeClr val="bg1"/>
                 </a:solidFill>
               </a:rPr>
-              <a:t> for å få elementer på stacken og </a:t>
-            </a:r>
-            <a:r>
-              <a:rPr lang="nb-NO" sz="2000" i="1" dirty="0" smtClean="0">
-                <a:solidFill>
-                  <a:schemeClr val="bg1"/>
-                </a:solidFill>
-              </a:rPr>
-              <a:t>Pop</a:t>
-            </a:r>
-            <a:r>
-              <a:rPr lang="nb-NO" sz="2000" dirty="0" smtClean="0">
-                <a:solidFill>
-                  <a:schemeClr val="bg1"/>
-                </a:solidFill>
-              </a:rPr>
-              <a:t> for å få de av. </a:t>
-            </a:r>
-            <a:endParaRPr lang="nb-NO" sz="2000" dirty="0" smtClean="0">
-              <a:solidFill>
-                <a:schemeClr val="bg1"/>
-              </a:solidFill>
-            </a:endParaRPr>
-          </a:p>
-          <a:p>
-            <a:pPr algn="just"/>
-            <a:r>
-              <a:rPr lang="nb-NO" sz="2000" dirty="0" smtClean="0">
-                <a:solidFill>
-                  <a:schemeClr val="bg1"/>
-                </a:solidFill>
-              </a:rPr>
-              <a:t>I </a:t>
-            </a:r>
-            <a:r>
-              <a:rPr lang="nb-NO" sz="2000" dirty="0" smtClean="0">
-                <a:solidFill>
-                  <a:schemeClr val="bg1"/>
-                </a:solidFill>
-              </a:rPr>
-              <a:t>tillegg ønsker vi funksjonalitet for å se om stacken har noen elementer (f.eks </a:t>
-            </a:r>
-            <a:r>
-              <a:rPr lang="nb-NO" sz="2000" i="1" dirty="0" smtClean="0">
-                <a:solidFill>
-                  <a:schemeClr val="bg1"/>
-                </a:solidFill>
-              </a:rPr>
-              <a:t>IsEmpty</a:t>
-            </a:r>
-            <a:r>
-              <a:rPr lang="nb-NO" sz="2000" dirty="0" smtClean="0">
-                <a:solidFill>
-                  <a:schemeClr val="bg1"/>
-                </a:solidFill>
-              </a:rPr>
-              <a:t>) </a:t>
-            </a:r>
-            <a:r>
-              <a:rPr lang="nb-NO" sz="2000" dirty="0" smtClean="0">
-                <a:solidFill>
-                  <a:schemeClr val="bg1"/>
-                </a:solidFill>
-              </a:rPr>
-              <a:t>og </a:t>
-            </a:r>
-            <a:r>
-              <a:rPr lang="nb-NO" sz="2000" dirty="0" smtClean="0">
-                <a:solidFill>
-                  <a:schemeClr val="bg1"/>
-                </a:solidFill>
-              </a:rPr>
-              <a:t>vi ønsker en funksjon som kan returnere det siste elementet som er lagt på stacken (f.eks </a:t>
+              <a:t>) og vi ønsker en funksjon som kan returnere det siste elementet som er lagt på stacken (f.eks </a:t>
             </a:r>
             <a:r>
               <a:rPr lang="nb-NO" sz="2000" i="1" dirty="0" smtClean="0">

</xml_diff>

<commit_message>
Small changes to slidedeck for tdd
</commit_message>
<xml_diff>
--- a/tdd/TDD.pptx
+++ b/tdd/TDD.pptx
@@ -13,23 +13,23 @@
   <p:sldIdLst>
     <p:sldId id="256" r:id="rId2"/>
     <p:sldId id="266" r:id="rId3"/>
-    <p:sldId id="272" r:id="rId4"/>
-    <p:sldId id="273" r:id="rId5"/>
-    <p:sldId id="270" r:id="rId6"/>
-    <p:sldId id="271" r:id="rId7"/>
+    <p:sldId id="273" r:id="rId4"/>
+    <p:sldId id="272" r:id="rId5"/>
+    <p:sldId id="271" r:id="rId6"/>
+    <p:sldId id="270" r:id="rId7"/>
     <p:sldId id="268" r:id="rId8"/>
     <p:sldId id="277" r:id="rId9"/>
     <p:sldId id="269" r:id="rId10"/>
     <p:sldId id="283" r:id="rId11"/>
     <p:sldId id="274" r:id="rId12"/>
     <p:sldId id="278" r:id="rId13"/>
-    <p:sldId id="276" r:id="rId14"/>
-    <p:sldId id="284" r:id="rId15"/>
-    <p:sldId id="267" r:id="rId16"/>
-    <p:sldId id="279" r:id="rId17"/>
-    <p:sldId id="280" r:id="rId18"/>
+    <p:sldId id="284" r:id="rId14"/>
+    <p:sldId id="276" r:id="rId15"/>
+    <p:sldId id="279" r:id="rId16"/>
+    <p:sldId id="280" r:id="rId17"/>
+    <p:sldId id="267" r:id="rId18"/>
     <p:sldId id="281" r:id="rId19"/>
-    <p:sldId id="282" r:id="rId20"/>
+    <p:sldId id="286" r:id="rId20"/>
   </p:sldIdLst>
   <p:sldSz cx="9144000" cy="6858000" type="screen4x3"/>
   <p:notesSz cx="6858000" cy="9144000"/>
@@ -3413,6 +3413,120 @@
             <p:ph type="sldImg"/>
           </p:nvPr>
         </p:nvSpPr>
+        <p:spPr>
+          <a:xfrm>
+            <a:off x="827088" y="592138"/>
+            <a:ext cx="5226050" cy="3919537"/>
+          </a:xfrm>
+        </p:spPr>
+      </p:sp>
+      <p:sp>
+        <p:nvSpPr>
+          <p:cNvPr id="3" name="Notes Placeholder 2"/>
+          <p:cNvSpPr>
+            <a:spLocks noGrp="1"/>
+          </p:cNvSpPr>
+          <p:nvPr>
+            <p:ph type="body" idx="1"/>
+          </p:nvPr>
+        </p:nvSpPr>
+        <p:spPr/>
+        <p:txBody>
+          <a:bodyPr>
+            <a:normAutofit/>
+          </a:bodyPr>
+          <a:lstStyle/>
+          <a:p>
+            <a:pPr marL="0" marR="0" indent="0" algn="l" defTabSz="457200" rtl="0" eaLnBrk="1" fontAlgn="auto" latinLnBrk="0" hangingPunct="1">
+              <a:lnSpc>
+                <a:spcPct val="100000"/>
+              </a:lnSpc>
+              <a:spcBef>
+                <a:spcPts val="0"/>
+              </a:spcBef>
+              <a:spcAft>
+                <a:spcPts val="0"/>
+              </a:spcAft>
+              <a:buClrTx/>
+              <a:buSzTx/>
+              <a:buFontTx/>
+              <a:buNone/>
+              <a:tabLst/>
+              <a:defRPr/>
+            </a:pPr>
+            <a:r>
+              <a:rPr lang="nb-NO" sz="1600" dirty="0" smtClean="0"/>
+              <a:t>Det</a:t>
+            </a:r>
+            <a:r>
+              <a:rPr lang="nb-NO" sz="1600" baseline="0" dirty="0" smtClean="0"/>
+              <a:t> kommer an på hvem man spør – personlig ser jeg på det som Test-drevet utvikling og design – skriv tester først og designet vil forme seg etterhvert. Man har også et utgangspunkt for et design når man starter.</a:t>
+            </a:r>
+            <a:endParaRPr lang="nb-NO" sz="1600" dirty="0" smtClean="0"/>
+          </a:p>
+          <a:p>
+            <a:pPr marL="0" marR="0" indent="0" algn="l" defTabSz="457200" rtl="0" eaLnBrk="1" fontAlgn="auto" latinLnBrk="0" hangingPunct="1">
+              <a:lnSpc>
+                <a:spcPct val="100000"/>
+              </a:lnSpc>
+              <a:spcBef>
+                <a:spcPts val="0"/>
+              </a:spcBef>
+              <a:spcAft>
+                <a:spcPts val="0"/>
+              </a:spcAft>
+              <a:buClrTx/>
+              <a:buSzTx/>
+              <a:buFontTx/>
+              <a:buNone/>
+              <a:tabLst/>
+              <a:defRPr/>
+            </a:pPr>
+            <a:r>
+              <a:rPr lang="nb-NO" sz="1600" dirty="0" smtClean="0"/>
+              <a:t>TDD er noe du velger selv – vil du skrive testen først? Gjør det!</a:t>
+            </a:r>
+          </a:p>
+          <a:p>
+            <a:endParaRPr lang="en-US" dirty="0"/>
+          </a:p>
+        </p:txBody>
+      </p:sp>
+    </p:spTree>
+  </p:cSld>
+  <p:clrMapOvr>
+    <a:masterClrMapping/>
+  </p:clrMapOvr>
+</p:notes>
+</file>
+
+<file path=ppt/notesSlides/notesSlide10.xml><?xml version="1.0" encoding="utf-8"?>
+<p:notes xmlns:a="http://schemas.openxmlformats.org/drawingml/2006/main" xmlns:r="http://schemas.openxmlformats.org/officeDocument/2006/relationships" xmlns:p="http://schemas.openxmlformats.org/presentationml/2006/main">
+  <p:cSld>
+    <p:spTree>
+      <p:nvGrpSpPr>
+        <p:cNvPr id="1" name=""/>
+        <p:cNvGrpSpPr/>
+        <p:nvPr/>
+      </p:nvGrpSpPr>
+      <p:grpSpPr>
+        <a:xfrm>
+          <a:off x="0" y="0"/>
+          <a:ext cx="0" cy="0"/>
+          <a:chOff x="0" y="0"/>
+          <a:chExt cx="0" cy="0"/>
+        </a:xfrm>
+      </p:grpSpPr>
+      <p:sp>
+        <p:nvSpPr>
+          <p:cNvPr id="2" name="Slide Image Placeholder 1"/>
+          <p:cNvSpPr>
+            <a:spLocks noGrp="1" noRot="1" noChangeAspect="1"/>
+          </p:cNvSpPr>
+          <p:nvPr>
+            <p:ph type="sldImg"/>
+          </p:nvPr>
+        </p:nvSpPr>
         <p:spPr/>
       </p:sp>
       <p:sp>
@@ -3432,57 +3546,14 @@
           </a:bodyPr>
           <a:lstStyle/>
           <a:p>
-            <a:pPr marL="0" marR="0" indent="0" algn="l" defTabSz="457200" rtl="0" eaLnBrk="1" fontAlgn="auto" latinLnBrk="0" hangingPunct="1">
-              <a:lnSpc>
-                <a:spcPct val="100000"/>
-              </a:lnSpc>
-              <a:spcBef>
-                <a:spcPts val="0"/>
-              </a:spcBef>
-              <a:spcAft>
-                <a:spcPts val="0"/>
-              </a:spcAft>
-              <a:buClrTx/>
-              <a:buSzTx/>
-              <a:buFontTx/>
-              <a:buNone/>
-              <a:tabLst/>
-              <a:defRPr/>
-            </a:pPr>
-            <a:r>
-              <a:rPr lang="nb-NO" sz="1600" dirty="0" smtClean="0"/>
-              <a:t>Det</a:t>
-            </a:r>
-            <a:r>
-              <a:rPr lang="nb-NO" sz="1600" baseline="0" dirty="0" smtClean="0"/>
-              <a:t> kommer an på hvem man spør – personlig ser jeg på det som Test-drevet utvikling og design – skriv tester først og designet vil forme seg etterhvert. Man har også et utgangspunkt for et design når man starter.</a:t>
-            </a:r>
-            <a:endParaRPr lang="nb-NO" sz="1600" dirty="0" smtClean="0"/>
-          </a:p>
-          <a:p>
-            <a:pPr marL="0" marR="0" indent="0" algn="l" defTabSz="457200" rtl="0" eaLnBrk="1" fontAlgn="auto" latinLnBrk="0" hangingPunct="1">
-              <a:lnSpc>
-                <a:spcPct val="100000"/>
-              </a:lnSpc>
-              <a:spcBef>
-                <a:spcPts val="0"/>
-              </a:spcBef>
-              <a:spcAft>
-                <a:spcPts val="0"/>
-              </a:spcAft>
-              <a:buClrTx/>
-              <a:buSzTx/>
-              <a:buFontTx/>
-              <a:buNone/>
-              <a:tabLst/>
-              <a:defRPr/>
-            </a:pPr>
-            <a:r>
-              <a:rPr lang="nb-NO" sz="1600" dirty="0" smtClean="0"/>
-              <a:t>TDD er noe du velger selv – vil du skrive testen først? Gjør det!</a:t>
-            </a:r>
-          </a:p>
-          <a:p>
+            <a:r>
+              <a:rPr lang="nb-NO" smtClean="0"/>
+              <a:t>Demo av MVC3</a:t>
+            </a:r>
+            <a:r>
+              <a:rPr lang="nb-NO" baseline="0" smtClean="0"/>
+              <a:t>//TDD/Ninject</a:t>
+            </a:r>
             <a:endParaRPr lang="en-US" dirty="0"/>
           </a:p>
         </p:txBody>
@@ -3548,23 +3619,29 @@
           <a:p>
             <a:r>
               <a:rPr lang="nb-NO" dirty="0" smtClean="0"/>
-              <a:t>Red/Green/Refactor</a:t>
-            </a:r>
-          </a:p>
-          <a:p>
-            <a:r>
-              <a:rPr lang="nb-NO" dirty="0" smtClean="0"/>
-              <a:t>Do</a:t>
+              <a:t>Ikke nødvendigvis lettere å vedlikeholde</a:t>
             </a:r>
             <a:r>
               <a:rPr lang="nb-NO" baseline="0" dirty="0" smtClean="0"/>
-              <a:t> the simplest thing that could possibly work – ikke implementere noe som ikke er spesifisert</a:t>
+              <a:t> – stiller store krav til utformingen av testene</a:t>
             </a:r>
           </a:p>
           <a:p>
             <a:r>
               <a:rPr lang="nb-NO" baseline="0" dirty="0" smtClean="0"/>
-              <a:t>DEMO: lag subtract i Calculator</a:t>
+              <a:t>Lettere å forstå – testene fungerer som dokumentasjon og beskrivelse av brukerhistoriene</a:t>
+            </a:r>
+          </a:p>
+          <a:p>
+            <a:r>
+              <a:rPr lang="nb-NO" baseline="0" dirty="0" smtClean="0"/>
+              <a:t>Lettere å gjøre endringer når du kan stole på en test-suite. Hørt på prosjekt: ”Jeg får ikke denne testen til å bli grønn” – ”ikke tenk på det, den skal være sånn” &lt;- ikke lov! Fiks røde tester slik at man faktisk kan stole på de.</a:t>
+            </a:r>
+          </a:p>
+          <a:p>
+            <a:r>
+              <a:rPr lang="nb-NO" baseline="0" dirty="0" smtClean="0"/>
+              <a:t>Inkrementell utvikling gjør at man til enhver tid har fungerende system i stedet for Big Bang.</a:t>
             </a:r>
             <a:endParaRPr lang="en-US" dirty="0"/>
           </a:p>
@@ -3631,29 +3708,23 @@
           <a:p>
             <a:r>
               <a:rPr lang="nb-NO" dirty="0" smtClean="0"/>
-              <a:t>Ikke nødvendigvis lettere å vedlikeholde</a:t>
+              <a:t>Red/Green/Refactor</a:t>
+            </a:r>
+          </a:p>
+          <a:p>
+            <a:r>
+              <a:rPr lang="nb-NO" dirty="0" smtClean="0"/>
+              <a:t>Do</a:t>
             </a:r>
             <a:r>
               <a:rPr lang="nb-NO" baseline="0" dirty="0" smtClean="0"/>
-              <a:t> – stiller store krav til utformingen av testene</a:t>
+              <a:t> the simplest thing that could possibly work – ikke implementere noe som ikke er spesifisert</a:t>
             </a:r>
           </a:p>
           <a:p>
             <a:r>
               <a:rPr lang="nb-NO" baseline="0" dirty="0" smtClean="0"/>
-              <a:t>Lettere å forstå – testene fungerer som dokumentasjon og beskrivelse av brukerhistoriene</a:t>
-            </a:r>
-          </a:p>
-          <a:p>
-            <a:r>
-              <a:rPr lang="nb-NO" baseline="0" dirty="0" smtClean="0"/>
-              <a:t>Lettere å gjøre endringer når du kan stole på en test-suite. Hørt på prosjekt: ”Jeg får ikke denne testen til å bli grønn” – ”ikke tenk på det, den skal være sånn” &lt;- ikke lov! Fiks røde tester slik at man faktisk kan stole på de.</a:t>
-            </a:r>
-          </a:p>
-          <a:p>
-            <a:r>
-              <a:rPr lang="nb-NO" baseline="0" dirty="0" smtClean="0"/>
-              <a:t>Inkrementell utvikling gjør at man til enhver tid har fungerende system i stedet for Big Bang.</a:t>
+              <a:t>DEMO: lag subtract i Calculator</a:t>
             </a:r>
             <a:endParaRPr lang="en-US" dirty="0"/>
           </a:p>
@@ -13375,8 +13446,8 @@
         </p:nvSpPr>
         <p:spPr>
           <a:xfrm>
-            <a:off x="1424940" y="3309695"/>
-            <a:ext cx="6393180" cy="307777"/>
+            <a:off x="1424940" y="3001919"/>
+            <a:ext cx="6393180" cy="615553"/>
           </a:xfrm>
         </p:spPr>
         <p:txBody>
@@ -13385,7 +13456,18 @@
           <a:p>
             <a:r>
               <a:rPr lang="nb-NO" dirty="0" smtClean="0"/>
-              <a:t>Testdrevet utvikling (TDD) i .net</a:t>
+              <a:t>Enhetstesting og</a:t>
+            </a:r>
+            <a:br>
+              <a:rPr lang="nb-NO" dirty="0" smtClean="0"/>
+            </a:br>
+            <a:r>
+              <a:rPr lang="nb-NO" dirty="0" smtClean="0"/>
+              <a:t>Testdrevet </a:t>
+            </a:r>
+            <a:r>
+              <a:rPr lang="nb-NO" dirty="0" smtClean="0"/>
+              <a:t>utvikling (TDD) i .net</a:t>
             </a:r>
             <a:endParaRPr lang="en-US" dirty="0"/>
           </a:p>
@@ -14733,7 +14815,15 @@
                   <a:schemeClr val="bg1"/>
                 </a:solidFill>
               </a:rPr>
-              <a:t>Oppgave 3</a:t>
+              <a:t>Oppgave </a:t>
+            </a:r>
+            <a:r>
+              <a:rPr lang="nb-NO" dirty="0" smtClean="0">
+                <a:solidFill>
+                  <a:schemeClr val="bg1"/>
+                </a:solidFill>
+              </a:rPr>
+              <a:t>3</a:t>
             </a:r>
             <a:endParaRPr lang="en-US" dirty="0">
               <a:solidFill>
@@ -14781,7 +14871,7 @@
       </p:sp>
       <p:sp>
         <p:nvSpPr>
-          <p:cNvPr id="7" name="Title 1"/>
+          <p:cNvPr id="5" name="Title 1"/>
           <p:cNvSpPr txBox="1">
             <a:spLocks/>
           </p:cNvSpPr>
@@ -14790,7 +14880,7 @@
         <p:spPr>
           <a:xfrm>
             <a:off x="773723" y="1341070"/>
-            <a:ext cx="7957584" cy="3693319"/>
+            <a:ext cx="7957584" cy="2154436"/>
           </a:xfrm>
           <a:prstGeom prst="rect">
             <a:avLst/>
@@ -14805,22 +14895,22 @@
           </a:bodyPr>
           <a:lstStyle/>
           <a:p>
-            <a:pPr algn="just"/>
             <a:r>
               <a:rPr lang="nb-NO" sz="2000" dirty="0" smtClean="0">
                 <a:solidFill>
                   <a:schemeClr val="bg1"/>
                 </a:solidFill>
               </a:rPr>
-              <a:t>I denne oppgaven skal vi implementere en Logger. Det skal være mulig å logge informasjon(</a:t>
-            </a:r>
-            <a:r>
-              <a:rPr lang="nb-NO" sz="2000" i="1" dirty="0" smtClean="0">
+              <a:t>Gjennomfør TDD Kataen som er laget av Roy Osherove (</a:t>
+            </a:r>
+            <a:r>
+              <a:rPr lang="nb-NO" sz="2000" u="sng" dirty="0" smtClean="0">
                 <a:solidFill>
                   <a:schemeClr val="bg1"/>
                 </a:solidFill>
-              </a:rPr>
-              <a:t>Info</a:t>
+                <a:hlinkClick r:id="rId2"/>
+              </a:rPr>
+              <a:t>http://osherove.com/</a:t>
             </a:r>
             <a:r>
               <a:rPr lang="nb-NO" sz="2000" dirty="0" smtClean="0">
@@ -14828,15 +14918,16 @@
                   <a:schemeClr val="bg1"/>
                 </a:solidFill>
               </a:rPr>
-              <a:t>), advarseler (</a:t>
-            </a:r>
-            <a:r>
-              <a:rPr lang="nb-NO" sz="2000" i="1" dirty="0" smtClean="0">
+              <a:t>) som finnes </a:t>
+            </a:r>
+            <a:r>
+              <a:rPr lang="nb-NO" sz="2000" u="sng" dirty="0" smtClean="0">
                 <a:solidFill>
                   <a:schemeClr val="bg1"/>
                 </a:solidFill>
-              </a:rPr>
-              <a:t>Warning</a:t>
+                <a:hlinkClick r:id="rId3"/>
+              </a:rPr>
+              <a:t>her.</a:t>
             </a:r>
             <a:r>
               <a:rPr lang="nb-NO" sz="2000" dirty="0" smtClean="0">
@@ -14844,27 +14935,10 @@
                   <a:schemeClr val="bg1"/>
                 </a:solidFill>
               </a:rPr>
-              <a:t>) og unntak (</a:t>
-            </a:r>
-            <a:r>
-              <a:rPr lang="nb-NO" sz="2000" i="1" dirty="0" smtClean="0">
-                <a:solidFill>
-                  <a:schemeClr val="bg1"/>
-                </a:solidFill>
-              </a:rPr>
-              <a:t>Exception</a:t>
-            </a:r>
-            <a:r>
-              <a:rPr lang="nb-NO" sz="2000" dirty="0" smtClean="0">
-                <a:solidFill>
-                  <a:schemeClr val="bg1"/>
-                </a:solidFill>
-              </a:rPr>
-              <a:t>). </a:t>
-            </a:r>
-          </a:p>
-          <a:p>
-            <a:pPr algn="just"/>
+              <a:t> </a:t>
+            </a:r>
+          </a:p>
+          <a:p>
             <a:endParaRPr lang="nb-NO" sz="2000" dirty="0" smtClean="0">
               <a:solidFill>
                 <a:schemeClr val="bg1"/>
@@ -14872,74 +14946,13 @@
             </a:endParaRPr>
           </a:p>
           <a:p>
-            <a:pPr algn="just"/>
             <a:r>
               <a:rPr lang="nb-NO" sz="2000" dirty="0" smtClean="0">
                 <a:solidFill>
                   <a:schemeClr val="bg1"/>
                 </a:solidFill>
               </a:rPr>
-              <a:t>Loggeren bør konstruere et format på meldingen som skal skrives, dette formatet bør inneholde dato, klokkeslett, type melding og selvfølgelig meldingen selv. F.eks:</a:t>
-            </a:r>
-          </a:p>
-          <a:p>
-            <a:pPr algn="just"/>
-            <a:endParaRPr lang="en-US" sz="2000" dirty="0" smtClean="0">
-              <a:solidFill>
-                <a:schemeClr val="bg1"/>
-              </a:solidFill>
-            </a:endParaRPr>
-          </a:p>
-          <a:p>
-            <a:pPr algn="just"/>
-            <a:r>
-              <a:rPr lang="nb-NO" sz="2000" i="1" dirty="0" smtClean="0">
-                <a:solidFill>
-                  <a:schemeClr val="bg1"/>
-                </a:solidFill>
-              </a:rPr>
-              <a:t>[08.08.2012 15:00][Info] Epost sendt til bruker </a:t>
-            </a:r>
-            <a:r>
-              <a:rPr lang="nb-NO" sz="2000" i="1" u="sng" dirty="0" smtClean="0">
-                <a:solidFill>
-                  <a:schemeClr val="bg1"/>
-                </a:solidFill>
-                <a:hlinkClick r:id="rId2"/>
-              </a:rPr>
-              <a:t>arthur@dent.com</a:t>
-            </a:r>
-            <a:r>
-              <a:rPr lang="nb-NO" sz="2000" i="1" dirty="0" smtClean="0">
-                <a:solidFill>
-                  <a:schemeClr val="bg1"/>
-                </a:solidFill>
-              </a:rPr>
-              <a:t>.</a:t>
-            </a:r>
-            <a:endParaRPr lang="en-US" sz="2000" i="1" dirty="0" smtClean="0">
-              <a:solidFill>
-                <a:schemeClr val="bg1"/>
-              </a:solidFill>
-            </a:endParaRPr>
-          </a:p>
-          <a:p>
-            <a:pPr algn="just"/>
-            <a:endParaRPr lang="nb-NO" sz="2000" dirty="0" smtClean="0">
-              <a:solidFill>
-                <a:schemeClr val="bg1"/>
-              </a:solidFill>
-            </a:endParaRPr>
-          </a:p>
-          <a:p>
-            <a:pPr algn="just"/>
-            <a:r>
-              <a:rPr lang="nb-NO" sz="2000" dirty="0" smtClean="0">
-                <a:solidFill>
-                  <a:schemeClr val="bg1"/>
-                </a:solidFill>
-              </a:rPr>
-              <a:t>Denne informasjonen skal skrives til fil.</a:t>
+              <a:t>Kataen går på å utvide funksjonaliteten til StringCalculator som ble opprettet i oppgave 2, løs èn og èn av oppgavene, prøv å ikke ”se fremover”.</a:t>
             </a:r>
             <a:endParaRPr lang="en-US" sz="2000" dirty="0" smtClean="0">
               <a:solidFill>
@@ -15045,7 +15058,15 @@
                   <a:schemeClr val="bg1"/>
                 </a:solidFill>
               </a:rPr>
-              <a:t>Oppgave 4</a:t>
+              <a:t>Oppgave </a:t>
+            </a:r>
+            <a:r>
+              <a:rPr lang="nb-NO" dirty="0" smtClean="0">
+                <a:solidFill>
+                  <a:schemeClr val="bg1"/>
+                </a:solidFill>
+              </a:rPr>
+              <a:t>4</a:t>
             </a:r>
             <a:endParaRPr lang="en-US" dirty="0">
               <a:solidFill>
@@ -15093,7 +15114,7 @@
       </p:sp>
       <p:sp>
         <p:nvSpPr>
-          <p:cNvPr id="5" name="Title 1"/>
+          <p:cNvPr id="7" name="Title 1"/>
           <p:cNvSpPr txBox="1">
             <a:spLocks/>
           </p:cNvSpPr>
@@ -15102,7 +15123,7 @@
         <p:spPr>
           <a:xfrm>
             <a:off x="773723" y="1341070"/>
-            <a:ext cx="7957584" cy="2154436"/>
+            <a:ext cx="7957584" cy="3693319"/>
           </a:xfrm>
           <a:prstGeom prst="rect">
             <a:avLst/>
@@ -15117,22 +15138,22 @@
           </a:bodyPr>
           <a:lstStyle/>
           <a:p>
+            <a:pPr algn="just"/>
             <a:r>
               <a:rPr lang="nb-NO" sz="2000" dirty="0" smtClean="0">
                 <a:solidFill>
                   <a:schemeClr val="bg1"/>
                 </a:solidFill>
               </a:rPr>
-              <a:t>Gjennomfør TDD Kataen som er laget av Roy Osherove (</a:t>
-            </a:r>
-            <a:r>
-              <a:rPr lang="nb-NO" sz="2000" u="sng" dirty="0" smtClean="0">
+              <a:t>I denne oppgaven skal vi implementere en Logger. Det skal være mulig å logge informasjon(</a:t>
+            </a:r>
+            <a:r>
+              <a:rPr lang="nb-NO" sz="2000" i="1" dirty="0" smtClean="0">
                 <a:solidFill>
                   <a:schemeClr val="bg1"/>
                 </a:solidFill>
-                <a:hlinkClick r:id="rId2"/>
-              </a:rPr>
-              <a:t>http://osherove.com/</a:t>
+              </a:rPr>
+              <a:t>Info</a:t>
             </a:r>
             <a:r>
               <a:rPr lang="nb-NO" sz="2000" dirty="0" smtClean="0">
@@ -15140,16 +15161,15 @@
                   <a:schemeClr val="bg1"/>
                 </a:solidFill>
               </a:rPr>
-              <a:t>) som finnes </a:t>
-            </a:r>
-            <a:r>
-              <a:rPr lang="nb-NO" sz="2000" u="sng" dirty="0" smtClean="0">
+              <a:t>), advarseler (</a:t>
+            </a:r>
+            <a:r>
+              <a:rPr lang="nb-NO" sz="2000" i="1" dirty="0" smtClean="0">
                 <a:solidFill>
                   <a:schemeClr val="bg1"/>
                 </a:solidFill>
-                <a:hlinkClick r:id="rId3"/>
-              </a:rPr>
-              <a:t>her.</a:t>
+              </a:rPr>
+              <a:t>Warning</a:t>
             </a:r>
             <a:r>
               <a:rPr lang="nb-NO" sz="2000" dirty="0" smtClean="0">
@@ -15157,10 +15177,27 @@
                   <a:schemeClr val="bg1"/>
                 </a:solidFill>
               </a:rPr>
-              <a:t> </a:t>
-            </a:r>
-          </a:p>
-          <a:p>
+              <a:t>) og unntak (</a:t>
+            </a:r>
+            <a:r>
+              <a:rPr lang="nb-NO" sz="2000" i="1" dirty="0" smtClean="0">
+                <a:solidFill>
+                  <a:schemeClr val="bg1"/>
+                </a:solidFill>
+              </a:rPr>
+              <a:t>Exception</a:t>
+            </a:r>
+            <a:r>
+              <a:rPr lang="nb-NO" sz="2000" dirty="0" smtClean="0">
+                <a:solidFill>
+                  <a:schemeClr val="bg1"/>
+                </a:solidFill>
+              </a:rPr>
+              <a:t>). </a:t>
+            </a:r>
+          </a:p>
+          <a:p>
+            <a:pPr algn="just"/>
             <a:endParaRPr lang="nb-NO" sz="2000" dirty="0" smtClean="0">
               <a:solidFill>
                 <a:schemeClr val="bg1"/>
@@ -15168,13 +15205,74 @@
             </a:endParaRPr>
           </a:p>
           <a:p>
+            <a:pPr algn="just"/>
             <a:r>
               <a:rPr lang="nb-NO" sz="2000" dirty="0" smtClean="0">
                 <a:solidFill>
                   <a:schemeClr val="bg1"/>
                 </a:solidFill>
               </a:rPr>
-              <a:t>Kataen går på å utvide funksjonaliteten til StringCalculator som ble opprettet i oppgave 2, løs èn og èn av oppgavene, prøv å ikke ”se fremover”.</a:t>
+              <a:t>Loggeren bør konstruere et format på meldingen som skal skrives, dette formatet bør inneholde dato, klokkeslett, type melding og selvfølgelig meldingen selv. F.eks:</a:t>
+            </a:r>
+          </a:p>
+          <a:p>
+            <a:pPr algn="just"/>
+            <a:endParaRPr lang="en-US" sz="2000" dirty="0" smtClean="0">
+              <a:solidFill>
+                <a:schemeClr val="bg1"/>
+              </a:solidFill>
+            </a:endParaRPr>
+          </a:p>
+          <a:p>
+            <a:pPr algn="just"/>
+            <a:r>
+              <a:rPr lang="nb-NO" sz="2000" i="1" dirty="0" smtClean="0">
+                <a:solidFill>
+                  <a:schemeClr val="bg1"/>
+                </a:solidFill>
+              </a:rPr>
+              <a:t>[08.08.2012 15:00][Info] Epost sendt til bruker </a:t>
+            </a:r>
+            <a:r>
+              <a:rPr lang="nb-NO" sz="2000" i="1" u="sng" dirty="0" smtClean="0">
+                <a:solidFill>
+                  <a:schemeClr val="bg1"/>
+                </a:solidFill>
+                <a:hlinkClick r:id="rId2"/>
+              </a:rPr>
+              <a:t>arthur@dent.com</a:t>
+            </a:r>
+            <a:r>
+              <a:rPr lang="nb-NO" sz="2000" i="1" dirty="0" smtClean="0">
+                <a:solidFill>
+                  <a:schemeClr val="bg1"/>
+                </a:solidFill>
+              </a:rPr>
+              <a:t>.</a:t>
+            </a:r>
+            <a:endParaRPr lang="en-US" sz="2000" i="1" dirty="0" smtClean="0">
+              <a:solidFill>
+                <a:schemeClr val="bg1"/>
+              </a:solidFill>
+            </a:endParaRPr>
+          </a:p>
+          <a:p>
+            <a:pPr algn="just"/>
+            <a:endParaRPr lang="nb-NO" sz="2000" dirty="0" smtClean="0">
+              <a:solidFill>
+                <a:schemeClr val="bg1"/>
+              </a:solidFill>
+            </a:endParaRPr>
+          </a:p>
+          <a:p>
+            <a:pPr algn="just"/>
+            <a:r>
+              <a:rPr lang="nb-NO" sz="2000" dirty="0" smtClean="0">
+                <a:solidFill>
+                  <a:schemeClr val="bg1"/>
+                </a:solidFill>
+              </a:rPr>
+              <a:t>Denne informasjonen skal skrives til fil.</a:t>
             </a:r>
             <a:endParaRPr lang="en-US" sz="2000" dirty="0" smtClean="0">
               <a:solidFill>
@@ -15256,7 +15354,7 @@
         <p:spPr>
           <a:xfrm>
             <a:off x="321623" y="418905"/>
-            <a:ext cx="1819088" cy="307777"/>
+            <a:ext cx="3467616" cy="307777"/>
           </a:xfrm>
         </p:spPr>
         <p:txBody>
@@ -15265,7 +15363,7 @@
           <a:p>
             <a:r>
               <a:rPr lang="nb-NO" dirty="0" smtClean="0"/>
-              <a:t>TDD i MVC3?</a:t>
+              <a:t>Dependency injection</a:t>
             </a:r>
             <a:endParaRPr lang="en-US" dirty="0"/>
           </a:p>
@@ -15290,134 +15388,6 @@
               <a:rPr lang="en-US" smtClean="0"/>
               <a:pPr/>
               <a:t>15</a:t>
-            </a:fld>
-            <a:endParaRPr lang="en-US" dirty="0"/>
-          </a:p>
-        </p:txBody>
-      </p:sp>
-      <p:sp>
-        <p:nvSpPr>
-          <p:cNvPr id="7" name="TextBox 6"/>
-          <p:cNvSpPr txBox="1"/>
-          <p:nvPr/>
-        </p:nvSpPr>
-        <p:spPr>
-          <a:xfrm>
-            <a:off x="3288324" y="2966561"/>
-            <a:ext cx="2547492" cy="743793"/>
-          </a:xfrm>
-          <a:prstGeom prst="rect">
-            <a:avLst/>
-          </a:prstGeom>
-          <a:noFill/>
-        </p:spPr>
-        <p:txBody>
-          <a:bodyPr wrap="none" rtlCol="0">
-            <a:spAutoFit/>
-          </a:bodyPr>
-          <a:lstStyle/>
-          <a:p>
-            <a:pPr>
-              <a:spcBef>
-                <a:spcPts val="600"/>
-              </a:spcBef>
-              <a:spcAft>
-                <a:spcPts val="400"/>
-              </a:spcAft>
-            </a:pPr>
-            <a:r>
-              <a:rPr lang="nb-NO" sz="1700" b="1" dirty="0" smtClean="0"/>
-              <a:t>TDD + MVC3 = SANT</a:t>
-            </a:r>
-          </a:p>
-          <a:p>
-            <a:pPr>
-              <a:spcBef>
-                <a:spcPts val="600"/>
-              </a:spcBef>
-              <a:spcAft>
-                <a:spcPts val="400"/>
-              </a:spcAft>
-            </a:pPr>
-            <a:endParaRPr lang="nb-NO" sz="1700" b="1" dirty="0" smtClean="0"/>
-          </a:p>
-        </p:txBody>
-      </p:sp>
-    </p:spTree>
-  </p:cSld>
-  <p:clrMapOvr>
-    <a:masterClrMapping/>
-  </p:clrMapOvr>
-  <p:transition>
-    <p:fade thruBlk="1"/>
-  </p:transition>
-</p:sld>
-</file>
-
-<file path=ppt/slides/slide16.xml><?xml version="1.0" encoding="utf-8"?>
-<p:sld xmlns:a="http://schemas.openxmlformats.org/drawingml/2006/main" xmlns:r="http://schemas.openxmlformats.org/officeDocument/2006/relationships" xmlns:p="http://schemas.openxmlformats.org/presentationml/2006/main">
-  <p:cSld>
-    <p:spTree>
-      <p:nvGrpSpPr>
-        <p:cNvPr id="1" name=""/>
-        <p:cNvGrpSpPr/>
-        <p:nvPr/>
-      </p:nvGrpSpPr>
-      <p:grpSpPr>
-        <a:xfrm>
-          <a:off x="0" y="0"/>
-          <a:ext cx="0" cy="0"/>
-          <a:chOff x="0" y="0"/>
-          <a:chExt cx="0" cy="0"/>
-        </a:xfrm>
-      </p:grpSpPr>
-      <p:sp>
-        <p:nvSpPr>
-          <p:cNvPr id="2" name="Title 1"/>
-          <p:cNvSpPr>
-            <a:spLocks noGrp="1"/>
-          </p:cNvSpPr>
-          <p:nvPr>
-            <p:ph type="title"/>
-          </p:nvPr>
-        </p:nvSpPr>
-        <p:spPr>
-          <a:xfrm>
-            <a:off x="321623" y="418905"/>
-            <a:ext cx="3467616" cy="307777"/>
-          </a:xfrm>
-        </p:spPr>
-        <p:txBody>
-          <a:bodyPr/>
-          <a:lstStyle/>
-          <a:p>
-            <a:r>
-              <a:rPr lang="nb-NO" dirty="0" smtClean="0"/>
-              <a:t>Dependency injection</a:t>
-            </a:r>
-            <a:endParaRPr lang="en-US" dirty="0"/>
-          </a:p>
-        </p:txBody>
-      </p:sp>
-      <p:sp>
-        <p:nvSpPr>
-          <p:cNvPr id="3" name="Slide Number Placeholder 2"/>
-          <p:cNvSpPr>
-            <a:spLocks noGrp="1"/>
-          </p:cNvSpPr>
-          <p:nvPr>
-            <p:ph type="sldNum" sz="quarter" idx="10"/>
-          </p:nvPr>
-        </p:nvSpPr>
-        <p:spPr/>
-        <p:txBody>
-          <a:bodyPr/>
-          <a:lstStyle/>
-          <a:p>
-            <a:fld id="{FF67BF5B-7344-D747-A0C2-CBD7B2ACBC85}" type="slidenum">
-              <a:rPr lang="en-US" smtClean="0"/>
-              <a:pPr/>
-              <a:t>16</a:t>
             </a:fld>
             <a:endParaRPr lang="en-US" dirty="0"/>
           </a:p>
@@ -15881,7 +15851,7 @@
 </p:sld>
 </file>
 
-<file path=ppt/slides/slide17.xml><?xml version="1.0" encoding="utf-8"?>
+<file path=ppt/slides/slide16.xml><?xml version="1.0" encoding="utf-8"?>
 <p:sld xmlns:a="http://schemas.openxmlformats.org/drawingml/2006/main" xmlns:r="http://schemas.openxmlformats.org/officeDocument/2006/relationships" xmlns:p="http://schemas.openxmlformats.org/presentationml/2006/main">
   <p:cSld>
     <p:spTree>
@@ -15944,7 +15914,7 @@
             <a:fld id="{FF67BF5B-7344-D747-A0C2-CBD7B2ACBC85}" type="slidenum">
               <a:rPr lang="en-US" smtClean="0"/>
               <a:pPr/>
-              <a:t>17</a:t>
+              <a:t>16</a:t>
             </a:fld>
             <a:endParaRPr lang="en-US" dirty="0"/>
           </a:p>
@@ -16731,6 +16701,134 @@
 </p:sld>
 </file>
 
+<file path=ppt/slides/slide17.xml><?xml version="1.0" encoding="utf-8"?>
+<p:sld xmlns:a="http://schemas.openxmlformats.org/drawingml/2006/main" xmlns:r="http://schemas.openxmlformats.org/officeDocument/2006/relationships" xmlns:p="http://schemas.openxmlformats.org/presentationml/2006/main">
+  <p:cSld>
+    <p:spTree>
+      <p:nvGrpSpPr>
+        <p:cNvPr id="1" name=""/>
+        <p:cNvGrpSpPr/>
+        <p:nvPr/>
+      </p:nvGrpSpPr>
+      <p:grpSpPr>
+        <a:xfrm>
+          <a:off x="0" y="0"/>
+          <a:ext cx="0" cy="0"/>
+          <a:chOff x="0" y="0"/>
+          <a:chExt cx="0" cy="0"/>
+        </a:xfrm>
+      </p:grpSpPr>
+      <p:sp>
+        <p:nvSpPr>
+          <p:cNvPr id="2" name="Title 1"/>
+          <p:cNvSpPr>
+            <a:spLocks noGrp="1"/>
+          </p:cNvSpPr>
+          <p:nvPr>
+            <p:ph type="title"/>
+          </p:nvPr>
+        </p:nvSpPr>
+        <p:spPr>
+          <a:xfrm>
+            <a:off x="321623" y="418905"/>
+            <a:ext cx="1819088" cy="307777"/>
+          </a:xfrm>
+        </p:spPr>
+        <p:txBody>
+          <a:bodyPr/>
+          <a:lstStyle/>
+          <a:p>
+            <a:r>
+              <a:rPr lang="nb-NO" dirty="0" smtClean="0"/>
+              <a:t>TDD i MVC3?</a:t>
+            </a:r>
+            <a:endParaRPr lang="en-US" dirty="0"/>
+          </a:p>
+        </p:txBody>
+      </p:sp>
+      <p:sp>
+        <p:nvSpPr>
+          <p:cNvPr id="3" name="Slide Number Placeholder 2"/>
+          <p:cNvSpPr>
+            <a:spLocks noGrp="1"/>
+          </p:cNvSpPr>
+          <p:nvPr>
+            <p:ph type="sldNum" sz="quarter" idx="10"/>
+          </p:nvPr>
+        </p:nvSpPr>
+        <p:spPr/>
+        <p:txBody>
+          <a:bodyPr/>
+          <a:lstStyle/>
+          <a:p>
+            <a:fld id="{FF67BF5B-7344-D747-A0C2-CBD7B2ACBC85}" type="slidenum">
+              <a:rPr lang="en-US" smtClean="0"/>
+              <a:pPr/>
+              <a:t>17</a:t>
+            </a:fld>
+            <a:endParaRPr lang="en-US" dirty="0"/>
+          </a:p>
+        </p:txBody>
+      </p:sp>
+      <p:sp>
+        <p:nvSpPr>
+          <p:cNvPr id="7" name="TextBox 6"/>
+          <p:cNvSpPr txBox="1"/>
+          <p:nvPr/>
+        </p:nvSpPr>
+        <p:spPr>
+          <a:xfrm>
+            <a:off x="3288324" y="2966561"/>
+            <a:ext cx="2547492" cy="743793"/>
+          </a:xfrm>
+          <a:prstGeom prst="rect">
+            <a:avLst/>
+          </a:prstGeom>
+          <a:noFill/>
+        </p:spPr>
+        <p:txBody>
+          <a:bodyPr wrap="none" rtlCol="0">
+            <a:spAutoFit/>
+          </a:bodyPr>
+          <a:lstStyle/>
+          <a:p>
+            <a:pPr>
+              <a:spcBef>
+                <a:spcPts val="600"/>
+              </a:spcBef>
+              <a:spcAft>
+                <a:spcPts val="400"/>
+              </a:spcAft>
+            </a:pPr>
+            <a:r>
+              <a:rPr lang="nb-NO" sz="1700" b="1" dirty="0" smtClean="0"/>
+              <a:t>TDD + MVC3 = SANT</a:t>
+            </a:r>
+          </a:p>
+          <a:p>
+            <a:pPr>
+              <a:spcBef>
+                <a:spcPts val="600"/>
+              </a:spcBef>
+              <a:spcAft>
+                <a:spcPts val="400"/>
+              </a:spcAft>
+            </a:pPr>
+            <a:endParaRPr lang="nb-NO" sz="1700" b="1" dirty="0" smtClean="0"/>
+          </a:p>
+        </p:txBody>
+      </p:sp>
+    </p:spTree>
+  </p:cSld>
+  <p:clrMapOvr>
+    <a:masterClrMapping/>
+  </p:clrMapOvr>
+  <p:transition>
+    <p:fade thruBlk="1"/>
+  </p:transition>
+</p:sld>
+</file>
+
 <file path=ppt/slides/slide18.xml><?xml version="1.0" encoding="utf-8"?>
 <p:sld xmlns:a="http://schemas.openxmlformats.org/drawingml/2006/main" xmlns:r="http://schemas.openxmlformats.org/officeDocument/2006/relationships" xmlns:p="http://schemas.openxmlformats.org/presentationml/2006/main">
   <p:cSld>
@@ -18138,14 +18236,6 @@
 <file path=ppt/slides/slide19.xml><?xml version="1.0" encoding="utf-8"?>
 <p:sld xmlns:a="http://schemas.openxmlformats.org/drawingml/2006/main" xmlns:r="http://schemas.openxmlformats.org/officeDocument/2006/relationships" xmlns:p="http://schemas.openxmlformats.org/presentationml/2006/main">
   <p:cSld>
-    <p:bg>
-      <p:bgPr>
-        <a:solidFill>
-          <a:schemeClr val="accent1"/>
-        </a:solidFill>
-        <a:effectLst/>
-      </p:bgPr>
-    </p:bg>
     <p:spTree>
       <p:nvGrpSpPr>
         <p:cNvPr id="1" name=""/>
@@ -18162,40 +18252,102 @@
       </p:grpSpPr>
       <p:sp>
         <p:nvSpPr>
-          <p:cNvPr id="2" name="Title 1"/>
+          <p:cNvPr id="5" name="Title 4"/>
           <p:cNvSpPr>
             <a:spLocks noGrp="1"/>
           </p:cNvSpPr>
           <p:nvPr>
-            <p:ph type="title"/>
+            <p:ph type="ctrTitle"/>
           </p:nvPr>
         </p:nvSpPr>
         <p:spPr>
           <a:xfrm>
-            <a:off x="321623" y="418905"/>
-            <a:ext cx="1610377" cy="307777"/>
+            <a:off x="2375091" y="3304566"/>
+            <a:ext cx="4396995" cy="312906"/>
           </a:xfrm>
-          <a:solidFill>
-            <a:schemeClr val="accent1"/>
-          </a:solidFill>
         </p:spPr>
         <p:txBody>
           <a:bodyPr/>
           <a:lstStyle/>
           <a:p>
             <a:r>
-              <a:rPr lang="nb-NO" dirty="0" smtClean="0">
-                <a:solidFill>
-                  <a:schemeClr val="bg1"/>
-                </a:solidFill>
-              </a:rPr>
-              <a:t>Oppgave 3</a:t>
-            </a:r>
-            <a:endParaRPr lang="en-US" dirty="0">
-              <a:solidFill>
-                <a:schemeClr val="bg1"/>
-              </a:solidFill>
-            </a:endParaRPr>
+              <a:rPr lang="en-US" dirty="0" err="1" smtClean="0"/>
+              <a:t>Takk</a:t>
+            </a:r>
+            <a:r>
+              <a:rPr lang="en-US" dirty="0" smtClean="0"/>
+              <a:t> for meg</a:t>
+            </a:r>
+            <a:endParaRPr lang="en-US" dirty="0"/>
+          </a:p>
+        </p:txBody>
+      </p:sp>
+      <p:sp>
+        <p:nvSpPr>
+          <p:cNvPr id="6" name="Text Placeholder 5"/>
+          <p:cNvSpPr>
+            <a:spLocks noGrp="1"/>
+          </p:cNvSpPr>
+          <p:nvPr>
+            <p:ph type="body" sz="quarter" idx="10"/>
+          </p:nvPr>
+        </p:nvSpPr>
+        <p:spPr/>
+        <p:txBody>
+          <a:bodyPr/>
+          <a:lstStyle/>
+          <a:p>
+            <a:r>
+              <a:rPr lang="nb-NO" dirty="0" smtClean="0"/>
+              <a:t>Espen Ekvang</a:t>
+            </a:r>
+            <a:endParaRPr lang="en-US" dirty="0"/>
+          </a:p>
+        </p:txBody>
+      </p:sp>
+      <p:sp>
+        <p:nvSpPr>
+          <p:cNvPr id="7" name="Text Placeholder 6"/>
+          <p:cNvSpPr>
+            <a:spLocks noGrp="1"/>
+          </p:cNvSpPr>
+          <p:nvPr>
+            <p:ph type="body" sz="quarter" idx="11"/>
+          </p:nvPr>
+        </p:nvSpPr>
+        <p:spPr/>
+        <p:txBody>
+          <a:bodyPr/>
+          <a:lstStyle/>
+          <a:p>
+            <a:r>
+              <a:rPr lang="nb-NO" dirty="0" smtClean="0"/>
+              <a:t>espen.ekvang@bekk.no</a:t>
+            </a:r>
+            <a:endParaRPr lang="en-US" dirty="0"/>
+          </a:p>
+        </p:txBody>
+      </p:sp>
+      <p:sp>
+        <p:nvSpPr>
+          <p:cNvPr id="8" name="Text Placeholder 7"/>
+          <p:cNvSpPr>
+            <a:spLocks noGrp="1"/>
+          </p:cNvSpPr>
+          <p:nvPr>
+            <p:ph type="body" sz="quarter" idx="12"/>
+          </p:nvPr>
+        </p:nvSpPr>
+        <p:spPr/>
+        <p:txBody>
+          <a:bodyPr/>
+          <a:lstStyle/>
+          <a:p>
+            <a:r>
+              <a:rPr lang="nb-NO" dirty="0" smtClean="0"/>
+              <a:t>http://github.com/bekk/dotnetkurs</a:t>
+            </a:r>
+            <a:endParaRPr lang="en-US" dirty="0"/>
           </a:p>
         </p:txBody>
       </p:sp>
@@ -18206,105 +18358,34 @@
             <a:spLocks noGrp="1"/>
           </p:cNvSpPr>
           <p:nvPr>
-            <p:ph type="sldNum" sz="quarter" idx="10"/>
+            <p:ph type="sldNum" sz="quarter" idx="4294967295"/>
           </p:nvPr>
         </p:nvSpPr>
         <p:spPr>
-          <a:solidFill>
-            <a:schemeClr val="accent1"/>
-          </a:solidFill>
+          <a:xfrm>
+            <a:off x="8837613" y="431800"/>
+            <a:ext cx="306387" cy="276225"/>
+          </a:xfrm>
         </p:spPr>
         <p:txBody>
           <a:bodyPr/>
           <a:lstStyle/>
           <a:p>
             <a:fld id="{FF67BF5B-7344-D747-A0C2-CBD7B2ACBC85}" type="slidenum">
-              <a:rPr lang="en-US" smtClean="0">
-                <a:solidFill>
-                  <a:schemeClr val="bg1"/>
-                </a:solidFill>
-              </a:rPr>
+              <a:rPr lang="en-US" smtClean="0"/>
               <a:pPr/>
               <a:t>19</a:t>
             </a:fld>
-            <a:endParaRPr lang="en-US" dirty="0">
-              <a:solidFill>
-                <a:schemeClr val="bg1"/>
-              </a:solidFill>
-            </a:endParaRPr>
-          </a:p>
-        </p:txBody>
-      </p:sp>
-      <p:sp>
-        <p:nvSpPr>
-          <p:cNvPr id="6" name="Title 1"/>
-          <p:cNvSpPr txBox="1">
-            <a:spLocks/>
-          </p:cNvSpPr>
-          <p:nvPr/>
-        </p:nvSpPr>
-        <p:spPr>
-          <a:xfrm>
-            <a:off x="3798248" y="2825948"/>
-            <a:ext cx="892232" cy="307777"/>
-          </a:xfrm>
-          <a:prstGeom prst="rect">
-            <a:avLst/>
-          </a:prstGeom>
-          <a:solidFill>
-            <a:schemeClr val="accent1"/>
-          </a:solidFill>
-        </p:spPr>
-        <p:txBody>
-          <a:bodyPr vert="horz" wrap="none" lIns="91440" tIns="0" rIns="91440" bIns="0" rtlCol="0" anchor="t">
-            <a:spAutoFit/>
-          </a:bodyPr>
-          <a:lstStyle/>
-          <a:p>
-            <a:pPr marL="457200" marR="0" lvl="0" indent="-457200" algn="l" defTabSz="457200" rtl="0" eaLnBrk="1" fontAlgn="auto" latinLnBrk="0" hangingPunct="1">
-              <a:lnSpc>
-                <a:spcPct val="100000"/>
-              </a:lnSpc>
-              <a:spcBef>
-                <a:spcPct val="0"/>
-              </a:spcBef>
-              <a:spcAft>
-                <a:spcPts val="0"/>
-              </a:spcAft>
-              <a:buClrTx/>
-              <a:buSzTx/>
-              <a:tabLst/>
-              <a:defRPr/>
-            </a:pPr>
-            <a:r>
-              <a:rPr lang="nb-NO" sz="2000" i="1" cap="all" spc="20" dirty="0" smtClean="0">
-                <a:solidFill>
-                  <a:schemeClr val="bg1"/>
-                </a:solidFill>
-                <a:latin typeface="Georgia"/>
-                <a:ea typeface="+mj-ea"/>
-                <a:cs typeface="Georgia"/>
-              </a:rPr>
-              <a:t>blog</a:t>
-            </a:r>
-            <a:endParaRPr kumimoji="0" lang="en-US" sz="2000" b="0" i="1" u="none" strike="noStrike" kern="1200" cap="all" spc="20" normalizeH="0" baseline="0" noProof="0" dirty="0">
-              <a:ln>
-                <a:noFill/>
-              </a:ln>
-              <a:solidFill>
-                <a:schemeClr val="bg1"/>
-              </a:solidFill>
-              <a:effectLst/>
-              <a:uLnTx/>
-              <a:uFillTx/>
-              <a:latin typeface="Georgia"/>
-              <a:ea typeface="+mj-ea"/>
-              <a:cs typeface="Georgia"/>
-            </a:endParaRPr>
+            <a:endParaRPr lang="en-US" dirty="0"/>
           </a:p>
         </p:txBody>
       </p:sp>
     </p:spTree>
+    <p:extLst>
+      <p:ext uri="{BB962C8B-B14F-4D97-AF65-F5344CB8AC3E}">
+        <p14:creationId xmlns:p14="http://schemas.microsoft.com/office/powerpoint/2010/main" xmlns="" val="1013825328"/>
+      </p:ext>
+    </p:extLst>
   </p:cSld>
   <p:clrMapOvr>
     <a:masterClrMapping/>
@@ -18312,6 +18393,13 @@
   <p:transition>
     <p:fade thruBlk="1"/>
   </p:transition>
+  <p:timing>
+    <p:tnLst>
+      <p:par>
+        <p:cTn id="1" dur="indefinite" restart="never" nodeType="tmRoot"/>
+      </p:par>
+    </p:tnLst>
+  </p:timing>
 </p:sld>
 </file>
 
@@ -18418,7 +18506,11 @@
             </a:pPr>
             <a:r>
               <a:rPr lang="nb-NO" sz="1400" dirty="0" smtClean="0"/>
-              <a:t> Hva er TDD?</a:t>
+              <a:t> </a:t>
+            </a:r>
+            <a:r>
+              <a:rPr lang="nb-NO" sz="1400" dirty="0" smtClean="0"/>
+              <a:t>Enhetstesting</a:t>
             </a:r>
           </a:p>
           <a:p>
@@ -18434,8 +18526,13 @@
             </a:pPr>
             <a:r>
               <a:rPr lang="nb-NO" sz="1400" dirty="0" smtClean="0"/>
-              <a:t> Motivasjon</a:t>
-            </a:r>
+              <a:t> </a:t>
+            </a:r>
+            <a:r>
+              <a:rPr lang="nb-NO" sz="1400" dirty="0" smtClean="0"/>
+              <a:t>Hva er TDD?</a:t>
+            </a:r>
+            <a:endParaRPr lang="nb-NO" sz="1400" dirty="0" smtClean="0"/>
           </a:p>
           <a:p>
             <a:pPr>
@@ -18583,7 +18680,7 @@
         <p:spPr>
           <a:xfrm>
             <a:off x="321623" y="418905"/>
-            <a:ext cx="1904047" cy="307777"/>
+            <a:ext cx="1885453" cy="307777"/>
           </a:xfrm>
         </p:spPr>
         <p:txBody>
@@ -18592,7 +18689,7 @@
           <a:p>
             <a:r>
               <a:rPr lang="nb-NO" dirty="0" smtClean="0"/>
-              <a:t>Hva er tdd?</a:t>
+              <a:t>Enhetstest</a:t>
             </a:r>
             <a:endParaRPr lang="en-US" dirty="0"/>
           </a:p>
@@ -18617,6 +18714,651 @@
               <a:rPr lang="en-US" smtClean="0"/>
               <a:pPr/>
               <a:t>3</a:t>
+            </a:fld>
+            <a:endParaRPr lang="en-US" dirty="0"/>
+          </a:p>
+        </p:txBody>
+      </p:sp>
+      <p:sp>
+        <p:nvSpPr>
+          <p:cNvPr id="5" name="TextBox 4"/>
+          <p:cNvSpPr txBox="1"/>
+          <p:nvPr/>
+        </p:nvSpPr>
+        <p:spPr>
+          <a:xfrm>
+            <a:off x="572423" y="1172845"/>
+            <a:ext cx="8158884" cy="1600438"/>
+          </a:xfrm>
+          <a:prstGeom prst="rect">
+            <a:avLst/>
+          </a:prstGeom>
+          <a:noFill/>
+          <a:ln>
+            <a:solidFill>
+              <a:schemeClr val="accent2"/>
+            </a:solidFill>
+          </a:ln>
+        </p:spPr>
+        <p:txBody>
+          <a:bodyPr wrap="square" rtlCol="0">
+            <a:spAutoFit/>
+          </a:bodyPr>
+          <a:lstStyle/>
+          <a:p>
+            <a:pPr>
+              <a:spcBef>
+                <a:spcPts val="600"/>
+              </a:spcBef>
+              <a:spcAft>
+                <a:spcPts val="400"/>
+              </a:spcAft>
+            </a:pPr>
+            <a:r>
+              <a:rPr lang="en-US" sz="1400" dirty="0" smtClean="0">
+                <a:solidFill>
+                  <a:srgbClr val="0000FF"/>
+                </a:solidFill>
+                <a:latin typeface="Consolas" pitchFamily="49" charset="0"/>
+                <a:cs typeface="Consolas" pitchFamily="49" charset="0"/>
+              </a:rPr>
+              <a:t>public</a:t>
+            </a:r>
+            <a:r>
+              <a:rPr lang="en-US" sz="1400" dirty="0" smtClean="0">
+                <a:latin typeface="Consolas" pitchFamily="49" charset="0"/>
+                <a:cs typeface="Consolas" pitchFamily="49" charset="0"/>
+              </a:rPr>
+              <a:t> </a:t>
+            </a:r>
+            <a:r>
+              <a:rPr lang="en-US" sz="1400" dirty="0" smtClean="0">
+                <a:solidFill>
+                  <a:srgbClr val="0000FF"/>
+                </a:solidFill>
+                <a:latin typeface="Consolas" pitchFamily="49" charset="0"/>
+                <a:cs typeface="Consolas" pitchFamily="49" charset="0"/>
+              </a:rPr>
+              <a:t>class</a:t>
+            </a:r>
+            <a:r>
+              <a:rPr lang="en-US" sz="1400" dirty="0" smtClean="0">
+                <a:latin typeface="Consolas" pitchFamily="49" charset="0"/>
+                <a:cs typeface="Consolas" pitchFamily="49" charset="0"/>
+              </a:rPr>
+              <a:t> </a:t>
+            </a:r>
+            <a:r>
+              <a:rPr lang="en-US" sz="1400" dirty="0" smtClean="0">
+                <a:solidFill>
+                  <a:srgbClr val="2B91AF"/>
+                </a:solidFill>
+                <a:latin typeface="Consolas" pitchFamily="49" charset="0"/>
+                <a:cs typeface="Consolas" pitchFamily="49" charset="0"/>
+              </a:rPr>
+              <a:t>Calculator</a:t>
+            </a:r>
+            <a:r>
+              <a:rPr lang="en-US" sz="1400" dirty="0" smtClean="0">
+                <a:latin typeface="Consolas" pitchFamily="49" charset="0"/>
+                <a:cs typeface="Consolas" pitchFamily="49" charset="0"/>
+              </a:rPr>
+              <a:t>     </a:t>
+            </a:r>
+            <a:br>
+              <a:rPr lang="en-US" sz="1400" dirty="0" smtClean="0">
+                <a:latin typeface="Consolas" pitchFamily="49" charset="0"/>
+                <a:cs typeface="Consolas" pitchFamily="49" charset="0"/>
+              </a:rPr>
+            </a:br>
+            <a:r>
+              <a:rPr lang="en-US" sz="1400" dirty="0" smtClean="0">
+                <a:latin typeface="Consolas" pitchFamily="49" charset="0"/>
+                <a:cs typeface="Consolas" pitchFamily="49" charset="0"/>
+              </a:rPr>
+              <a:t>{         </a:t>
+            </a:r>
+            <a:br>
+              <a:rPr lang="en-US" sz="1400" dirty="0" smtClean="0">
+                <a:latin typeface="Consolas" pitchFamily="49" charset="0"/>
+                <a:cs typeface="Consolas" pitchFamily="49" charset="0"/>
+              </a:rPr>
+            </a:br>
+            <a:r>
+              <a:rPr lang="en-US" sz="1400" dirty="0" smtClean="0">
+                <a:latin typeface="Consolas" pitchFamily="49" charset="0"/>
+                <a:cs typeface="Consolas" pitchFamily="49" charset="0"/>
+              </a:rPr>
+              <a:t>	</a:t>
+            </a:r>
+            <a:r>
+              <a:rPr lang="en-US" sz="1400" dirty="0" smtClean="0">
+                <a:solidFill>
+                  <a:srgbClr val="0000FF"/>
+                </a:solidFill>
+                <a:latin typeface="Consolas" pitchFamily="49" charset="0"/>
+                <a:cs typeface="Consolas" pitchFamily="49" charset="0"/>
+              </a:rPr>
+              <a:t>public</a:t>
+            </a:r>
+            <a:r>
+              <a:rPr lang="en-US" sz="1400" dirty="0" smtClean="0">
+                <a:latin typeface="Consolas" pitchFamily="49" charset="0"/>
+                <a:cs typeface="Consolas" pitchFamily="49" charset="0"/>
+              </a:rPr>
+              <a:t> </a:t>
+            </a:r>
+            <a:r>
+              <a:rPr lang="en-US" sz="1400" dirty="0" err="1" smtClean="0">
+                <a:solidFill>
+                  <a:srgbClr val="0000FF"/>
+                </a:solidFill>
+                <a:latin typeface="Consolas" pitchFamily="49" charset="0"/>
+                <a:cs typeface="Consolas" pitchFamily="49" charset="0"/>
+              </a:rPr>
+              <a:t>int</a:t>
+            </a:r>
+            <a:r>
+              <a:rPr lang="en-US" sz="1400" dirty="0" smtClean="0">
+                <a:latin typeface="Consolas" pitchFamily="49" charset="0"/>
+                <a:cs typeface="Consolas" pitchFamily="49" charset="0"/>
+              </a:rPr>
+              <a:t> Add(</a:t>
+            </a:r>
+            <a:r>
+              <a:rPr lang="en-US" sz="1400" dirty="0" err="1" smtClean="0">
+                <a:solidFill>
+                  <a:srgbClr val="0000FF"/>
+                </a:solidFill>
+                <a:latin typeface="Consolas" pitchFamily="49" charset="0"/>
+                <a:cs typeface="Consolas" pitchFamily="49" charset="0"/>
+              </a:rPr>
+              <a:t>int</a:t>
+            </a:r>
+            <a:r>
+              <a:rPr lang="en-US" sz="1400" dirty="0" smtClean="0">
+                <a:latin typeface="Consolas" pitchFamily="49" charset="0"/>
+                <a:cs typeface="Consolas" pitchFamily="49" charset="0"/>
+              </a:rPr>
+              <a:t> a, </a:t>
+            </a:r>
+            <a:r>
+              <a:rPr lang="en-US" sz="1400" dirty="0" err="1" smtClean="0">
+                <a:solidFill>
+                  <a:srgbClr val="0000FF"/>
+                </a:solidFill>
+                <a:latin typeface="Consolas" pitchFamily="49" charset="0"/>
+                <a:cs typeface="Consolas" pitchFamily="49" charset="0"/>
+              </a:rPr>
+              <a:t>int</a:t>
+            </a:r>
+            <a:r>
+              <a:rPr lang="en-US" sz="1400" dirty="0" smtClean="0">
+                <a:latin typeface="Consolas" pitchFamily="49" charset="0"/>
+                <a:cs typeface="Consolas" pitchFamily="49" charset="0"/>
+              </a:rPr>
+              <a:t> b)         </a:t>
+            </a:r>
+            <a:br>
+              <a:rPr lang="en-US" sz="1400" dirty="0" smtClean="0">
+                <a:latin typeface="Consolas" pitchFamily="49" charset="0"/>
+                <a:cs typeface="Consolas" pitchFamily="49" charset="0"/>
+              </a:rPr>
+            </a:br>
+            <a:r>
+              <a:rPr lang="en-US" sz="1400" dirty="0" smtClean="0">
+                <a:latin typeface="Consolas" pitchFamily="49" charset="0"/>
+                <a:cs typeface="Consolas" pitchFamily="49" charset="0"/>
+              </a:rPr>
+              <a:t>	{             </a:t>
+            </a:r>
+            <a:br>
+              <a:rPr lang="en-US" sz="1400" dirty="0" smtClean="0">
+                <a:latin typeface="Consolas" pitchFamily="49" charset="0"/>
+                <a:cs typeface="Consolas" pitchFamily="49" charset="0"/>
+              </a:rPr>
+            </a:br>
+            <a:r>
+              <a:rPr lang="en-US" sz="1400" dirty="0" smtClean="0">
+                <a:latin typeface="Consolas" pitchFamily="49" charset="0"/>
+                <a:cs typeface="Consolas" pitchFamily="49" charset="0"/>
+              </a:rPr>
+              <a:t>		</a:t>
+            </a:r>
+            <a:r>
+              <a:rPr lang="en-US" sz="1400" dirty="0" smtClean="0">
+                <a:solidFill>
+                  <a:srgbClr val="0000FF"/>
+                </a:solidFill>
+                <a:latin typeface="Consolas" pitchFamily="49" charset="0"/>
+                <a:cs typeface="Consolas" pitchFamily="49" charset="0"/>
+              </a:rPr>
+              <a:t>return</a:t>
+            </a:r>
+            <a:r>
+              <a:rPr lang="en-US" sz="1400" dirty="0" smtClean="0">
+                <a:latin typeface="Consolas" pitchFamily="49" charset="0"/>
+                <a:cs typeface="Consolas" pitchFamily="49" charset="0"/>
+              </a:rPr>
+              <a:t> a + b;         </a:t>
+            </a:r>
+            <a:br>
+              <a:rPr lang="en-US" sz="1400" dirty="0" smtClean="0">
+                <a:latin typeface="Consolas" pitchFamily="49" charset="0"/>
+                <a:cs typeface="Consolas" pitchFamily="49" charset="0"/>
+              </a:rPr>
+            </a:br>
+            <a:r>
+              <a:rPr lang="en-US" sz="1400" dirty="0" smtClean="0">
+                <a:latin typeface="Consolas" pitchFamily="49" charset="0"/>
+                <a:cs typeface="Consolas" pitchFamily="49" charset="0"/>
+              </a:rPr>
+              <a:t>	}     </a:t>
+            </a:r>
+            <a:br>
+              <a:rPr lang="en-US" sz="1400" dirty="0" smtClean="0">
+                <a:latin typeface="Consolas" pitchFamily="49" charset="0"/>
+                <a:cs typeface="Consolas" pitchFamily="49" charset="0"/>
+              </a:rPr>
+            </a:br>
+            <a:r>
+              <a:rPr lang="en-US" sz="1400" dirty="0" smtClean="0">
+                <a:latin typeface="Consolas" pitchFamily="49" charset="0"/>
+                <a:cs typeface="Consolas" pitchFamily="49" charset="0"/>
+              </a:rPr>
+              <a:t>}</a:t>
+            </a:r>
+          </a:p>
+        </p:txBody>
+      </p:sp>
+      <p:sp>
+        <p:nvSpPr>
+          <p:cNvPr id="6" name="TextBox 5"/>
+          <p:cNvSpPr txBox="1"/>
+          <p:nvPr/>
+        </p:nvSpPr>
+        <p:spPr>
+          <a:xfrm>
+            <a:off x="572423" y="3763663"/>
+            <a:ext cx="8158884" cy="2031325"/>
+          </a:xfrm>
+          <a:prstGeom prst="rect">
+            <a:avLst/>
+          </a:prstGeom>
+          <a:noFill/>
+          <a:ln>
+            <a:solidFill>
+              <a:schemeClr val="accent2"/>
+            </a:solidFill>
+          </a:ln>
+        </p:spPr>
+        <p:txBody>
+          <a:bodyPr wrap="square" rtlCol="0">
+            <a:spAutoFit/>
+          </a:bodyPr>
+          <a:lstStyle/>
+          <a:p>
+            <a:pPr>
+              <a:spcBef>
+                <a:spcPts val="600"/>
+              </a:spcBef>
+              <a:spcAft>
+                <a:spcPts val="400"/>
+              </a:spcAft>
+            </a:pPr>
+            <a:r>
+              <a:rPr lang="en-US" sz="1400" dirty="0" smtClean="0">
+                <a:latin typeface="Consolas" pitchFamily="49" charset="0"/>
+                <a:cs typeface="Consolas" pitchFamily="49" charset="0"/>
+              </a:rPr>
+              <a:t>[</a:t>
+            </a:r>
+            <a:r>
+              <a:rPr lang="en-US" sz="1400" dirty="0" err="1" smtClean="0">
+                <a:solidFill>
+                  <a:srgbClr val="2B91AF"/>
+                </a:solidFill>
+                <a:latin typeface="Consolas" pitchFamily="49" charset="0"/>
+                <a:cs typeface="Consolas" pitchFamily="49" charset="0"/>
+              </a:rPr>
+              <a:t>TestMethod</a:t>
+            </a:r>
+            <a:r>
+              <a:rPr lang="en-US" sz="1400" dirty="0" smtClean="0">
+                <a:latin typeface="Consolas" pitchFamily="49" charset="0"/>
+                <a:cs typeface="Consolas" pitchFamily="49" charset="0"/>
+              </a:rPr>
+              <a:t>]         </a:t>
+            </a:r>
+            <a:br>
+              <a:rPr lang="en-US" sz="1400" dirty="0" smtClean="0">
+                <a:latin typeface="Consolas" pitchFamily="49" charset="0"/>
+                <a:cs typeface="Consolas" pitchFamily="49" charset="0"/>
+              </a:rPr>
+            </a:br>
+            <a:r>
+              <a:rPr lang="en-US" sz="1400" dirty="0" smtClean="0">
+                <a:solidFill>
+                  <a:srgbClr val="0000FF"/>
+                </a:solidFill>
+                <a:latin typeface="Consolas" pitchFamily="49" charset="0"/>
+                <a:cs typeface="Consolas" pitchFamily="49" charset="0"/>
+              </a:rPr>
+              <a:t>public</a:t>
+            </a:r>
+            <a:r>
+              <a:rPr lang="en-US" sz="1400" dirty="0" smtClean="0">
+                <a:latin typeface="Consolas" pitchFamily="49" charset="0"/>
+                <a:cs typeface="Consolas" pitchFamily="49" charset="0"/>
+              </a:rPr>
+              <a:t> </a:t>
+            </a:r>
+            <a:r>
+              <a:rPr lang="en-US" sz="1400" dirty="0" smtClean="0">
+                <a:solidFill>
+                  <a:srgbClr val="0000FF"/>
+                </a:solidFill>
+                <a:latin typeface="Consolas" pitchFamily="49" charset="0"/>
+                <a:cs typeface="Consolas" pitchFamily="49" charset="0"/>
+              </a:rPr>
+              <a:t>void</a:t>
+            </a:r>
+            <a:r>
+              <a:rPr lang="en-US" sz="1400" dirty="0" smtClean="0">
+                <a:latin typeface="Consolas" pitchFamily="49" charset="0"/>
+                <a:cs typeface="Consolas" pitchFamily="49" charset="0"/>
+              </a:rPr>
+              <a:t> </a:t>
+            </a:r>
+            <a:r>
+              <a:rPr lang="en-US" sz="1400" dirty="0" err="1" smtClean="0">
+                <a:latin typeface="Consolas" pitchFamily="49" charset="0"/>
+                <a:cs typeface="Consolas" pitchFamily="49" charset="0"/>
+              </a:rPr>
+              <a:t>Add_TwoNumbers_ReturnSumOfNumbers</a:t>
+            </a:r>
+            <a:r>
+              <a:rPr lang="en-US" sz="1400" dirty="0" smtClean="0">
+                <a:latin typeface="Consolas" pitchFamily="49" charset="0"/>
+                <a:cs typeface="Consolas" pitchFamily="49" charset="0"/>
+              </a:rPr>
+              <a:t>()         </a:t>
+            </a:r>
+            <a:br>
+              <a:rPr lang="en-US" sz="1400" dirty="0" smtClean="0">
+                <a:latin typeface="Consolas" pitchFamily="49" charset="0"/>
+                <a:cs typeface="Consolas" pitchFamily="49" charset="0"/>
+              </a:rPr>
+            </a:br>
+            <a:r>
+              <a:rPr lang="en-US" sz="1400" dirty="0" smtClean="0">
+                <a:latin typeface="Consolas" pitchFamily="49" charset="0"/>
+                <a:cs typeface="Consolas" pitchFamily="49" charset="0"/>
+              </a:rPr>
+              <a:t>{             </a:t>
+            </a:r>
+            <a:br>
+              <a:rPr lang="en-US" sz="1400" dirty="0" smtClean="0">
+                <a:latin typeface="Consolas" pitchFamily="49" charset="0"/>
+                <a:cs typeface="Consolas" pitchFamily="49" charset="0"/>
+              </a:rPr>
+            </a:br>
+            <a:r>
+              <a:rPr lang="en-US" sz="1400" dirty="0" smtClean="0">
+                <a:latin typeface="Consolas" pitchFamily="49" charset="0"/>
+                <a:cs typeface="Consolas" pitchFamily="49" charset="0"/>
+              </a:rPr>
+              <a:t>	</a:t>
+            </a:r>
+            <a:r>
+              <a:rPr lang="en-US" sz="1400" dirty="0" err="1" smtClean="0">
+                <a:solidFill>
+                  <a:srgbClr val="0000FF"/>
+                </a:solidFill>
+                <a:latin typeface="Consolas" pitchFamily="49" charset="0"/>
+                <a:cs typeface="Consolas" pitchFamily="49" charset="0"/>
+              </a:rPr>
+              <a:t>var</a:t>
+            </a:r>
+            <a:r>
+              <a:rPr lang="en-US" sz="1400" dirty="0" smtClean="0">
+                <a:latin typeface="Consolas" pitchFamily="49" charset="0"/>
+                <a:cs typeface="Consolas" pitchFamily="49" charset="0"/>
+              </a:rPr>
+              <a:t> calculator = </a:t>
+            </a:r>
+            <a:r>
+              <a:rPr lang="en-US" sz="1400" dirty="0" smtClean="0">
+                <a:solidFill>
+                  <a:srgbClr val="0000FF"/>
+                </a:solidFill>
+                <a:latin typeface="Consolas" pitchFamily="49" charset="0"/>
+                <a:cs typeface="Consolas" pitchFamily="49" charset="0"/>
+              </a:rPr>
+              <a:t>new</a:t>
+            </a:r>
+            <a:r>
+              <a:rPr lang="en-US" sz="1400" dirty="0" smtClean="0">
+                <a:latin typeface="Consolas" pitchFamily="49" charset="0"/>
+                <a:cs typeface="Consolas" pitchFamily="49" charset="0"/>
+              </a:rPr>
+              <a:t> </a:t>
+            </a:r>
+            <a:r>
+              <a:rPr lang="en-US" sz="1400" dirty="0" smtClean="0">
+                <a:solidFill>
+                  <a:srgbClr val="2B91AF"/>
+                </a:solidFill>
+                <a:latin typeface="Consolas" pitchFamily="49" charset="0"/>
+                <a:cs typeface="Consolas" pitchFamily="49" charset="0"/>
+              </a:rPr>
+              <a:t>Calculator</a:t>
+            </a:r>
+            <a:r>
+              <a:rPr lang="en-US" sz="1400" dirty="0" smtClean="0">
+                <a:latin typeface="Consolas" pitchFamily="49" charset="0"/>
+                <a:cs typeface="Consolas" pitchFamily="49" charset="0"/>
+              </a:rPr>
+              <a:t>();          </a:t>
+            </a:r>
+            <a:br>
+              <a:rPr lang="en-US" sz="1400" dirty="0" smtClean="0">
+                <a:latin typeface="Consolas" pitchFamily="49" charset="0"/>
+                <a:cs typeface="Consolas" pitchFamily="49" charset="0"/>
+              </a:rPr>
+            </a:br>
+            <a:r>
+              <a:rPr lang="en-US" sz="1400" dirty="0" smtClean="0">
+                <a:latin typeface="Consolas" pitchFamily="49" charset="0"/>
+                <a:cs typeface="Consolas" pitchFamily="49" charset="0"/>
+              </a:rPr>
+              <a:t/>
+            </a:r>
+            <a:br>
+              <a:rPr lang="en-US" sz="1400" dirty="0" smtClean="0">
+                <a:latin typeface="Consolas" pitchFamily="49" charset="0"/>
+                <a:cs typeface="Consolas" pitchFamily="49" charset="0"/>
+              </a:rPr>
+            </a:br>
+            <a:r>
+              <a:rPr lang="en-US" sz="1400" dirty="0" smtClean="0">
+                <a:latin typeface="Consolas" pitchFamily="49" charset="0"/>
+                <a:cs typeface="Consolas" pitchFamily="49" charset="0"/>
+              </a:rPr>
+              <a:t>	</a:t>
+            </a:r>
+            <a:r>
+              <a:rPr lang="en-US" sz="1400" dirty="0" err="1" smtClean="0">
+                <a:solidFill>
+                  <a:srgbClr val="0000FF"/>
+                </a:solidFill>
+                <a:latin typeface="Consolas" pitchFamily="49" charset="0"/>
+                <a:cs typeface="Consolas" pitchFamily="49" charset="0"/>
+              </a:rPr>
+              <a:t>var</a:t>
+            </a:r>
+            <a:r>
+              <a:rPr lang="en-US" sz="1400" dirty="0" smtClean="0">
+                <a:latin typeface="Consolas" pitchFamily="49" charset="0"/>
+                <a:cs typeface="Consolas" pitchFamily="49" charset="0"/>
+              </a:rPr>
+              <a:t> result = </a:t>
+            </a:r>
+            <a:r>
+              <a:rPr lang="en-US" sz="1400" dirty="0" err="1" smtClean="0">
+                <a:latin typeface="Consolas" pitchFamily="49" charset="0"/>
+                <a:cs typeface="Consolas" pitchFamily="49" charset="0"/>
+              </a:rPr>
+              <a:t>calculator.Add</a:t>
+            </a:r>
+            <a:r>
+              <a:rPr lang="en-US" sz="1400" dirty="0" smtClean="0">
+                <a:latin typeface="Consolas" pitchFamily="49" charset="0"/>
+                <a:cs typeface="Consolas" pitchFamily="49" charset="0"/>
+              </a:rPr>
+              <a:t>(1, 2);             </a:t>
+            </a:r>
+            <a:br>
+              <a:rPr lang="en-US" sz="1400" dirty="0" smtClean="0">
+                <a:latin typeface="Consolas" pitchFamily="49" charset="0"/>
+                <a:cs typeface="Consolas" pitchFamily="49" charset="0"/>
+              </a:rPr>
+            </a:br>
+            <a:r>
+              <a:rPr lang="en-US" sz="1400" dirty="0" smtClean="0">
+                <a:latin typeface="Consolas" pitchFamily="49" charset="0"/>
+                <a:cs typeface="Consolas" pitchFamily="49" charset="0"/>
+              </a:rPr>
+              <a:t/>
+            </a:r>
+            <a:br>
+              <a:rPr lang="en-US" sz="1400" dirty="0" smtClean="0">
+                <a:latin typeface="Consolas" pitchFamily="49" charset="0"/>
+                <a:cs typeface="Consolas" pitchFamily="49" charset="0"/>
+              </a:rPr>
+            </a:br>
+            <a:r>
+              <a:rPr lang="en-US" sz="1400" dirty="0" smtClean="0">
+                <a:latin typeface="Consolas" pitchFamily="49" charset="0"/>
+                <a:cs typeface="Consolas" pitchFamily="49" charset="0"/>
+              </a:rPr>
+              <a:t>	</a:t>
+            </a:r>
+            <a:r>
+              <a:rPr lang="en-US" sz="1400" dirty="0" err="1" smtClean="0">
+                <a:solidFill>
+                  <a:srgbClr val="2B91AF"/>
+                </a:solidFill>
+                <a:latin typeface="Consolas" pitchFamily="49" charset="0"/>
+                <a:cs typeface="Consolas" pitchFamily="49" charset="0"/>
+              </a:rPr>
+              <a:t>Assert</a:t>
+            </a:r>
+            <a:r>
+              <a:rPr lang="en-US" sz="1400" dirty="0" err="1" smtClean="0">
+                <a:latin typeface="Consolas" pitchFamily="49" charset="0"/>
+                <a:cs typeface="Consolas" pitchFamily="49" charset="0"/>
+              </a:rPr>
+              <a:t>.AreEqual</a:t>
+            </a:r>
+            <a:r>
+              <a:rPr lang="en-US" sz="1400" dirty="0" smtClean="0">
+                <a:latin typeface="Consolas" pitchFamily="49" charset="0"/>
+                <a:cs typeface="Consolas" pitchFamily="49" charset="0"/>
+              </a:rPr>
+              <a:t>(3, result);         </a:t>
+            </a:r>
+            <a:br>
+              <a:rPr lang="en-US" sz="1400" dirty="0" smtClean="0">
+                <a:latin typeface="Consolas" pitchFamily="49" charset="0"/>
+                <a:cs typeface="Consolas" pitchFamily="49" charset="0"/>
+              </a:rPr>
+            </a:br>
+            <a:r>
+              <a:rPr lang="en-US" sz="1400" dirty="0" smtClean="0">
+                <a:latin typeface="Consolas" pitchFamily="49" charset="0"/>
+                <a:cs typeface="Consolas" pitchFamily="49" charset="0"/>
+              </a:rPr>
+              <a:t>}</a:t>
+            </a:r>
+          </a:p>
+        </p:txBody>
+      </p:sp>
+    </p:spTree>
+  </p:cSld>
+  <p:clrMapOvr>
+    <a:masterClrMapping/>
+  </p:clrMapOvr>
+  <p:transition>
+    <p:fade thruBlk="1"/>
+  </p:transition>
+</p:sld>
+</file>
+
+<file path=ppt/slides/slide4.xml><?xml version="1.0" encoding="utf-8"?>
+<p:sld xmlns:a="http://schemas.openxmlformats.org/drawingml/2006/main" xmlns:r="http://schemas.openxmlformats.org/officeDocument/2006/relationships" xmlns:p="http://schemas.openxmlformats.org/presentationml/2006/main">
+  <p:cSld>
+    <p:spTree>
+      <p:nvGrpSpPr>
+        <p:cNvPr id="1" name=""/>
+        <p:cNvGrpSpPr/>
+        <p:nvPr/>
+      </p:nvGrpSpPr>
+      <p:grpSpPr>
+        <a:xfrm>
+          <a:off x="0" y="0"/>
+          <a:ext cx="0" cy="0"/>
+          <a:chOff x="0" y="0"/>
+          <a:chExt cx="0" cy="0"/>
+        </a:xfrm>
+      </p:grpSpPr>
+      <p:sp>
+        <p:nvSpPr>
+          <p:cNvPr id="2" name="Title 1"/>
+          <p:cNvSpPr>
+            <a:spLocks noGrp="1"/>
+          </p:cNvSpPr>
+          <p:nvPr>
+            <p:ph type="title"/>
+          </p:nvPr>
+        </p:nvSpPr>
+        <p:spPr>
+          <a:xfrm>
+            <a:off x="321623" y="418905"/>
+            <a:ext cx="1904047" cy="307777"/>
+          </a:xfrm>
+        </p:spPr>
+        <p:txBody>
+          <a:bodyPr/>
+          <a:lstStyle/>
+          <a:p>
+            <a:r>
+              <a:rPr lang="nb-NO" dirty="0" smtClean="0"/>
+              <a:t>Hva er tdd?</a:t>
+            </a:r>
+            <a:endParaRPr lang="en-US" dirty="0"/>
+          </a:p>
+        </p:txBody>
+      </p:sp>
+      <p:sp>
+        <p:nvSpPr>
+          <p:cNvPr id="3" name="Slide Number Placeholder 2"/>
+          <p:cNvSpPr>
+            <a:spLocks noGrp="1"/>
+          </p:cNvSpPr>
+          <p:nvPr>
+            <p:ph type="sldNum" sz="quarter" idx="10"/>
+          </p:nvPr>
+        </p:nvSpPr>
+        <p:spPr/>
+        <p:txBody>
+          <a:bodyPr/>
+          <a:lstStyle/>
+          <a:p>
+            <a:fld id="{FF67BF5B-7344-D747-A0C2-CBD7B2ACBC85}" type="slidenum">
+              <a:rPr lang="en-US" smtClean="0"/>
+              <a:pPr/>
+              <a:t>4</a:t>
             </a:fld>
             <a:endParaRPr lang="en-US" dirty="0"/>
           </a:p>
@@ -19065,7 +19807,7 @@
 </p:sld>
 </file>
 
-<file path=ppt/slides/slide4.xml><?xml version="1.0" encoding="utf-8"?>
+<file path=ppt/slides/slide5.xml><?xml version="1.0" encoding="utf-8"?>
 <p:sld xmlns:a="http://schemas.openxmlformats.org/drawingml/2006/main" xmlns:r="http://schemas.openxmlformats.org/officeDocument/2006/relationships" xmlns:p="http://schemas.openxmlformats.org/presentationml/2006/main">
   <p:cSld>
     <p:spTree>
@@ -19095,7 +19837,7 @@
         <p:spPr>
           <a:xfrm>
             <a:off x="321623" y="418905"/>
-            <a:ext cx="1885453" cy="307777"/>
+            <a:ext cx="1898277" cy="307777"/>
           </a:xfrm>
         </p:spPr>
         <p:txBody>
@@ -19104,7 +19846,7 @@
           <a:p>
             <a:r>
               <a:rPr lang="nb-NO" dirty="0" smtClean="0"/>
-              <a:t>Enhetstest</a:t>
+              <a:t>Motivasjon</a:t>
             </a:r>
             <a:endParaRPr lang="en-US" dirty="0"/>
           </a:p>
@@ -19128,7 +19870,7 @@
             <a:fld id="{FF67BF5B-7344-D747-A0C2-CBD7B2ACBC85}" type="slidenum">
               <a:rPr lang="en-US" smtClean="0"/>
               <a:pPr/>
-              <a:t>4</a:t>
+              <a:t>5</a:t>
             </a:fld>
             <a:endParaRPr lang="en-US" dirty="0"/>
           </a:p>
@@ -19142,21 +19884,16 @@
         </p:nvSpPr>
         <p:spPr>
           <a:xfrm>
-            <a:off x="572423" y="1172845"/>
-            <a:ext cx="8158884" cy="1600438"/>
+            <a:off x="536448" y="1249700"/>
+            <a:ext cx="3988592" cy="1836400"/>
           </a:xfrm>
           <a:prstGeom prst="rect">
             <a:avLst/>
           </a:prstGeom>
           <a:noFill/>
-          <a:ln>
-            <a:solidFill>
-              <a:schemeClr val="accent2"/>
-            </a:solidFill>
-          </a:ln>
         </p:spPr>
         <p:txBody>
-          <a:bodyPr wrap="square" rtlCol="0">
+          <a:bodyPr wrap="none" rtlCol="0">
             <a:spAutoFit/>
           </a:bodyPr>
           <a:lstStyle/>
@@ -19168,250 +19905,14 @@
               <a:spcAft>
                 <a:spcPts val="400"/>
               </a:spcAft>
+              <a:buFont typeface="Wingdings" pitchFamily="2" charset="2"/>
+              <a:buChar char="ü"/>
             </a:pPr>
             <a:r>
-              <a:rPr lang="en-US" sz="1400" dirty="0" smtClean="0">
-                <a:solidFill>
-                  <a:srgbClr val="0000FF"/>
-                </a:solidFill>
-                <a:latin typeface="Consolas" pitchFamily="49" charset="0"/>
-                <a:cs typeface="Consolas" pitchFamily="49" charset="0"/>
-              </a:rPr>
-              <a:t>public</a:t>
-            </a:r>
-            <a:r>
-              <a:rPr lang="en-US" sz="1400" dirty="0" smtClean="0">
-                <a:latin typeface="Consolas" pitchFamily="49" charset="0"/>
-                <a:cs typeface="Consolas" pitchFamily="49" charset="0"/>
-              </a:rPr>
-              <a:t> </a:t>
-            </a:r>
-            <a:r>
-              <a:rPr lang="en-US" sz="1400" dirty="0" smtClean="0">
-                <a:solidFill>
-                  <a:srgbClr val="0000FF"/>
-                </a:solidFill>
-                <a:latin typeface="Consolas" pitchFamily="49" charset="0"/>
-                <a:cs typeface="Consolas" pitchFamily="49" charset="0"/>
-              </a:rPr>
-              <a:t>class</a:t>
-            </a:r>
-            <a:r>
-              <a:rPr lang="en-US" sz="1400" dirty="0" smtClean="0">
-                <a:latin typeface="Consolas" pitchFamily="49" charset="0"/>
-                <a:cs typeface="Consolas" pitchFamily="49" charset="0"/>
-              </a:rPr>
-              <a:t> </a:t>
-            </a:r>
-            <a:r>
-              <a:rPr lang="en-US" sz="1400" dirty="0" smtClean="0">
-                <a:solidFill>
-                  <a:srgbClr val="2B91AF"/>
-                </a:solidFill>
-                <a:latin typeface="Consolas" pitchFamily="49" charset="0"/>
-                <a:cs typeface="Consolas" pitchFamily="49" charset="0"/>
-              </a:rPr>
-              <a:t>Calculator</a:t>
-            </a:r>
-            <a:r>
-              <a:rPr lang="en-US" sz="1400" dirty="0" smtClean="0">
-                <a:latin typeface="Consolas" pitchFamily="49" charset="0"/>
-                <a:cs typeface="Consolas" pitchFamily="49" charset="0"/>
-              </a:rPr>
-              <a:t>     </a:t>
-            </a:r>
-            <a:br>
-              <a:rPr lang="en-US" sz="1400" dirty="0" smtClean="0">
-                <a:latin typeface="Consolas" pitchFamily="49" charset="0"/>
-                <a:cs typeface="Consolas" pitchFamily="49" charset="0"/>
-              </a:rPr>
-            </a:br>
-            <a:r>
-              <a:rPr lang="en-US" sz="1400" dirty="0" smtClean="0">
-                <a:latin typeface="Consolas" pitchFamily="49" charset="0"/>
-                <a:cs typeface="Consolas" pitchFamily="49" charset="0"/>
-              </a:rPr>
-              <a:t>{         </a:t>
-            </a:r>
-            <a:br>
-              <a:rPr lang="en-US" sz="1400" dirty="0" smtClean="0">
-                <a:latin typeface="Consolas" pitchFamily="49" charset="0"/>
-                <a:cs typeface="Consolas" pitchFamily="49" charset="0"/>
-              </a:rPr>
-            </a:br>
-            <a:r>
-              <a:rPr lang="en-US" sz="1400" dirty="0" smtClean="0">
-                <a:latin typeface="Consolas" pitchFamily="49" charset="0"/>
-                <a:cs typeface="Consolas" pitchFamily="49" charset="0"/>
-              </a:rPr>
-              <a:t>	</a:t>
-            </a:r>
-            <a:r>
-              <a:rPr lang="en-US" sz="1400" dirty="0" smtClean="0">
-                <a:solidFill>
-                  <a:srgbClr val="0000FF"/>
-                </a:solidFill>
-                <a:latin typeface="Consolas" pitchFamily="49" charset="0"/>
-                <a:cs typeface="Consolas" pitchFamily="49" charset="0"/>
-              </a:rPr>
-              <a:t>public</a:t>
-            </a:r>
-            <a:r>
-              <a:rPr lang="en-US" sz="1400" dirty="0" smtClean="0">
-                <a:latin typeface="Consolas" pitchFamily="49" charset="0"/>
-                <a:cs typeface="Consolas" pitchFamily="49" charset="0"/>
-              </a:rPr>
-              <a:t> </a:t>
-            </a:r>
-            <a:r>
-              <a:rPr lang="en-US" sz="1400" dirty="0" err="1" smtClean="0">
-                <a:solidFill>
-                  <a:srgbClr val="0000FF"/>
-                </a:solidFill>
-                <a:latin typeface="Consolas" pitchFamily="49" charset="0"/>
-                <a:cs typeface="Consolas" pitchFamily="49" charset="0"/>
-              </a:rPr>
-              <a:t>int</a:t>
-            </a:r>
-            <a:r>
-              <a:rPr lang="en-US" sz="1400" dirty="0" smtClean="0">
-                <a:latin typeface="Consolas" pitchFamily="49" charset="0"/>
-                <a:cs typeface="Consolas" pitchFamily="49" charset="0"/>
-              </a:rPr>
-              <a:t> Add(</a:t>
-            </a:r>
-            <a:r>
-              <a:rPr lang="en-US" sz="1400" dirty="0" err="1" smtClean="0">
-                <a:solidFill>
-                  <a:srgbClr val="0000FF"/>
-                </a:solidFill>
-                <a:latin typeface="Consolas" pitchFamily="49" charset="0"/>
-                <a:cs typeface="Consolas" pitchFamily="49" charset="0"/>
-              </a:rPr>
-              <a:t>int</a:t>
-            </a:r>
-            <a:r>
-              <a:rPr lang="en-US" sz="1400" dirty="0" smtClean="0">
-                <a:latin typeface="Consolas" pitchFamily="49" charset="0"/>
-                <a:cs typeface="Consolas" pitchFamily="49" charset="0"/>
-              </a:rPr>
-              <a:t> a, </a:t>
-            </a:r>
-            <a:r>
-              <a:rPr lang="en-US" sz="1400" dirty="0" err="1" smtClean="0">
-                <a:solidFill>
-                  <a:srgbClr val="0000FF"/>
-                </a:solidFill>
-                <a:latin typeface="Consolas" pitchFamily="49" charset="0"/>
-                <a:cs typeface="Consolas" pitchFamily="49" charset="0"/>
-              </a:rPr>
-              <a:t>int</a:t>
-            </a:r>
-            <a:r>
-              <a:rPr lang="en-US" sz="1400" dirty="0" smtClean="0">
-                <a:latin typeface="Consolas" pitchFamily="49" charset="0"/>
-                <a:cs typeface="Consolas" pitchFamily="49" charset="0"/>
-              </a:rPr>
-              <a:t> b)         </a:t>
-            </a:r>
-            <a:br>
-              <a:rPr lang="en-US" sz="1400" dirty="0" smtClean="0">
-                <a:latin typeface="Consolas" pitchFamily="49" charset="0"/>
-                <a:cs typeface="Consolas" pitchFamily="49" charset="0"/>
-              </a:rPr>
-            </a:br>
-            <a:r>
-              <a:rPr lang="en-US" sz="1400" dirty="0" smtClean="0">
-                <a:latin typeface="Consolas" pitchFamily="49" charset="0"/>
-                <a:cs typeface="Consolas" pitchFamily="49" charset="0"/>
-              </a:rPr>
-              <a:t>	{             </a:t>
-            </a:r>
-            <a:br>
-              <a:rPr lang="en-US" sz="1400" dirty="0" smtClean="0">
-                <a:latin typeface="Consolas" pitchFamily="49" charset="0"/>
-                <a:cs typeface="Consolas" pitchFamily="49" charset="0"/>
-              </a:rPr>
-            </a:br>
-            <a:r>
-              <a:rPr lang="en-US" sz="1400" dirty="0" smtClean="0">
-                <a:latin typeface="Consolas" pitchFamily="49" charset="0"/>
-                <a:cs typeface="Consolas" pitchFamily="49" charset="0"/>
-              </a:rPr>
-              <a:t>		</a:t>
-            </a:r>
-            <a:r>
-              <a:rPr lang="en-US" sz="1400" dirty="0" smtClean="0">
-                <a:solidFill>
-                  <a:srgbClr val="0000FF"/>
-                </a:solidFill>
-                <a:latin typeface="Consolas" pitchFamily="49" charset="0"/>
-                <a:cs typeface="Consolas" pitchFamily="49" charset="0"/>
-              </a:rPr>
-              <a:t>return</a:t>
-            </a:r>
-            <a:r>
-              <a:rPr lang="en-US" sz="1400" dirty="0" smtClean="0">
-                <a:latin typeface="Consolas" pitchFamily="49" charset="0"/>
-                <a:cs typeface="Consolas" pitchFamily="49" charset="0"/>
-              </a:rPr>
-              <a:t> a + b;         </a:t>
-            </a:r>
-            <a:br>
-              <a:rPr lang="en-US" sz="1400" dirty="0" smtClean="0">
-                <a:latin typeface="Consolas" pitchFamily="49" charset="0"/>
-                <a:cs typeface="Consolas" pitchFamily="49" charset="0"/>
-              </a:rPr>
-            </a:br>
-            <a:r>
-              <a:rPr lang="en-US" sz="1400" dirty="0" smtClean="0">
-                <a:latin typeface="Consolas" pitchFamily="49" charset="0"/>
-                <a:cs typeface="Consolas" pitchFamily="49" charset="0"/>
-              </a:rPr>
-              <a:t>	}     </a:t>
-            </a:r>
-            <a:br>
-              <a:rPr lang="en-US" sz="1400" dirty="0" smtClean="0">
-                <a:latin typeface="Consolas" pitchFamily="49" charset="0"/>
-                <a:cs typeface="Consolas" pitchFamily="49" charset="0"/>
-              </a:rPr>
-            </a:br>
-            <a:r>
-              <a:rPr lang="en-US" sz="1400" dirty="0" smtClean="0">
-                <a:latin typeface="Consolas" pitchFamily="49" charset="0"/>
-                <a:cs typeface="Consolas" pitchFamily="49" charset="0"/>
-              </a:rPr>
-              <a:t>}</a:t>
-            </a:r>
-          </a:p>
-        </p:txBody>
-      </p:sp>
-      <p:sp>
-        <p:nvSpPr>
-          <p:cNvPr id="6" name="TextBox 5"/>
-          <p:cNvSpPr txBox="1"/>
-          <p:nvPr/>
-        </p:nvSpPr>
-        <p:spPr>
-          <a:xfrm>
-            <a:off x="572423" y="3763663"/>
-            <a:ext cx="8158884" cy="2031325"/>
-          </a:xfrm>
-          <a:prstGeom prst="rect">
-            <a:avLst/>
-          </a:prstGeom>
-          <a:noFill/>
-          <a:ln>
-            <a:solidFill>
-              <a:schemeClr val="accent2"/>
-            </a:solidFill>
-          </a:ln>
-        </p:spPr>
-        <p:txBody>
-          <a:bodyPr wrap="square" rtlCol="0">
-            <a:spAutoFit/>
-          </a:bodyPr>
-          <a:lstStyle/>
+              <a:rPr lang="nb-NO" sz="1600" dirty="0" smtClean="0"/>
+              <a:t> lettere å finne feil</a:t>
+            </a:r>
+          </a:p>
           <a:p>
             <a:pPr>
               <a:spcBef>
@@ -19420,281 +19921,61 @@
               <a:spcAft>
                 <a:spcPts val="400"/>
               </a:spcAft>
+              <a:buFont typeface="Wingdings" pitchFamily="2" charset="2"/>
+              <a:buChar char="ü"/>
             </a:pPr>
             <a:r>
-              <a:rPr lang="en-US" sz="1400" dirty="0" smtClean="0">
-                <a:latin typeface="Consolas" pitchFamily="49" charset="0"/>
-                <a:cs typeface="Consolas" pitchFamily="49" charset="0"/>
-              </a:rPr>
-              <a:t>[</a:t>
-            </a:r>
-            <a:r>
-              <a:rPr lang="en-US" sz="1400" dirty="0" err="1" smtClean="0">
-                <a:solidFill>
-                  <a:srgbClr val="2B91AF"/>
-                </a:solidFill>
-                <a:latin typeface="Consolas" pitchFamily="49" charset="0"/>
-                <a:cs typeface="Consolas" pitchFamily="49" charset="0"/>
-              </a:rPr>
-              <a:t>TestMethod</a:t>
-            </a:r>
-            <a:r>
-              <a:rPr lang="en-US" sz="1400" dirty="0" smtClean="0">
-                <a:latin typeface="Consolas" pitchFamily="49" charset="0"/>
-                <a:cs typeface="Consolas" pitchFamily="49" charset="0"/>
-              </a:rPr>
-              <a:t>]         </a:t>
-            </a:r>
-            <a:br>
-              <a:rPr lang="en-US" sz="1400" dirty="0" smtClean="0">
-                <a:latin typeface="Consolas" pitchFamily="49" charset="0"/>
-                <a:cs typeface="Consolas" pitchFamily="49" charset="0"/>
-              </a:rPr>
-            </a:br>
-            <a:r>
-              <a:rPr lang="en-US" sz="1400" dirty="0" smtClean="0">
-                <a:solidFill>
-                  <a:srgbClr val="0000FF"/>
-                </a:solidFill>
-                <a:latin typeface="Consolas" pitchFamily="49" charset="0"/>
-                <a:cs typeface="Consolas" pitchFamily="49" charset="0"/>
-              </a:rPr>
-              <a:t>public</a:t>
-            </a:r>
-            <a:r>
-              <a:rPr lang="en-US" sz="1400" dirty="0" smtClean="0">
-                <a:latin typeface="Consolas" pitchFamily="49" charset="0"/>
-                <a:cs typeface="Consolas" pitchFamily="49" charset="0"/>
-              </a:rPr>
-              <a:t> </a:t>
-            </a:r>
-            <a:r>
-              <a:rPr lang="en-US" sz="1400" dirty="0" smtClean="0">
-                <a:solidFill>
-                  <a:srgbClr val="0000FF"/>
-                </a:solidFill>
-                <a:latin typeface="Consolas" pitchFamily="49" charset="0"/>
-                <a:cs typeface="Consolas" pitchFamily="49" charset="0"/>
-              </a:rPr>
-              <a:t>void</a:t>
-            </a:r>
-            <a:r>
-              <a:rPr lang="en-US" sz="1400" dirty="0" smtClean="0">
-                <a:latin typeface="Consolas" pitchFamily="49" charset="0"/>
-                <a:cs typeface="Consolas" pitchFamily="49" charset="0"/>
-              </a:rPr>
-              <a:t> </a:t>
-            </a:r>
-            <a:r>
-              <a:rPr lang="en-US" sz="1400" dirty="0" err="1" smtClean="0">
-                <a:latin typeface="Consolas" pitchFamily="49" charset="0"/>
-                <a:cs typeface="Consolas" pitchFamily="49" charset="0"/>
-              </a:rPr>
-              <a:t>Add_TwoNumbers_ReturnSumOfNumbers</a:t>
-            </a:r>
-            <a:r>
-              <a:rPr lang="en-US" sz="1400" dirty="0" smtClean="0">
-                <a:latin typeface="Consolas" pitchFamily="49" charset="0"/>
-                <a:cs typeface="Consolas" pitchFamily="49" charset="0"/>
-              </a:rPr>
-              <a:t>()         </a:t>
-            </a:r>
-            <a:br>
-              <a:rPr lang="en-US" sz="1400" dirty="0" smtClean="0">
-                <a:latin typeface="Consolas" pitchFamily="49" charset="0"/>
-                <a:cs typeface="Consolas" pitchFamily="49" charset="0"/>
-              </a:rPr>
-            </a:br>
-            <a:r>
-              <a:rPr lang="en-US" sz="1400" dirty="0" smtClean="0">
-                <a:latin typeface="Consolas" pitchFamily="49" charset="0"/>
-                <a:cs typeface="Consolas" pitchFamily="49" charset="0"/>
-              </a:rPr>
-              <a:t>{             </a:t>
-            </a:r>
-            <a:br>
-              <a:rPr lang="en-US" sz="1400" dirty="0" smtClean="0">
-                <a:latin typeface="Consolas" pitchFamily="49" charset="0"/>
-                <a:cs typeface="Consolas" pitchFamily="49" charset="0"/>
-              </a:rPr>
-            </a:br>
-            <a:r>
-              <a:rPr lang="en-US" sz="1400" dirty="0" smtClean="0">
-                <a:latin typeface="Consolas" pitchFamily="49" charset="0"/>
-                <a:cs typeface="Consolas" pitchFamily="49" charset="0"/>
-              </a:rPr>
-              <a:t>	</a:t>
-            </a:r>
-            <a:r>
-              <a:rPr lang="en-US" sz="1400" dirty="0" err="1" smtClean="0">
-                <a:solidFill>
-                  <a:srgbClr val="0000FF"/>
-                </a:solidFill>
-                <a:latin typeface="Consolas" pitchFamily="49" charset="0"/>
-                <a:cs typeface="Consolas" pitchFamily="49" charset="0"/>
-              </a:rPr>
-              <a:t>var</a:t>
-            </a:r>
-            <a:r>
-              <a:rPr lang="en-US" sz="1400" dirty="0" smtClean="0">
-                <a:latin typeface="Consolas" pitchFamily="49" charset="0"/>
-                <a:cs typeface="Consolas" pitchFamily="49" charset="0"/>
-              </a:rPr>
-              <a:t> calculator = </a:t>
-            </a:r>
-            <a:r>
-              <a:rPr lang="en-US" sz="1400" dirty="0" smtClean="0">
-                <a:solidFill>
-                  <a:srgbClr val="0000FF"/>
-                </a:solidFill>
-                <a:latin typeface="Consolas" pitchFamily="49" charset="0"/>
-                <a:cs typeface="Consolas" pitchFamily="49" charset="0"/>
-              </a:rPr>
-              <a:t>new</a:t>
-            </a:r>
-            <a:r>
-              <a:rPr lang="en-US" sz="1400" dirty="0" smtClean="0">
-                <a:latin typeface="Consolas" pitchFamily="49" charset="0"/>
-                <a:cs typeface="Consolas" pitchFamily="49" charset="0"/>
-              </a:rPr>
-              <a:t> </a:t>
-            </a:r>
-            <a:r>
-              <a:rPr lang="en-US" sz="1400" dirty="0" smtClean="0">
-                <a:solidFill>
-                  <a:srgbClr val="2B91AF"/>
-                </a:solidFill>
-                <a:latin typeface="Consolas" pitchFamily="49" charset="0"/>
-                <a:cs typeface="Consolas" pitchFamily="49" charset="0"/>
-              </a:rPr>
-              <a:t>Calculator</a:t>
-            </a:r>
-            <a:r>
-              <a:rPr lang="en-US" sz="1400" dirty="0" smtClean="0">
-                <a:latin typeface="Consolas" pitchFamily="49" charset="0"/>
-                <a:cs typeface="Consolas" pitchFamily="49" charset="0"/>
-              </a:rPr>
-              <a:t>();          </a:t>
-            </a:r>
-            <a:br>
-              <a:rPr lang="en-US" sz="1400" dirty="0" smtClean="0">
-                <a:latin typeface="Consolas" pitchFamily="49" charset="0"/>
-                <a:cs typeface="Consolas" pitchFamily="49" charset="0"/>
-              </a:rPr>
-            </a:br>
-            <a:r>
-              <a:rPr lang="en-US" sz="1400" dirty="0" smtClean="0">
-                <a:latin typeface="Consolas" pitchFamily="49" charset="0"/>
-                <a:cs typeface="Consolas" pitchFamily="49" charset="0"/>
-              </a:rPr>
-              <a:t/>
-            </a:r>
-            <a:br>
-              <a:rPr lang="en-US" sz="1400" dirty="0" smtClean="0">
-                <a:latin typeface="Consolas" pitchFamily="49" charset="0"/>
-                <a:cs typeface="Consolas" pitchFamily="49" charset="0"/>
-              </a:rPr>
-            </a:br>
-            <a:r>
-              <a:rPr lang="en-US" sz="1400" dirty="0" smtClean="0">
-                <a:latin typeface="Consolas" pitchFamily="49" charset="0"/>
-                <a:cs typeface="Consolas" pitchFamily="49" charset="0"/>
-              </a:rPr>
-              <a:t>	</a:t>
-            </a:r>
-            <a:r>
-              <a:rPr lang="en-US" sz="1400" dirty="0" err="1" smtClean="0">
-                <a:solidFill>
-                  <a:srgbClr val="0000FF"/>
-                </a:solidFill>
-                <a:latin typeface="Consolas" pitchFamily="49" charset="0"/>
-                <a:cs typeface="Consolas" pitchFamily="49" charset="0"/>
-              </a:rPr>
-              <a:t>var</a:t>
-            </a:r>
-            <a:r>
-              <a:rPr lang="en-US" sz="1400" dirty="0" smtClean="0">
-                <a:latin typeface="Consolas" pitchFamily="49" charset="0"/>
-                <a:cs typeface="Consolas" pitchFamily="49" charset="0"/>
-              </a:rPr>
-              <a:t> result = </a:t>
-            </a:r>
-            <a:r>
-              <a:rPr lang="en-US" sz="1400" dirty="0" err="1" smtClean="0">
-                <a:latin typeface="Consolas" pitchFamily="49" charset="0"/>
-                <a:cs typeface="Consolas" pitchFamily="49" charset="0"/>
-              </a:rPr>
-              <a:t>calculator.Add</a:t>
-            </a:r>
-            <a:r>
-              <a:rPr lang="en-US" sz="1400" dirty="0" smtClean="0">
-                <a:latin typeface="Consolas" pitchFamily="49" charset="0"/>
-                <a:cs typeface="Consolas" pitchFamily="49" charset="0"/>
-              </a:rPr>
-              <a:t>(1, 2);             </a:t>
-            </a:r>
-            <a:br>
-              <a:rPr lang="en-US" sz="1400" dirty="0" smtClean="0">
-                <a:latin typeface="Consolas" pitchFamily="49" charset="0"/>
-                <a:cs typeface="Consolas" pitchFamily="49" charset="0"/>
-              </a:rPr>
-            </a:br>
-            <a:r>
-              <a:rPr lang="en-US" sz="1400" dirty="0" smtClean="0">
-                <a:latin typeface="Consolas" pitchFamily="49" charset="0"/>
-                <a:cs typeface="Consolas" pitchFamily="49" charset="0"/>
-              </a:rPr>
-              <a:t/>
-            </a:r>
-            <a:br>
-              <a:rPr lang="en-US" sz="1400" dirty="0" smtClean="0">
-                <a:latin typeface="Consolas" pitchFamily="49" charset="0"/>
-                <a:cs typeface="Consolas" pitchFamily="49" charset="0"/>
-              </a:rPr>
-            </a:br>
-            <a:r>
-              <a:rPr lang="en-US" sz="1400" dirty="0" smtClean="0">
-                <a:latin typeface="Consolas" pitchFamily="49" charset="0"/>
-                <a:cs typeface="Consolas" pitchFamily="49" charset="0"/>
-              </a:rPr>
-              <a:t>	</a:t>
-            </a:r>
-            <a:r>
-              <a:rPr lang="en-US" sz="1400" dirty="0" err="1" smtClean="0">
-                <a:solidFill>
-                  <a:srgbClr val="2B91AF"/>
-                </a:solidFill>
-                <a:latin typeface="Consolas" pitchFamily="49" charset="0"/>
-                <a:cs typeface="Consolas" pitchFamily="49" charset="0"/>
-              </a:rPr>
-              <a:t>Assert</a:t>
-            </a:r>
-            <a:r>
-              <a:rPr lang="en-US" sz="1400" dirty="0" err="1" smtClean="0">
-                <a:latin typeface="Consolas" pitchFamily="49" charset="0"/>
-                <a:cs typeface="Consolas" pitchFamily="49" charset="0"/>
-              </a:rPr>
-              <a:t>.AreEqual</a:t>
-            </a:r>
-            <a:r>
-              <a:rPr lang="en-US" sz="1400" dirty="0" smtClean="0">
-                <a:latin typeface="Consolas" pitchFamily="49" charset="0"/>
-                <a:cs typeface="Consolas" pitchFamily="49" charset="0"/>
-              </a:rPr>
-              <a:t>(3, result);         </a:t>
-            </a:r>
-            <a:br>
-              <a:rPr lang="en-US" sz="1400" dirty="0" smtClean="0">
-                <a:latin typeface="Consolas" pitchFamily="49" charset="0"/>
-                <a:cs typeface="Consolas" pitchFamily="49" charset="0"/>
-              </a:rPr>
-            </a:br>
-            <a:r>
-              <a:rPr lang="en-US" sz="1400" dirty="0" smtClean="0">
-                <a:latin typeface="Consolas" pitchFamily="49" charset="0"/>
-                <a:cs typeface="Consolas" pitchFamily="49" charset="0"/>
-              </a:rPr>
-              <a:t>}</a:t>
+              <a:rPr lang="nb-NO" sz="1600" dirty="0" smtClean="0"/>
+              <a:t> lettere å vedlikeholde (hvis gjort riktig)</a:t>
+            </a:r>
+          </a:p>
+          <a:p>
+            <a:pPr>
+              <a:spcBef>
+                <a:spcPts val="600"/>
+              </a:spcBef>
+              <a:spcAft>
+                <a:spcPts val="400"/>
+              </a:spcAft>
+              <a:buFont typeface="Wingdings" pitchFamily="2" charset="2"/>
+              <a:buChar char="ü"/>
+            </a:pPr>
+            <a:r>
+              <a:rPr lang="nb-NO" sz="1600" dirty="0" smtClean="0"/>
+              <a:t> letter å forstå</a:t>
+            </a:r>
+          </a:p>
+          <a:p>
+            <a:pPr>
+              <a:spcBef>
+                <a:spcPts val="600"/>
+              </a:spcBef>
+              <a:spcAft>
+                <a:spcPts val="400"/>
+              </a:spcAft>
+              <a:buFont typeface="Wingdings" pitchFamily="2" charset="2"/>
+              <a:buChar char="ü"/>
+            </a:pPr>
+            <a:r>
+              <a:rPr lang="nb-NO" sz="1600" dirty="0" smtClean="0"/>
+              <a:t> lettere å utvikle</a:t>
+            </a:r>
+            <a:endParaRPr lang="en-US" sz="1600" dirty="0" err="1" smtClean="0"/>
+          </a:p>
+          <a:p>
+            <a:pPr>
+              <a:spcBef>
+                <a:spcPts val="600"/>
+              </a:spcBef>
+              <a:spcAft>
+                <a:spcPts val="400"/>
+              </a:spcAft>
+              <a:buFont typeface="Wingdings" pitchFamily="2" charset="2"/>
+              <a:buChar char="ü"/>
+            </a:pPr>
+            <a:r>
+              <a:rPr lang="nb-NO" sz="1600" dirty="0" smtClean="0"/>
+              <a:t> lettere å levere</a:t>
             </a:r>
           </a:p>
         </p:txBody>
@@ -19707,10 +19988,17 @@
   <p:transition>
     <p:fade thruBlk="1"/>
   </p:transition>
+  <p:timing>
+    <p:tnLst>
+      <p:par>
+        <p:cTn id="1" dur="indefinite" restart="never" nodeType="tmRoot"/>
+      </p:par>
+    </p:tnLst>
+  </p:timing>
 </p:sld>
 </file>
 
-<file path=ppt/slides/slide5.xml><?xml version="1.0" encoding="utf-8"?>
+<file path=ppt/slides/slide6.xml><?xml version="1.0" encoding="utf-8"?>
 <p:sld xmlns:a="http://schemas.openxmlformats.org/drawingml/2006/main" xmlns:r="http://schemas.openxmlformats.org/officeDocument/2006/relationships" xmlns:p="http://schemas.openxmlformats.org/presentationml/2006/main">
   <p:cSld>
     <p:spTree>
@@ -19773,7 +20061,7 @@
             <a:fld id="{FF67BF5B-7344-D747-A0C2-CBD7B2ACBC85}" type="slidenum">
               <a:rPr lang="en-US" smtClean="0"/>
               <a:pPr/>
-              <a:t>5</a:t>
+              <a:t>6</a:t>
             </a:fld>
             <a:endParaRPr lang="en-US" dirty="0"/>
           </a:p>
@@ -19986,197 +20274,6 @@
   <p:transition>
     <p:fade thruBlk="1"/>
   </p:transition>
-</p:sld>
-</file>
-
-<file path=ppt/slides/slide6.xml><?xml version="1.0" encoding="utf-8"?>
-<p:sld xmlns:a="http://schemas.openxmlformats.org/drawingml/2006/main" xmlns:r="http://schemas.openxmlformats.org/officeDocument/2006/relationships" xmlns:p="http://schemas.openxmlformats.org/presentationml/2006/main">
-  <p:cSld>
-    <p:spTree>
-      <p:nvGrpSpPr>
-        <p:cNvPr id="1" name=""/>
-        <p:cNvGrpSpPr/>
-        <p:nvPr/>
-      </p:nvGrpSpPr>
-      <p:grpSpPr>
-        <a:xfrm>
-          <a:off x="0" y="0"/>
-          <a:ext cx="0" cy="0"/>
-          <a:chOff x="0" y="0"/>
-          <a:chExt cx="0" cy="0"/>
-        </a:xfrm>
-      </p:grpSpPr>
-      <p:sp>
-        <p:nvSpPr>
-          <p:cNvPr id="2" name="Title 1"/>
-          <p:cNvSpPr>
-            <a:spLocks noGrp="1"/>
-          </p:cNvSpPr>
-          <p:nvPr>
-            <p:ph type="title"/>
-          </p:nvPr>
-        </p:nvSpPr>
-        <p:spPr>
-          <a:xfrm>
-            <a:off x="321623" y="418905"/>
-            <a:ext cx="1898277" cy="307777"/>
-          </a:xfrm>
-        </p:spPr>
-        <p:txBody>
-          <a:bodyPr/>
-          <a:lstStyle/>
-          <a:p>
-            <a:r>
-              <a:rPr lang="nb-NO" dirty="0" smtClean="0"/>
-              <a:t>Motivasjon</a:t>
-            </a:r>
-            <a:endParaRPr lang="en-US" dirty="0"/>
-          </a:p>
-        </p:txBody>
-      </p:sp>
-      <p:sp>
-        <p:nvSpPr>
-          <p:cNvPr id="3" name="Slide Number Placeholder 2"/>
-          <p:cNvSpPr>
-            <a:spLocks noGrp="1"/>
-          </p:cNvSpPr>
-          <p:nvPr>
-            <p:ph type="sldNum" sz="quarter" idx="10"/>
-          </p:nvPr>
-        </p:nvSpPr>
-        <p:spPr/>
-        <p:txBody>
-          <a:bodyPr/>
-          <a:lstStyle/>
-          <a:p>
-            <a:fld id="{FF67BF5B-7344-D747-A0C2-CBD7B2ACBC85}" type="slidenum">
-              <a:rPr lang="en-US" smtClean="0"/>
-              <a:pPr/>
-              <a:t>6</a:t>
-            </a:fld>
-            <a:endParaRPr lang="en-US" dirty="0"/>
-          </a:p>
-        </p:txBody>
-      </p:sp>
-      <p:sp>
-        <p:nvSpPr>
-          <p:cNvPr id="5" name="TextBox 4"/>
-          <p:cNvSpPr txBox="1"/>
-          <p:nvPr/>
-        </p:nvSpPr>
-        <p:spPr>
-          <a:xfrm>
-            <a:off x="536448" y="1249700"/>
-            <a:ext cx="3988592" cy="1836400"/>
-          </a:xfrm>
-          <a:prstGeom prst="rect">
-            <a:avLst/>
-          </a:prstGeom>
-          <a:noFill/>
-        </p:spPr>
-        <p:txBody>
-          <a:bodyPr wrap="none" rtlCol="0">
-            <a:spAutoFit/>
-          </a:bodyPr>
-          <a:lstStyle/>
-          <a:p>
-            <a:pPr>
-              <a:spcBef>
-                <a:spcPts val="600"/>
-              </a:spcBef>
-              <a:spcAft>
-                <a:spcPts val="400"/>
-              </a:spcAft>
-              <a:buFont typeface="Wingdings" pitchFamily="2" charset="2"/>
-              <a:buChar char="ü"/>
-            </a:pPr>
-            <a:r>
-              <a:rPr lang="nb-NO" sz="1600" dirty="0" smtClean="0"/>
-              <a:t> lettere å finne feil</a:t>
-            </a:r>
-          </a:p>
-          <a:p>
-            <a:pPr>
-              <a:spcBef>
-                <a:spcPts val="600"/>
-              </a:spcBef>
-              <a:spcAft>
-                <a:spcPts val="400"/>
-              </a:spcAft>
-              <a:buFont typeface="Wingdings" pitchFamily="2" charset="2"/>
-              <a:buChar char="ü"/>
-            </a:pPr>
-            <a:r>
-              <a:rPr lang="nb-NO" sz="1600" dirty="0" smtClean="0"/>
-              <a:t> lettere å vedlikeholde (hvis gjort riktig)</a:t>
-            </a:r>
-          </a:p>
-          <a:p>
-            <a:pPr>
-              <a:spcBef>
-                <a:spcPts val="600"/>
-              </a:spcBef>
-              <a:spcAft>
-                <a:spcPts val="400"/>
-              </a:spcAft>
-              <a:buFont typeface="Wingdings" pitchFamily="2" charset="2"/>
-              <a:buChar char="ü"/>
-            </a:pPr>
-            <a:r>
-              <a:rPr lang="nb-NO" sz="1600" dirty="0" smtClean="0"/>
-              <a:t> letter å forstå</a:t>
-            </a:r>
-          </a:p>
-          <a:p>
-            <a:pPr>
-              <a:spcBef>
-                <a:spcPts val="600"/>
-              </a:spcBef>
-              <a:spcAft>
-                <a:spcPts val="400"/>
-              </a:spcAft>
-              <a:buFont typeface="Wingdings" pitchFamily="2" charset="2"/>
-              <a:buChar char="ü"/>
-            </a:pPr>
-            <a:r>
-              <a:rPr lang="nb-NO" sz="1600" dirty="0" smtClean="0"/>
-              <a:t> lettere å utvikle</a:t>
-            </a:r>
-            <a:endParaRPr lang="en-US" sz="1600" dirty="0" err="1" smtClean="0"/>
-          </a:p>
-          <a:p>
-            <a:pPr>
-              <a:spcBef>
-                <a:spcPts val="600"/>
-              </a:spcBef>
-              <a:spcAft>
-                <a:spcPts val="400"/>
-              </a:spcAft>
-              <a:buFont typeface="Wingdings" pitchFamily="2" charset="2"/>
-              <a:buChar char="ü"/>
-            </a:pPr>
-            <a:r>
-              <a:rPr lang="nb-NO" sz="1600" dirty="0" smtClean="0"/>
-              <a:t> lettere å levere</a:t>
-            </a:r>
-          </a:p>
-        </p:txBody>
-      </p:sp>
-    </p:spTree>
-  </p:cSld>
-  <p:clrMapOvr>
-    <a:masterClrMapping/>
-  </p:clrMapOvr>
-  <p:transition>
-    <p:fade thruBlk="1"/>
-  </p:transition>
-  <p:timing>
-    <p:tnLst>
-      <p:par>
-        <p:cTn id="1" dur="indefinite" restart="never" nodeType="tmRoot"/>
-      </p:par>
-    </p:tnLst>
-  </p:timing>
 </p:sld>
 </file>
 

</xml_diff>

<commit_message>
Corrected an error in slidedeck
</commit_message>
<xml_diff>
--- a/tdd/TDD.pptx
+++ b/tdd/TDD.pptx
@@ -3115,7 +3115,7 @@
     </p:spTree>
     <p:extLst>
       <p:ext uri="{BB962C8B-B14F-4D97-AF65-F5344CB8AC3E}">
-        <p14:creationId xmlns="" xmlns:p14="http://schemas.microsoft.com/office/powerpoint/2010/main" val="2280443481"/>
+        <p14:creationId xmlns:p14="http://schemas.microsoft.com/office/powerpoint/2010/main" xmlns="" val="2280443481"/>
       </p:ext>
     </p:extLst>
   </p:cSld>
@@ -3285,7 +3285,7 @@
     </p:spTree>
     <p:extLst>
       <p:ext uri="{BB962C8B-B14F-4D97-AF65-F5344CB8AC3E}">
-        <p14:creationId xmlns="" xmlns:p14="http://schemas.microsoft.com/office/powerpoint/2010/main" val="1996866432"/>
+        <p14:creationId xmlns:p14="http://schemas.microsoft.com/office/powerpoint/2010/main" xmlns="" val="1996866432"/>
       </p:ext>
     </p:extLst>
   </p:cSld>
@@ -4747,7 +4747,7 @@
     </p:spTree>
     <p:extLst>
       <p:ext uri="{BB962C8B-B14F-4D97-AF65-F5344CB8AC3E}">
-        <p14:creationId xmlns="" xmlns:p14="http://schemas.microsoft.com/office/powerpoint/2010/main" val="1631701370"/>
+        <p14:creationId xmlns:p14="http://schemas.microsoft.com/office/powerpoint/2010/main" xmlns="" val="1631701370"/>
       </p:ext>
     </p:extLst>
   </p:cSld>
@@ -5068,7 +5068,7 @@
     </p:spTree>
     <p:extLst>
       <p:ext uri="{BB962C8B-B14F-4D97-AF65-F5344CB8AC3E}">
-        <p14:creationId xmlns="" xmlns:p14="http://schemas.microsoft.com/office/powerpoint/2010/main" val="2627694574"/>
+        <p14:creationId xmlns:p14="http://schemas.microsoft.com/office/powerpoint/2010/main" xmlns="" val="2627694574"/>
       </p:ext>
     </p:extLst>
   </p:cSld>
@@ -5387,7 +5387,7 @@
     </p:spTree>
     <p:extLst>
       <p:ext uri="{BB962C8B-B14F-4D97-AF65-F5344CB8AC3E}">
-        <p14:creationId xmlns="" xmlns:p14="http://schemas.microsoft.com/office/powerpoint/2010/main" val="2472564093"/>
+        <p14:creationId xmlns:p14="http://schemas.microsoft.com/office/powerpoint/2010/main" xmlns="" val="2472564093"/>
       </p:ext>
     </p:extLst>
   </p:cSld>
@@ -5872,7 +5872,7 @@
     </p:spTree>
     <p:extLst>
       <p:ext uri="{BB962C8B-B14F-4D97-AF65-F5344CB8AC3E}">
-        <p14:creationId xmlns="" xmlns:p14="http://schemas.microsoft.com/office/powerpoint/2010/main" val="844442129"/>
+        <p14:creationId xmlns:p14="http://schemas.microsoft.com/office/powerpoint/2010/main" xmlns="" val="844442129"/>
       </p:ext>
     </p:extLst>
   </p:cSld>
@@ -6202,7 +6202,7 @@
     </p:spTree>
     <p:extLst>
       <p:ext uri="{BB962C8B-B14F-4D97-AF65-F5344CB8AC3E}">
-        <p14:creationId xmlns="" xmlns:p14="http://schemas.microsoft.com/office/powerpoint/2010/main" val="1607786633"/>
+        <p14:creationId xmlns:p14="http://schemas.microsoft.com/office/powerpoint/2010/main" xmlns="" val="1607786633"/>
       </p:ext>
     </p:extLst>
   </p:cSld>
@@ -6532,7 +6532,7 @@
     </p:spTree>
     <p:extLst>
       <p:ext uri="{BB962C8B-B14F-4D97-AF65-F5344CB8AC3E}">
-        <p14:creationId xmlns="" xmlns:p14="http://schemas.microsoft.com/office/powerpoint/2010/main" val="3400319444"/>
+        <p14:creationId xmlns:p14="http://schemas.microsoft.com/office/powerpoint/2010/main" xmlns="" val="3400319444"/>
       </p:ext>
     </p:extLst>
   </p:cSld>
@@ -8402,7 +8402,7 @@
     </p:spTree>
     <p:extLst>
       <p:ext uri="{BB962C8B-B14F-4D97-AF65-F5344CB8AC3E}">
-        <p14:creationId xmlns="" xmlns:p14="http://schemas.microsoft.com/office/powerpoint/2010/main" val="1273682958"/>
+        <p14:creationId xmlns:p14="http://schemas.microsoft.com/office/powerpoint/2010/main" xmlns="" val="1273682958"/>
       </p:ext>
     </p:extLst>
   </p:cSld>
@@ -8507,7 +8507,7 @@
     </p:spTree>
     <p:extLst>
       <p:ext uri="{BB962C8B-B14F-4D97-AF65-F5344CB8AC3E}">
-        <p14:creationId xmlns="" xmlns:p14="http://schemas.microsoft.com/office/powerpoint/2010/main" val="3654216826"/>
+        <p14:creationId xmlns:p14="http://schemas.microsoft.com/office/powerpoint/2010/main" xmlns="" val="3654216826"/>
       </p:ext>
     </p:extLst>
   </p:cSld>
@@ -8763,7 +8763,7 @@
     </p:spTree>
     <p:extLst>
       <p:ext uri="{BB962C8B-B14F-4D97-AF65-F5344CB8AC3E}">
-        <p14:creationId xmlns="" xmlns:p14="http://schemas.microsoft.com/office/powerpoint/2010/main" val="2837040887"/>
+        <p14:creationId xmlns:p14="http://schemas.microsoft.com/office/powerpoint/2010/main" xmlns="" val="2837040887"/>
       </p:ext>
     </p:extLst>
   </p:cSld>
@@ -8796,7 +8796,7 @@
     </p:spTree>
     <p:extLst>
       <p:ext uri="{BB962C8B-B14F-4D97-AF65-F5344CB8AC3E}">
-        <p14:creationId xmlns="" xmlns:p14="http://schemas.microsoft.com/office/powerpoint/2010/main" val="3283581558"/>
+        <p14:creationId xmlns:p14="http://schemas.microsoft.com/office/powerpoint/2010/main" xmlns="" val="3283581558"/>
       </p:ext>
     </p:extLst>
   </p:cSld>
@@ -9110,7 +9110,7 @@
     </p:spTree>
     <p:extLst>
       <p:ext uri="{BB962C8B-B14F-4D97-AF65-F5344CB8AC3E}">
-        <p14:creationId xmlns="" xmlns:p14="http://schemas.microsoft.com/office/powerpoint/2010/main" val="3151533342"/>
+        <p14:creationId xmlns:p14="http://schemas.microsoft.com/office/powerpoint/2010/main" xmlns="" val="3151533342"/>
       </p:ext>
     </p:extLst>
   </p:cSld>
@@ -9253,7 +9253,7 @@
     </p:spTree>
     <p:extLst>
       <p:ext uri="{BB962C8B-B14F-4D97-AF65-F5344CB8AC3E}">
-        <p14:creationId xmlns="" xmlns:p14="http://schemas.microsoft.com/office/powerpoint/2010/main" val="894352273"/>
+        <p14:creationId xmlns:p14="http://schemas.microsoft.com/office/powerpoint/2010/main" xmlns="" val="894352273"/>
       </p:ext>
     </p:extLst>
   </p:cSld>
@@ -9419,7 +9419,7 @@
     </p:spTree>
     <p:extLst>
       <p:ext uri="{BB962C8B-B14F-4D97-AF65-F5344CB8AC3E}">
-        <p14:creationId xmlns="" xmlns:p14="http://schemas.microsoft.com/office/powerpoint/2010/main" val="351067674"/>
+        <p14:creationId xmlns:p14="http://schemas.microsoft.com/office/powerpoint/2010/main" xmlns="" val="351067674"/>
       </p:ext>
     </p:extLst>
   </p:cSld>
@@ -9739,7 +9739,7 @@
     </p:spTree>
     <p:extLst>
       <p:ext uri="{BB962C8B-B14F-4D97-AF65-F5344CB8AC3E}">
-        <p14:creationId xmlns="" xmlns:p14="http://schemas.microsoft.com/office/powerpoint/2010/main" val="3938044995"/>
+        <p14:creationId xmlns:p14="http://schemas.microsoft.com/office/powerpoint/2010/main" xmlns="" val="3938044995"/>
       </p:ext>
     </p:extLst>
   </p:cSld>
@@ -10325,7 +10325,7 @@
     </p:spTree>
     <p:extLst>
       <p:ext uri="{BB962C8B-B14F-4D97-AF65-F5344CB8AC3E}">
-        <p14:creationId xmlns="" xmlns:p14="http://schemas.microsoft.com/office/powerpoint/2010/main" val="3192118728"/>
+        <p14:creationId xmlns:p14="http://schemas.microsoft.com/office/powerpoint/2010/main" xmlns="" val="3192118728"/>
       </p:ext>
     </p:extLst>
   </p:cSld>
@@ -10723,7 +10723,7 @@
     </p:spTree>
     <p:extLst>
       <p:ext uri="{BB962C8B-B14F-4D97-AF65-F5344CB8AC3E}">
-        <p14:creationId xmlns="" xmlns:p14="http://schemas.microsoft.com/office/powerpoint/2010/main" val="2190527855"/>
+        <p14:creationId xmlns:p14="http://schemas.microsoft.com/office/powerpoint/2010/main" xmlns="" val="2190527855"/>
       </p:ext>
     </p:extLst>
   </p:cSld>
@@ -11520,7 +11520,7 @@
     </p:spTree>
     <p:extLst>
       <p:ext uri="{BB962C8B-B14F-4D97-AF65-F5344CB8AC3E}">
-        <p14:creationId xmlns="" xmlns:p14="http://schemas.microsoft.com/office/powerpoint/2010/main" val="69886873"/>
+        <p14:creationId xmlns:p14="http://schemas.microsoft.com/office/powerpoint/2010/main" xmlns="" val="69886873"/>
       </p:ext>
     </p:extLst>
   </p:cSld>
@@ -12611,7 +12611,7 @@
     </p:spTree>
     <p:extLst>
       <p:ext uri="{BB962C8B-B14F-4D97-AF65-F5344CB8AC3E}">
-        <p14:creationId xmlns="" xmlns:p14="http://schemas.microsoft.com/office/powerpoint/2010/main" val="593901232"/>
+        <p14:creationId xmlns:p14="http://schemas.microsoft.com/office/powerpoint/2010/main" xmlns="" val="593901232"/>
       </p:ext>
     </p:extLst>
   </p:cSld>
@@ -12867,7 +12867,7 @@
     </p:spTree>
     <p:extLst>
       <p:ext uri="{BB962C8B-B14F-4D97-AF65-F5344CB8AC3E}">
-        <p14:creationId xmlns="" xmlns:p14="http://schemas.microsoft.com/office/powerpoint/2010/main" val="925662914"/>
+        <p14:creationId xmlns:p14="http://schemas.microsoft.com/office/powerpoint/2010/main" xmlns="" val="925662914"/>
       </p:ext>
     </p:extLst>
   </p:cSld>
@@ -13109,7 +13109,7 @@
     </p:spTree>
     <p:extLst>
       <p:ext uri="{BB962C8B-B14F-4D97-AF65-F5344CB8AC3E}">
-        <p14:creationId xmlns="" xmlns:p14="http://schemas.microsoft.com/office/powerpoint/2010/main" val="2463004899"/>
+        <p14:creationId xmlns:p14="http://schemas.microsoft.com/office/powerpoint/2010/main" xmlns="" val="2463004899"/>
       </p:ext>
     </p:extLst>
   </p:cSld>
@@ -13463,11 +13463,7 @@
             </a:br>
             <a:r>
               <a:rPr lang="nb-NO" dirty="0" smtClean="0"/>
-              <a:t>Testdrevet </a:t>
-            </a:r>
-            <a:r>
-              <a:rPr lang="nb-NO" dirty="0" smtClean="0"/>
-              <a:t>utvikling (TDD) i .net</a:t>
+              <a:t>Testdrevet utvikling (TDD) i .net</a:t>
             </a:r>
             <a:endParaRPr lang="en-US" dirty="0"/>
           </a:p>
@@ -13545,7 +13541,7 @@
     </p:spTree>
     <p:extLst>
       <p:ext uri="{BB962C8B-B14F-4D97-AF65-F5344CB8AC3E}">
-        <p14:creationId xmlns="" xmlns:p14="http://schemas.microsoft.com/office/powerpoint/2010/main" val="1193520387"/>
+        <p14:creationId xmlns:p14="http://schemas.microsoft.com/office/powerpoint/2010/main" xmlns="" val="1193520387"/>
       </p:ext>
     </p:extLst>
   </p:cSld>
@@ -14815,15 +14811,7 @@
                   <a:schemeClr val="bg1"/>
                 </a:solidFill>
               </a:rPr>
-              <a:t>Oppgave </a:t>
-            </a:r>
-            <a:r>
-              <a:rPr lang="nb-NO" dirty="0" smtClean="0">
-                <a:solidFill>
-                  <a:schemeClr val="bg1"/>
-                </a:solidFill>
-              </a:rPr>
-              <a:t>3</a:t>
+              <a:t>Oppgave 3</a:t>
             </a:r>
             <a:endParaRPr lang="en-US" dirty="0">
               <a:solidFill>
@@ -15058,15 +15046,7 @@
                   <a:schemeClr val="bg1"/>
                 </a:solidFill>
               </a:rPr>
-              <a:t>Oppgave </a:t>
-            </a:r>
-            <a:r>
-              <a:rPr lang="nb-NO" dirty="0" smtClean="0">
-                <a:solidFill>
-                  <a:schemeClr val="bg1"/>
-                </a:solidFill>
-              </a:rPr>
-              <a:t>4</a:t>
+              <a:t>Oppgave 4</a:t>
             </a:r>
             <a:endParaRPr lang="en-US" dirty="0">
               <a:solidFill>
@@ -16437,7 +16417,7 @@
             </a:r>
             <a:r>
               <a:rPr lang="nb-NO" sz="1050" i="1" dirty="0" smtClean="0"/>
-              <a:t>KlasseMedAvhengighet</a:t>
+              <a:t>KonkretAvhengighet</a:t>
             </a:r>
             <a:endParaRPr lang="en-US" sz="1050" i="1" dirty="0" err="1" smtClean="0"/>
           </a:p>
@@ -18383,7 +18363,7 @@
     </p:spTree>
     <p:extLst>
       <p:ext uri="{BB962C8B-B14F-4D97-AF65-F5344CB8AC3E}">
-        <p14:creationId xmlns:p14="http://schemas.microsoft.com/office/powerpoint/2010/main" xmlns="" val="1013825328"/>
+        <p14:creationId xmlns="" xmlns:p14="http://schemas.microsoft.com/office/powerpoint/2010/main" val="1013825328"/>
       </p:ext>
     </p:extLst>
   </p:cSld>
@@ -18506,11 +18486,7 @@
             </a:pPr>
             <a:r>
               <a:rPr lang="nb-NO" sz="1400" dirty="0" smtClean="0"/>
-              <a:t> </a:t>
-            </a:r>
-            <a:r>
-              <a:rPr lang="nb-NO" sz="1400" dirty="0" smtClean="0"/>
-              <a:t>Enhetstesting</a:t>
+              <a:t> Enhetstesting</a:t>
             </a:r>
           </a:p>
           <a:p>
@@ -18526,13 +18502,8 @@
             </a:pPr>
             <a:r>
               <a:rPr lang="nb-NO" sz="1400" dirty="0" smtClean="0"/>
-              <a:t> </a:t>
-            </a:r>
-            <a:r>
-              <a:rPr lang="nb-NO" sz="1400" dirty="0" smtClean="0"/>
-              <a:t>Hva er TDD?</a:t>
-            </a:r>
-            <a:endParaRPr lang="nb-NO" sz="1400" dirty="0" smtClean="0"/>
+              <a:t> Hva er TDD?</a:t>
+            </a:r>
           </a:p>
           <a:p>
             <a:pPr>

</xml_diff>

<commit_message>
Added more info om dependency injection
</commit_message>
<xml_diff>
--- a/tdd/TDD.pptx
+++ b/tdd/TDD.pptx
@@ -3115,7 +3115,7 @@
     </p:spTree>
     <p:extLst>
       <p:ext uri="{BB962C8B-B14F-4D97-AF65-F5344CB8AC3E}">
-        <p14:creationId xmlns:p14="http://schemas.microsoft.com/office/powerpoint/2010/main" xmlns="" val="2280443481"/>
+        <p14:creationId xmlns="" xmlns:p14="http://schemas.microsoft.com/office/powerpoint/2010/main" val="2280443481"/>
       </p:ext>
     </p:extLst>
   </p:cSld>
@@ -3285,7 +3285,7 @@
     </p:spTree>
     <p:extLst>
       <p:ext uri="{BB962C8B-B14F-4D97-AF65-F5344CB8AC3E}">
-        <p14:creationId xmlns:p14="http://schemas.microsoft.com/office/powerpoint/2010/main" xmlns="" val="1996866432"/>
+        <p14:creationId xmlns="" xmlns:p14="http://schemas.microsoft.com/office/powerpoint/2010/main" val="1996866432"/>
       </p:ext>
     </p:extLst>
   </p:cSld>
@@ -4236,7 +4236,19 @@
           <a:p>
             <a:r>
               <a:rPr lang="nb-NO" baseline="0" dirty="0" smtClean="0"/>
-              <a:t>Med StringCalculator fra TDD KATA 2 der Parser bør injectes</a:t>
+              <a:t>Med StringCalculator fra TDD KATA 2 der Parser bør </a:t>
+            </a:r>
+            <a:r>
+              <a:rPr lang="nb-NO" baseline="0" dirty="0" smtClean="0"/>
+              <a:t>injectes</a:t>
+            </a:r>
+          </a:p>
+          <a:p>
+            <a:r>
+              <a:rPr lang="en-US" dirty="0" smtClean="0">
+                <a:hlinkClick r:id="rId3"/>
+              </a:rPr>
+              <a:t>http://martinfowler.com/articles/injection.html#FormsOfDependencyInjection</a:t>
             </a:r>
             <a:endParaRPr lang="en-US" dirty="0"/>
           </a:p>
@@ -4747,7 +4759,7 @@
     </p:spTree>
     <p:extLst>
       <p:ext uri="{BB962C8B-B14F-4D97-AF65-F5344CB8AC3E}">
-        <p14:creationId xmlns:p14="http://schemas.microsoft.com/office/powerpoint/2010/main" xmlns="" val="1631701370"/>
+        <p14:creationId xmlns="" xmlns:p14="http://schemas.microsoft.com/office/powerpoint/2010/main" val="1631701370"/>
       </p:ext>
     </p:extLst>
   </p:cSld>
@@ -5068,7 +5080,7 @@
     </p:spTree>
     <p:extLst>
       <p:ext uri="{BB962C8B-B14F-4D97-AF65-F5344CB8AC3E}">
-        <p14:creationId xmlns:p14="http://schemas.microsoft.com/office/powerpoint/2010/main" xmlns="" val="2627694574"/>
+        <p14:creationId xmlns="" xmlns:p14="http://schemas.microsoft.com/office/powerpoint/2010/main" val="2627694574"/>
       </p:ext>
     </p:extLst>
   </p:cSld>
@@ -5387,7 +5399,7 @@
     </p:spTree>
     <p:extLst>
       <p:ext uri="{BB962C8B-B14F-4D97-AF65-F5344CB8AC3E}">
-        <p14:creationId xmlns:p14="http://schemas.microsoft.com/office/powerpoint/2010/main" xmlns="" val="2472564093"/>
+        <p14:creationId xmlns="" xmlns:p14="http://schemas.microsoft.com/office/powerpoint/2010/main" val="2472564093"/>
       </p:ext>
     </p:extLst>
   </p:cSld>
@@ -5872,7 +5884,7 @@
     </p:spTree>
     <p:extLst>
       <p:ext uri="{BB962C8B-B14F-4D97-AF65-F5344CB8AC3E}">
-        <p14:creationId xmlns:p14="http://schemas.microsoft.com/office/powerpoint/2010/main" xmlns="" val="844442129"/>
+        <p14:creationId xmlns="" xmlns:p14="http://schemas.microsoft.com/office/powerpoint/2010/main" val="844442129"/>
       </p:ext>
     </p:extLst>
   </p:cSld>
@@ -6202,7 +6214,7 @@
     </p:spTree>
     <p:extLst>
       <p:ext uri="{BB962C8B-B14F-4D97-AF65-F5344CB8AC3E}">
-        <p14:creationId xmlns:p14="http://schemas.microsoft.com/office/powerpoint/2010/main" xmlns="" val="1607786633"/>
+        <p14:creationId xmlns="" xmlns:p14="http://schemas.microsoft.com/office/powerpoint/2010/main" val="1607786633"/>
       </p:ext>
     </p:extLst>
   </p:cSld>
@@ -6532,7 +6544,7 @@
     </p:spTree>
     <p:extLst>
       <p:ext uri="{BB962C8B-B14F-4D97-AF65-F5344CB8AC3E}">
-        <p14:creationId xmlns:p14="http://schemas.microsoft.com/office/powerpoint/2010/main" xmlns="" val="3400319444"/>
+        <p14:creationId xmlns="" xmlns:p14="http://schemas.microsoft.com/office/powerpoint/2010/main" val="3400319444"/>
       </p:ext>
     </p:extLst>
   </p:cSld>
@@ -8402,7 +8414,7 @@
     </p:spTree>
     <p:extLst>
       <p:ext uri="{BB962C8B-B14F-4D97-AF65-F5344CB8AC3E}">
-        <p14:creationId xmlns:p14="http://schemas.microsoft.com/office/powerpoint/2010/main" xmlns="" val="1273682958"/>
+        <p14:creationId xmlns="" xmlns:p14="http://schemas.microsoft.com/office/powerpoint/2010/main" val="1273682958"/>
       </p:ext>
     </p:extLst>
   </p:cSld>
@@ -8507,7 +8519,7 @@
     </p:spTree>
     <p:extLst>
       <p:ext uri="{BB962C8B-B14F-4D97-AF65-F5344CB8AC3E}">
-        <p14:creationId xmlns:p14="http://schemas.microsoft.com/office/powerpoint/2010/main" xmlns="" val="3654216826"/>
+        <p14:creationId xmlns="" xmlns:p14="http://schemas.microsoft.com/office/powerpoint/2010/main" val="3654216826"/>
       </p:ext>
     </p:extLst>
   </p:cSld>
@@ -8763,7 +8775,7 @@
     </p:spTree>
     <p:extLst>
       <p:ext uri="{BB962C8B-B14F-4D97-AF65-F5344CB8AC3E}">
-        <p14:creationId xmlns:p14="http://schemas.microsoft.com/office/powerpoint/2010/main" xmlns="" val="2837040887"/>
+        <p14:creationId xmlns="" xmlns:p14="http://schemas.microsoft.com/office/powerpoint/2010/main" val="2837040887"/>
       </p:ext>
     </p:extLst>
   </p:cSld>
@@ -8796,7 +8808,7 @@
     </p:spTree>
     <p:extLst>
       <p:ext uri="{BB962C8B-B14F-4D97-AF65-F5344CB8AC3E}">
-        <p14:creationId xmlns:p14="http://schemas.microsoft.com/office/powerpoint/2010/main" xmlns="" val="3283581558"/>
+        <p14:creationId xmlns="" xmlns:p14="http://schemas.microsoft.com/office/powerpoint/2010/main" val="3283581558"/>
       </p:ext>
     </p:extLst>
   </p:cSld>
@@ -9110,7 +9122,7 @@
     </p:spTree>
     <p:extLst>
       <p:ext uri="{BB962C8B-B14F-4D97-AF65-F5344CB8AC3E}">
-        <p14:creationId xmlns:p14="http://schemas.microsoft.com/office/powerpoint/2010/main" xmlns="" val="3151533342"/>
+        <p14:creationId xmlns="" xmlns:p14="http://schemas.microsoft.com/office/powerpoint/2010/main" val="3151533342"/>
       </p:ext>
     </p:extLst>
   </p:cSld>
@@ -9253,7 +9265,7 @@
     </p:spTree>
     <p:extLst>
       <p:ext uri="{BB962C8B-B14F-4D97-AF65-F5344CB8AC3E}">
-        <p14:creationId xmlns:p14="http://schemas.microsoft.com/office/powerpoint/2010/main" xmlns="" val="894352273"/>
+        <p14:creationId xmlns="" xmlns:p14="http://schemas.microsoft.com/office/powerpoint/2010/main" val="894352273"/>
       </p:ext>
     </p:extLst>
   </p:cSld>
@@ -9419,7 +9431,7 @@
     </p:spTree>
     <p:extLst>
       <p:ext uri="{BB962C8B-B14F-4D97-AF65-F5344CB8AC3E}">
-        <p14:creationId xmlns:p14="http://schemas.microsoft.com/office/powerpoint/2010/main" xmlns="" val="351067674"/>
+        <p14:creationId xmlns="" xmlns:p14="http://schemas.microsoft.com/office/powerpoint/2010/main" val="351067674"/>
       </p:ext>
     </p:extLst>
   </p:cSld>
@@ -9739,7 +9751,7 @@
     </p:spTree>
     <p:extLst>
       <p:ext uri="{BB962C8B-B14F-4D97-AF65-F5344CB8AC3E}">
-        <p14:creationId xmlns:p14="http://schemas.microsoft.com/office/powerpoint/2010/main" xmlns="" val="3938044995"/>
+        <p14:creationId xmlns="" xmlns:p14="http://schemas.microsoft.com/office/powerpoint/2010/main" val="3938044995"/>
       </p:ext>
     </p:extLst>
   </p:cSld>
@@ -10325,7 +10337,7 @@
     </p:spTree>
     <p:extLst>
       <p:ext uri="{BB962C8B-B14F-4D97-AF65-F5344CB8AC3E}">
-        <p14:creationId xmlns:p14="http://schemas.microsoft.com/office/powerpoint/2010/main" xmlns="" val="3192118728"/>
+        <p14:creationId xmlns="" xmlns:p14="http://schemas.microsoft.com/office/powerpoint/2010/main" val="3192118728"/>
       </p:ext>
     </p:extLst>
   </p:cSld>
@@ -10723,7 +10735,7 @@
     </p:spTree>
     <p:extLst>
       <p:ext uri="{BB962C8B-B14F-4D97-AF65-F5344CB8AC3E}">
-        <p14:creationId xmlns:p14="http://schemas.microsoft.com/office/powerpoint/2010/main" xmlns="" val="2190527855"/>
+        <p14:creationId xmlns="" xmlns:p14="http://schemas.microsoft.com/office/powerpoint/2010/main" val="2190527855"/>
       </p:ext>
     </p:extLst>
   </p:cSld>
@@ -11520,7 +11532,7 @@
     </p:spTree>
     <p:extLst>
       <p:ext uri="{BB962C8B-B14F-4D97-AF65-F5344CB8AC3E}">
-        <p14:creationId xmlns:p14="http://schemas.microsoft.com/office/powerpoint/2010/main" xmlns="" val="69886873"/>
+        <p14:creationId xmlns="" xmlns:p14="http://schemas.microsoft.com/office/powerpoint/2010/main" val="69886873"/>
       </p:ext>
     </p:extLst>
   </p:cSld>
@@ -12611,7 +12623,7 @@
     </p:spTree>
     <p:extLst>
       <p:ext uri="{BB962C8B-B14F-4D97-AF65-F5344CB8AC3E}">
-        <p14:creationId xmlns:p14="http://schemas.microsoft.com/office/powerpoint/2010/main" xmlns="" val="593901232"/>
+        <p14:creationId xmlns="" xmlns:p14="http://schemas.microsoft.com/office/powerpoint/2010/main" val="593901232"/>
       </p:ext>
     </p:extLst>
   </p:cSld>
@@ -12867,7 +12879,7 @@
     </p:spTree>
     <p:extLst>
       <p:ext uri="{BB962C8B-B14F-4D97-AF65-F5344CB8AC3E}">
-        <p14:creationId xmlns:p14="http://schemas.microsoft.com/office/powerpoint/2010/main" xmlns="" val="925662914"/>
+        <p14:creationId xmlns="" xmlns:p14="http://schemas.microsoft.com/office/powerpoint/2010/main" val="925662914"/>
       </p:ext>
     </p:extLst>
   </p:cSld>
@@ -13109,7 +13121,7 @@
     </p:spTree>
     <p:extLst>
       <p:ext uri="{BB962C8B-B14F-4D97-AF65-F5344CB8AC3E}">
-        <p14:creationId xmlns:p14="http://schemas.microsoft.com/office/powerpoint/2010/main" xmlns="" val="2463004899"/>
+        <p14:creationId xmlns="" xmlns:p14="http://schemas.microsoft.com/office/powerpoint/2010/main" val="2463004899"/>
       </p:ext>
     </p:extLst>
   </p:cSld>
@@ -13541,7 +13553,7 @@
     </p:spTree>
     <p:extLst>
       <p:ext uri="{BB962C8B-B14F-4D97-AF65-F5344CB8AC3E}">
-        <p14:creationId xmlns:p14="http://schemas.microsoft.com/office/powerpoint/2010/main" xmlns="" val="1193520387"/>
+        <p14:creationId xmlns="" xmlns:p14="http://schemas.microsoft.com/office/powerpoint/2010/main" val="1193520387"/>
       </p:ext>
     </p:extLst>
   </p:cSld>
@@ -15820,6 +15832,146 @@
           </a:fontRef>
         </p:style>
       </p:cxnSp>
+      <p:sp>
+        <p:nvSpPr>
+          <p:cNvPr id="13" name="TextBox 12"/>
+          <p:cNvSpPr txBox="1"/>
+          <p:nvPr/>
+        </p:nvSpPr>
+        <p:spPr>
+          <a:xfrm>
+            <a:off x="490807" y="877824"/>
+            <a:ext cx="8240500" cy="338554"/>
+          </a:xfrm>
+          <a:prstGeom prst="rect">
+            <a:avLst/>
+          </a:prstGeom>
+          <a:noFill/>
+        </p:spPr>
+        <p:txBody>
+          <a:bodyPr wrap="square" rtlCol="0">
+            <a:spAutoFit/>
+          </a:bodyPr>
+          <a:lstStyle/>
+          <a:p>
+            <a:pPr>
+              <a:spcBef>
+                <a:spcPts val="600"/>
+              </a:spcBef>
+              <a:spcAft>
+                <a:spcPts val="400"/>
+              </a:spcAft>
+            </a:pPr>
+            <a:r>
+              <a:rPr lang="nb-NO" sz="1600" dirty="0" smtClean="0"/>
+              <a:t>Send objekter inn i en klasse i stedet for at klassen selv er ansvarlig for å opprette disse</a:t>
+            </a:r>
+            <a:endParaRPr lang="nb-NO" sz="1600" dirty="0" smtClean="0"/>
+          </a:p>
+        </p:txBody>
+      </p:sp>
+      <p:sp>
+        <p:nvSpPr>
+          <p:cNvPr id="14" name="TextBox 13"/>
+          <p:cNvSpPr txBox="1"/>
+          <p:nvPr/>
+        </p:nvSpPr>
+        <p:spPr>
+          <a:xfrm>
+            <a:off x="490807" y="4970208"/>
+            <a:ext cx="4301731" cy="1708160"/>
+          </a:xfrm>
+          <a:prstGeom prst="rect">
+            <a:avLst/>
+          </a:prstGeom>
+          <a:noFill/>
+        </p:spPr>
+        <p:txBody>
+          <a:bodyPr wrap="square" rtlCol="0">
+            <a:spAutoFit/>
+          </a:bodyPr>
+          <a:lstStyle/>
+          <a:p>
+            <a:pPr>
+              <a:spcBef>
+                <a:spcPts val="600"/>
+              </a:spcBef>
+              <a:spcAft>
+                <a:spcPts val="400"/>
+              </a:spcAft>
+            </a:pPr>
+            <a:r>
+              <a:rPr lang="nb-NO" sz="1600" dirty="0" smtClean="0"/>
+              <a:t>Tre typer:</a:t>
+            </a:r>
+            <a:r>
+              <a:rPr lang="nb-NO" sz="1600" dirty="0" smtClean="0"/>
+              <a:t/>
+            </a:r>
+            <a:br>
+              <a:rPr lang="nb-NO" sz="1600" dirty="0" smtClean="0"/>
+            </a:br>
+            <a:endParaRPr lang="nb-NO" sz="1600" dirty="0" smtClean="0"/>
+          </a:p>
+          <a:p>
+            <a:pPr marL="342900" indent="-342900">
+              <a:spcBef>
+                <a:spcPts val="600"/>
+              </a:spcBef>
+              <a:spcAft>
+                <a:spcPts val="400"/>
+              </a:spcAft>
+              <a:buFont typeface="+mj-lt"/>
+              <a:buAutoNum type="alphaLcPeriod"/>
+            </a:pPr>
+            <a:r>
+              <a:rPr lang="nb-NO" sz="1600" dirty="0" smtClean="0"/>
+              <a:t> </a:t>
+            </a:r>
+            <a:r>
+              <a:rPr lang="nb-NO" sz="1600" dirty="0" smtClean="0"/>
+              <a:t>Constructor injection</a:t>
+            </a:r>
+          </a:p>
+          <a:p>
+            <a:pPr marL="342900" indent="-342900">
+              <a:spcBef>
+                <a:spcPts val="600"/>
+              </a:spcBef>
+              <a:spcAft>
+                <a:spcPts val="400"/>
+              </a:spcAft>
+              <a:buFont typeface="+mj-lt"/>
+              <a:buAutoNum type="alphaLcPeriod"/>
+            </a:pPr>
+            <a:r>
+              <a:rPr lang="nb-NO" sz="1600" dirty="0" smtClean="0"/>
+              <a:t> Property injection</a:t>
+            </a:r>
+          </a:p>
+          <a:p>
+            <a:pPr marL="342900" indent="-342900">
+              <a:spcBef>
+                <a:spcPts val="600"/>
+              </a:spcBef>
+              <a:spcAft>
+                <a:spcPts val="400"/>
+              </a:spcAft>
+              <a:buFont typeface="+mj-lt"/>
+              <a:buAutoNum type="alphaLcPeriod"/>
+            </a:pPr>
+            <a:r>
+              <a:rPr lang="nb-NO" sz="1600" dirty="0" smtClean="0"/>
+              <a:t> </a:t>
+            </a:r>
+            <a:r>
+              <a:rPr lang="nb-NO" sz="1600" dirty="0" smtClean="0"/>
+              <a:t>Interface injection</a:t>
+            </a:r>
+            <a:endParaRPr lang="nb-NO" sz="1100" dirty="0" smtClean="0"/>
+          </a:p>
+        </p:txBody>
+      </p:sp>
     </p:spTree>
   </p:cSld>
   <p:clrMapOvr>
@@ -15861,7 +16013,7 @@
         <p:spPr>
           <a:xfrm>
             <a:off x="321623" y="418905"/>
-            <a:ext cx="1321516" cy="307777"/>
+            <a:ext cx="1386598" cy="307777"/>
           </a:xfrm>
         </p:spPr>
         <p:txBody>
@@ -15870,7 +16022,7 @@
           <a:p>
             <a:r>
               <a:rPr lang="nb-NO" dirty="0" smtClean="0"/>
-              <a:t>Ninject</a:t>
+              <a:t>Ninject </a:t>
             </a:r>
             <a:endParaRPr lang="en-US" dirty="0"/>
           </a:p>
@@ -18363,7 +18515,7 @@
     </p:spTree>
     <p:extLst>
       <p:ext uri="{BB962C8B-B14F-4D97-AF65-F5344CB8AC3E}">
-        <p14:creationId xmlns="" xmlns:p14="http://schemas.microsoft.com/office/powerpoint/2010/main" val="1013825328"/>
+        <p14:creationId xmlns:p14="http://schemas.microsoft.com/office/powerpoint/2010/main" xmlns="" val="1013825328"/>
       </p:ext>
     </p:extLst>
   </p:cSld>

</xml_diff>

<commit_message>
Modified slides and added TDDInventory
</commit_message>
<xml_diff>
--- a/tdd/TDD.pptx
+++ b/tdd/TDD.pptx
@@ -1266,437 +1266,6 @@
       <dsp:cNvGrpSpPr/>
     </dsp:nvGrpSpPr>
     <dsp:grpSpPr/>
-    <dsp:sp modelId="{089AE9DB-14A9-49BB-9CB4-C28E756D777C}">
-      <dsp:nvSpPr>
-        <dsp:cNvPr id="0" name=""/>
-        <dsp:cNvSpPr/>
-      </dsp:nvSpPr>
-      <dsp:spPr>
-        <a:xfrm>
-          <a:off x="1374925" y="501235"/>
-          <a:ext cx="3346149" cy="3346149"/>
-        </a:xfrm>
-        <a:prstGeom prst="blockArc">
-          <a:avLst>
-            <a:gd name="adj1" fmla="val 9000000"/>
-            <a:gd name="adj2" fmla="val 16200000"/>
-            <a:gd name="adj3" fmla="val 4636"/>
-          </a:avLst>
-        </a:prstGeom>
-        <a:solidFill>
-          <a:schemeClr val="accent1">
-            <a:tint val="60000"/>
-            <a:hueOff val="0"/>
-            <a:satOff val="0"/>
-            <a:lumOff val="0"/>
-            <a:alphaOff val="0"/>
-          </a:schemeClr>
-        </a:solidFill>
-        <a:ln>
-          <a:noFill/>
-        </a:ln>
-        <a:effectLst/>
-      </dsp:spPr>
-      <dsp:style>
-        <a:lnRef idx="0">
-          <a:scrgbClr r="0" g="0" b="0"/>
-        </a:lnRef>
-        <a:fillRef idx="1">
-          <a:scrgbClr r="0" g="0" b="0"/>
-        </a:fillRef>
-        <a:effectRef idx="0">
-          <a:scrgbClr r="0" g="0" b="0"/>
-        </a:effectRef>
-        <a:fontRef idx="minor">
-          <a:schemeClr val="lt1"/>
-        </a:fontRef>
-      </dsp:style>
-    </dsp:sp>
-    <dsp:sp modelId="{96CD68C4-F273-448A-A352-D323FD822264}">
-      <dsp:nvSpPr>
-        <dsp:cNvPr id="0" name=""/>
-        <dsp:cNvSpPr/>
-      </dsp:nvSpPr>
-      <dsp:spPr>
-        <a:xfrm>
-          <a:off x="1374925" y="501235"/>
-          <a:ext cx="3346149" cy="3346149"/>
-        </a:xfrm>
-        <a:prstGeom prst="blockArc">
-          <a:avLst>
-            <a:gd name="adj1" fmla="val 1800000"/>
-            <a:gd name="adj2" fmla="val 9000000"/>
-            <a:gd name="adj3" fmla="val 4636"/>
-          </a:avLst>
-        </a:prstGeom>
-        <a:solidFill>
-          <a:schemeClr val="accent1">
-            <a:tint val="60000"/>
-            <a:hueOff val="0"/>
-            <a:satOff val="0"/>
-            <a:lumOff val="0"/>
-            <a:alphaOff val="0"/>
-          </a:schemeClr>
-        </a:solidFill>
-        <a:ln>
-          <a:noFill/>
-        </a:ln>
-        <a:effectLst/>
-      </dsp:spPr>
-      <dsp:style>
-        <a:lnRef idx="0">
-          <a:scrgbClr r="0" g="0" b="0"/>
-        </a:lnRef>
-        <a:fillRef idx="1">
-          <a:scrgbClr r="0" g="0" b="0"/>
-        </a:fillRef>
-        <a:effectRef idx="0">
-          <a:scrgbClr r="0" g="0" b="0"/>
-        </a:effectRef>
-        <a:fontRef idx="minor">
-          <a:schemeClr val="lt1"/>
-        </a:fontRef>
-      </dsp:style>
-    </dsp:sp>
-    <dsp:sp modelId="{53192C4C-FA77-4B54-8DE6-EF6B6ADF10C9}">
-      <dsp:nvSpPr>
-        <dsp:cNvPr id="0" name=""/>
-        <dsp:cNvSpPr/>
-      </dsp:nvSpPr>
-      <dsp:spPr>
-        <a:xfrm>
-          <a:off x="1374925" y="501235"/>
-          <a:ext cx="3346149" cy="3346149"/>
-        </a:xfrm>
-        <a:prstGeom prst="blockArc">
-          <a:avLst>
-            <a:gd name="adj1" fmla="val 16200000"/>
-            <a:gd name="adj2" fmla="val 1800000"/>
-            <a:gd name="adj3" fmla="val 4636"/>
-          </a:avLst>
-        </a:prstGeom>
-        <a:solidFill>
-          <a:schemeClr val="accent1">
-            <a:tint val="60000"/>
-            <a:hueOff val="0"/>
-            <a:satOff val="0"/>
-            <a:lumOff val="0"/>
-            <a:alphaOff val="0"/>
-          </a:schemeClr>
-        </a:solidFill>
-        <a:ln>
-          <a:noFill/>
-        </a:ln>
-        <a:effectLst/>
-      </dsp:spPr>
-      <dsp:style>
-        <a:lnRef idx="0">
-          <a:scrgbClr r="0" g="0" b="0"/>
-        </a:lnRef>
-        <a:fillRef idx="1">
-          <a:scrgbClr r="0" g="0" b="0"/>
-        </a:fillRef>
-        <a:effectRef idx="0">
-          <a:scrgbClr r="0" g="0" b="0"/>
-        </a:effectRef>
-        <a:fontRef idx="minor">
-          <a:schemeClr val="lt1"/>
-        </a:fontRef>
-      </dsp:style>
-    </dsp:sp>
-    <dsp:sp modelId="{68E54C23-65A6-417B-BB46-FF81834F1824}">
-      <dsp:nvSpPr>
-        <dsp:cNvPr id="0" name=""/>
-        <dsp:cNvSpPr/>
-      </dsp:nvSpPr>
-      <dsp:spPr>
-        <a:xfrm>
-          <a:off x="2278558" y="1404868"/>
-          <a:ext cx="1538882" cy="1538882"/>
-        </a:xfrm>
-        <a:prstGeom prst="ellipse">
-          <a:avLst/>
-        </a:prstGeom>
-        <a:solidFill>
-          <a:schemeClr val="accent1">
-            <a:hueOff val="0"/>
-            <a:satOff val="0"/>
-            <a:lumOff val="0"/>
-            <a:alphaOff val="0"/>
-          </a:schemeClr>
-        </a:solidFill>
-        <a:ln w="25400" cap="flat" cmpd="sng" algn="ctr">
-          <a:solidFill>
-            <a:schemeClr val="lt1">
-              <a:hueOff val="0"/>
-              <a:satOff val="0"/>
-              <a:lumOff val="0"/>
-              <a:alphaOff val="0"/>
-            </a:schemeClr>
-          </a:solidFill>
-          <a:prstDash val="solid"/>
-        </a:ln>
-        <a:effectLst/>
-      </dsp:spPr>
-      <dsp:style>
-        <a:lnRef idx="2">
-          <a:scrgbClr r="0" g="0" b="0"/>
-        </a:lnRef>
-        <a:fillRef idx="1">
-          <a:scrgbClr r="0" g="0" b="0"/>
-        </a:fillRef>
-        <a:effectRef idx="0">
-          <a:scrgbClr r="0" g="0" b="0"/>
-        </a:effectRef>
-        <a:fontRef idx="minor">
-          <a:schemeClr val="lt1"/>
-        </a:fontRef>
-      </dsp:style>
-      <dsp:txBody>
-        <a:bodyPr spcFirstLastPara="0" vert="horz" wrap="square" lIns="45720" tIns="45720" rIns="45720" bIns="45720" numCol="1" spcCol="1270" anchor="ctr" anchorCtr="0">
-          <a:noAutofit/>
-        </a:bodyPr>
-        <a:lstStyle/>
-        <a:p>
-          <a:pPr lvl="0" algn="ctr" defTabSz="1600200">
-            <a:lnSpc>
-              <a:spcPct val="90000"/>
-            </a:lnSpc>
-            <a:spcBef>
-              <a:spcPct val="0"/>
-            </a:spcBef>
-            <a:spcAft>
-              <a:spcPct val="35000"/>
-            </a:spcAft>
-          </a:pPr>
-          <a:r>
-            <a:rPr lang="nb-NO" sz="3600" kern="1200" dirty="0" smtClean="0"/>
-            <a:t>TDD</a:t>
-          </a:r>
-          <a:endParaRPr lang="en-US" sz="3600" kern="1200" dirty="0"/>
-        </a:p>
-      </dsp:txBody>
-      <dsp:txXfrm>
-        <a:off x="2503922" y="1630232"/>
-        <a:ext cx="1088154" cy="1088154"/>
-      </dsp:txXfrm>
-    </dsp:sp>
-    <dsp:sp modelId="{65E5E0BE-F6A3-4EED-B47C-ECAB02B21921}">
-      <dsp:nvSpPr>
-        <dsp:cNvPr id="0" name=""/>
-        <dsp:cNvSpPr/>
-      </dsp:nvSpPr>
-      <dsp:spPr>
-        <a:xfrm>
-          <a:off x="2509391" y="1406"/>
-          <a:ext cx="1077217" cy="1077217"/>
-        </a:xfrm>
-        <a:prstGeom prst="ellipse">
-          <a:avLst/>
-        </a:prstGeom>
-        <a:solidFill>
-          <a:srgbClr val="B70F0F"/>
-        </a:solidFill>
-        <a:ln w="25400" cap="flat" cmpd="sng" algn="ctr">
-          <a:solidFill>
-            <a:schemeClr val="lt1">
-              <a:hueOff val="0"/>
-              <a:satOff val="0"/>
-              <a:lumOff val="0"/>
-              <a:alphaOff val="0"/>
-            </a:schemeClr>
-          </a:solidFill>
-          <a:prstDash val="solid"/>
-        </a:ln>
-        <a:effectLst/>
-      </dsp:spPr>
-      <dsp:style>
-        <a:lnRef idx="2">
-          <a:scrgbClr r="0" g="0" b="0"/>
-        </a:lnRef>
-        <a:fillRef idx="1">
-          <a:scrgbClr r="0" g="0" b="0"/>
-        </a:fillRef>
-        <a:effectRef idx="0">
-          <a:scrgbClr r="0" g="0" b="0"/>
-        </a:effectRef>
-        <a:fontRef idx="minor">
-          <a:schemeClr val="lt1"/>
-        </a:fontRef>
-      </dsp:style>
-      <dsp:txBody>
-        <a:bodyPr spcFirstLastPara="0" vert="horz" wrap="square" lIns="13970" tIns="13970" rIns="13970" bIns="13970" numCol="1" spcCol="1270" anchor="ctr" anchorCtr="0">
-          <a:noAutofit/>
-        </a:bodyPr>
-        <a:lstStyle/>
-        <a:p>
-          <a:pPr lvl="0" algn="ctr" defTabSz="488950">
-            <a:lnSpc>
-              <a:spcPct val="90000"/>
-            </a:lnSpc>
-            <a:spcBef>
-              <a:spcPct val="0"/>
-            </a:spcBef>
-            <a:spcAft>
-              <a:spcPct val="35000"/>
-            </a:spcAft>
-          </a:pPr>
-          <a:r>
-            <a:rPr lang="nb-NO" sz="1100" kern="1200" dirty="0" smtClean="0"/>
-            <a:t>Skriv test som feiler</a:t>
-          </a:r>
-          <a:endParaRPr lang="en-US" sz="1100" kern="1200" dirty="0"/>
-        </a:p>
-      </dsp:txBody>
-      <dsp:txXfrm>
-        <a:off x="2667146" y="159161"/>
-        <a:ext cx="761707" cy="761707"/>
-      </dsp:txXfrm>
-    </dsp:sp>
-    <dsp:sp modelId="{18CF15E1-84D7-4DD4-B663-A409C36D6BFE}">
-      <dsp:nvSpPr>
-        <dsp:cNvPr id="0" name=""/>
-        <dsp:cNvSpPr/>
-      </dsp:nvSpPr>
-      <dsp:spPr>
-        <a:xfrm>
-          <a:off x="3924731" y="2452848"/>
-          <a:ext cx="1077217" cy="1077217"/>
-        </a:xfrm>
-        <a:prstGeom prst="ellipse">
-          <a:avLst/>
-        </a:prstGeom>
-        <a:solidFill>
-          <a:srgbClr val="548343"/>
-        </a:solidFill>
-        <a:ln w="25400" cap="flat" cmpd="sng" algn="ctr">
-          <a:solidFill>
-            <a:schemeClr val="lt1">
-              <a:hueOff val="0"/>
-              <a:satOff val="0"/>
-              <a:lumOff val="0"/>
-              <a:alphaOff val="0"/>
-            </a:schemeClr>
-          </a:solidFill>
-          <a:prstDash val="solid"/>
-        </a:ln>
-        <a:effectLst/>
-      </dsp:spPr>
-      <dsp:style>
-        <a:lnRef idx="2">
-          <a:scrgbClr r="0" g="0" b="0"/>
-        </a:lnRef>
-        <a:fillRef idx="1">
-          <a:scrgbClr r="0" g="0" b="0"/>
-        </a:fillRef>
-        <a:effectRef idx="0">
-          <a:scrgbClr r="0" g="0" b="0"/>
-        </a:effectRef>
-        <a:fontRef idx="minor">
-          <a:schemeClr val="lt1"/>
-        </a:fontRef>
-      </dsp:style>
-      <dsp:txBody>
-        <a:bodyPr spcFirstLastPara="0" vert="horz" wrap="square" lIns="13970" tIns="13970" rIns="13970" bIns="13970" numCol="1" spcCol="1270" anchor="ctr" anchorCtr="0">
-          <a:noAutofit/>
-        </a:bodyPr>
-        <a:lstStyle/>
-        <a:p>
-          <a:pPr lvl="0" algn="ctr" defTabSz="488950">
-            <a:lnSpc>
-              <a:spcPct val="90000"/>
-            </a:lnSpc>
-            <a:spcBef>
-              <a:spcPct val="0"/>
-            </a:spcBef>
-            <a:spcAft>
-              <a:spcPct val="35000"/>
-            </a:spcAft>
-          </a:pPr>
-          <a:r>
-            <a:rPr lang="nb-NO" sz="1100" kern="1200" dirty="0" smtClean="0"/>
-            <a:t>Få testen til å passere</a:t>
-          </a:r>
-          <a:endParaRPr lang="en-US" sz="1100" kern="1200" dirty="0"/>
-        </a:p>
-      </dsp:txBody>
-      <dsp:txXfrm>
-        <a:off x="4082486" y="2610603"/>
-        <a:ext cx="761707" cy="761707"/>
-      </dsp:txXfrm>
-    </dsp:sp>
-    <dsp:sp modelId="{A81E7EBA-B912-49B8-8000-0BF35D90809A}">
-      <dsp:nvSpPr>
-        <dsp:cNvPr id="0" name=""/>
-        <dsp:cNvSpPr/>
-      </dsp:nvSpPr>
-      <dsp:spPr>
-        <a:xfrm>
-          <a:off x="1094050" y="2452848"/>
-          <a:ext cx="1077217" cy="1077217"/>
-        </a:xfrm>
-        <a:prstGeom prst="ellipse">
-          <a:avLst/>
-        </a:prstGeom>
-        <a:solidFill>
-          <a:srgbClr val="F2B948"/>
-        </a:solidFill>
-        <a:ln w="25400" cap="flat" cmpd="sng" algn="ctr">
-          <a:solidFill>
-            <a:schemeClr val="lt1">
-              <a:hueOff val="0"/>
-              <a:satOff val="0"/>
-              <a:lumOff val="0"/>
-              <a:alphaOff val="0"/>
-            </a:schemeClr>
-          </a:solidFill>
-          <a:prstDash val="solid"/>
-        </a:ln>
-        <a:effectLst/>
-      </dsp:spPr>
-      <dsp:style>
-        <a:lnRef idx="2">
-          <a:scrgbClr r="0" g="0" b="0"/>
-        </a:lnRef>
-        <a:fillRef idx="1">
-          <a:scrgbClr r="0" g="0" b="0"/>
-        </a:fillRef>
-        <a:effectRef idx="0">
-          <a:scrgbClr r="0" g="0" b="0"/>
-        </a:effectRef>
-        <a:fontRef idx="minor">
-          <a:schemeClr val="lt1"/>
-        </a:fontRef>
-      </dsp:style>
-      <dsp:txBody>
-        <a:bodyPr spcFirstLastPara="0" vert="horz" wrap="square" lIns="13970" tIns="13970" rIns="13970" bIns="13970" numCol="1" spcCol="1270" anchor="ctr" anchorCtr="0">
-          <a:noAutofit/>
-        </a:bodyPr>
-        <a:lstStyle/>
-        <a:p>
-          <a:pPr lvl="0" algn="ctr" defTabSz="488950">
-            <a:lnSpc>
-              <a:spcPct val="90000"/>
-            </a:lnSpc>
-            <a:spcBef>
-              <a:spcPct val="0"/>
-            </a:spcBef>
-            <a:spcAft>
-              <a:spcPct val="35000"/>
-            </a:spcAft>
-          </a:pPr>
-          <a:r>
-            <a:rPr lang="nb-NO" sz="1100" kern="1200" dirty="0" smtClean="0"/>
-            <a:t>Foreta strukturelle endringer</a:t>
-          </a:r>
-          <a:endParaRPr lang="en-US" sz="1100" kern="1200" dirty="0"/>
-        </a:p>
-      </dsp:txBody>
-      <dsp:txXfrm>
-        <a:off x="1251805" y="2610603"/>
-        <a:ext cx="761707" cy="761707"/>
-      </dsp:txXfrm>
-    </dsp:sp>
   </dsp:spTree>
 </dsp:drawing>
 </file>
@@ -13891,11 +13460,7 @@
             </a:br>
             <a:r>
               <a:rPr lang="nb-NO" dirty="0" smtClean="0"/>
-              <a:t>Espen </a:t>
-            </a:r>
-            <a:r>
-              <a:rPr lang="nb-NO" dirty="0" smtClean="0"/>
-              <a:t>Ekvang</a:t>
+              <a:t>Espen Ekvang</a:t>
             </a:r>
             <a:endParaRPr lang="en-US" dirty="0"/>
           </a:p>
@@ -14058,7 +13623,7 @@
         <p:spPr>
           <a:xfrm>
             <a:off x="773723" y="1341070"/>
-            <a:ext cx="7957584" cy="1846659"/>
+            <a:ext cx="7957584" cy="4555093"/>
           </a:xfrm>
           <a:prstGeom prst="rect">
             <a:avLst/>
@@ -14079,41 +13644,7 @@
                   <a:schemeClr val="bg1"/>
                 </a:solidFill>
               </a:rPr>
-              <a:t>Gjennomfør TDD Kataen som er laget av Roy Osherove (</a:t>
-            </a:r>
-            <a:r>
-              <a:rPr lang="nb-NO" sz="2000" u="sng" dirty="0" smtClean="0">
-                <a:solidFill>
-                  <a:schemeClr val="bg1"/>
-                </a:solidFill>
-                <a:hlinkClick r:id="rId2"/>
-              </a:rPr>
-              <a:t>http://osherove.com/</a:t>
-            </a:r>
-            <a:r>
-              <a:rPr lang="nb-NO" sz="2000" dirty="0" smtClean="0">
-                <a:solidFill>
-                  <a:schemeClr val="bg1"/>
-                </a:solidFill>
-              </a:rPr>
-              <a:t>) som finnes </a:t>
-            </a:r>
-            <a:r>
-              <a:rPr lang="nb-NO" sz="2000" u="sng" dirty="0" smtClean="0">
-                <a:solidFill>
-                  <a:schemeClr val="bg1"/>
-                </a:solidFill>
-                <a:hlinkClick r:id="rId3"/>
-              </a:rPr>
-              <a:t>her.</a:t>
-            </a:r>
-            <a:r>
-              <a:rPr lang="nb-NO" sz="2000" dirty="0" smtClean="0">
-                <a:solidFill>
-                  <a:schemeClr val="bg1"/>
-                </a:solidFill>
-              </a:rPr>
-              <a:t> </a:t>
+              <a:t>Gjennomfør TDD Kataen som er laget av Roy Osherove. </a:t>
             </a:r>
           </a:p>
           <a:p>
@@ -14130,9 +13661,96 @@
                   <a:schemeClr val="bg1"/>
                 </a:solidFill>
               </a:rPr>
-              <a:t>Kataen går på å implementere en String Calculator, løs èn og èn av oppgavene, prøv å ikke ”se fremover”.</a:t>
-            </a:r>
-            <a:endParaRPr lang="en-US" sz="2000" dirty="0" smtClean="0">
+              <a:t>Kataen </a:t>
+            </a:r>
+            <a:r>
+              <a:rPr lang="nb-NO" sz="2000" dirty="0">
+                <a:solidFill>
+                  <a:schemeClr val="bg1"/>
+                </a:solidFill>
+              </a:rPr>
+              <a:t>går på å implementere en String Calculator, løs èn og èn av oppgavene, prøv å ikke ”se fremover</a:t>
+            </a:r>
+            <a:r>
+              <a:rPr lang="nb-NO" sz="2000" dirty="0" smtClean="0">
+                <a:solidFill>
+                  <a:schemeClr val="bg1"/>
+                </a:solidFill>
+              </a:rPr>
+              <a:t>”.</a:t>
+            </a:r>
+          </a:p>
+          <a:p>
+            <a:endParaRPr lang="nb-NO" sz="2000" dirty="0">
+              <a:solidFill>
+                <a:schemeClr val="bg1"/>
+              </a:solidFill>
+            </a:endParaRPr>
+          </a:p>
+          <a:p>
+            <a:endParaRPr lang="nb-NO" sz="2000" dirty="0" smtClean="0">
+              <a:solidFill>
+                <a:schemeClr val="bg1"/>
+              </a:solidFill>
+            </a:endParaRPr>
+          </a:p>
+          <a:p>
+            <a:endParaRPr lang="nb-NO" sz="2000" u="sng" dirty="0">
+              <a:solidFill>
+                <a:schemeClr val="bg1"/>
+              </a:solidFill>
+              <a:hlinkClick r:id="rId2"/>
+            </a:endParaRPr>
+          </a:p>
+          <a:p>
+            <a:pPr algn="ctr"/>
+            <a:r>
+              <a:rPr lang="nb-NO" sz="3600" u="sng" dirty="0" smtClean="0">
+                <a:solidFill>
+                  <a:schemeClr val="bg1"/>
+                </a:solidFill>
+              </a:rPr>
+              <a:t>http://osherove.com/tdd-kata-1/</a:t>
+            </a:r>
+            <a:r>
+              <a:rPr lang="nb-NO" sz="3600" dirty="0" smtClean="0">
+                <a:solidFill>
+                  <a:schemeClr val="bg1"/>
+                </a:solidFill>
+              </a:rPr>
+              <a:t> </a:t>
+            </a:r>
+          </a:p>
+          <a:p>
+            <a:endParaRPr lang="nb-NO" sz="2000" dirty="0" smtClean="0">
+              <a:solidFill>
+                <a:schemeClr val="bg1"/>
+              </a:solidFill>
+            </a:endParaRPr>
+          </a:p>
+          <a:p>
+            <a:endParaRPr lang="nb-NO" sz="2000" dirty="0" smtClean="0">
+              <a:solidFill>
+                <a:schemeClr val="bg1"/>
+              </a:solidFill>
+            </a:endParaRPr>
+          </a:p>
+          <a:p>
+            <a:endParaRPr lang="nb-NO" sz="2000" dirty="0">
+              <a:solidFill>
+                <a:schemeClr val="bg1"/>
+              </a:solidFill>
+            </a:endParaRPr>
+          </a:p>
+          <a:p>
+            <a:endParaRPr lang="nb-NO" sz="2000" dirty="0" smtClean="0">
+              <a:solidFill>
+                <a:schemeClr val="bg1"/>
+              </a:solidFill>
+            </a:endParaRPr>
+          </a:p>
+          <a:p>
+            <a:endParaRPr lang="nb-NO" sz="2000" dirty="0">
               <a:solidFill>
                 <a:schemeClr val="bg1"/>
               </a:solidFill>
@@ -14300,7 +13918,7 @@
         <p:spPr>
           <a:xfrm>
             <a:off x="773723" y="1341070"/>
-            <a:ext cx="7957584" cy="2769989"/>
+            <a:ext cx="7957584" cy="3693319"/>
           </a:xfrm>
           <a:prstGeom prst="rect">
             <a:avLst/>
@@ -14478,6 +14096,25 @@
                 </a:solidFill>
               </a:rPr>
               <a:t> prinsippet.</a:t>
+            </a:r>
+          </a:p>
+          <a:p>
+            <a:pPr algn="just"/>
+            <a:endParaRPr lang="nb-NO" sz="2000" dirty="0">
+              <a:solidFill>
+                <a:schemeClr val="bg1"/>
+              </a:solidFill>
+            </a:endParaRPr>
+          </a:p>
+          <a:p>
+            <a:pPr algn="just"/>
+            <a:r>
+              <a:rPr lang="nb-NO" sz="2000" dirty="0" smtClean="0">
+                <a:solidFill>
+                  <a:schemeClr val="bg1"/>
+                </a:solidFill>
+              </a:rPr>
+              <a:t>Jobb gjerne i par hvor den ene skriver test og den andre implementerer funksjonaliteten.</a:t>
             </a:r>
             <a:endParaRPr lang="en-US" sz="2000" dirty="0" smtClean="0">
               <a:solidFill>
@@ -15128,7 +14765,7 @@
         <p:spPr>
           <a:xfrm>
             <a:off x="321623" y="418905"/>
-            <a:ext cx="3391313" cy="307777"/>
+            <a:ext cx="5791970" cy="307777"/>
           </a:xfrm>
         </p:spPr>
         <p:txBody>
@@ -15137,7 +14774,7 @@
           <a:p>
             <a:r>
               <a:rPr lang="nb-NO" dirty="0" smtClean="0"/>
-              <a:t>Avhengigheter FORts</a:t>
+              <a:t>Avhengigheter FORts (mulig løsning)</a:t>
             </a:r>
             <a:endParaRPr lang="en-US" dirty="0"/>
           </a:p>
@@ -15176,7 +14813,7 @@
         <p:spPr>
           <a:xfrm>
             <a:off x="362263" y="1417562"/>
-            <a:ext cx="8369044" cy="3662541"/>
+            <a:ext cx="8369044" cy="3877985"/>
           </a:xfrm>
           <a:prstGeom prst="rect">
             <a:avLst/>
@@ -15285,6 +14922,9 @@
             </a:r>
             <a:r>
               <a:rPr lang="en-US" sz="1400" dirty="0" smtClean="0">
+                <a:solidFill>
+                  <a:srgbClr val="0000FF"/>
+                </a:solidFill>
                 <a:latin typeface="Consolas" pitchFamily="49" charset="0"/>
                 <a:cs typeface="Consolas" pitchFamily="49" charset="0"/>
               </a:rPr>
@@ -15337,6 +14977,9 @@
             </a:r>
             <a:r>
               <a:rPr lang="en-US" sz="1400" dirty="0" smtClean="0">
+                <a:solidFill>
+                  <a:srgbClr val="0000FF"/>
+                </a:solidFill>
                 <a:latin typeface="Consolas" pitchFamily="49" charset="0"/>
                 <a:cs typeface="Consolas" pitchFamily="49" charset="0"/>
               </a:rPr>
@@ -15358,6 +15001,9 @@
             </a:r>
             <a:r>
               <a:rPr lang="en-US" sz="1400" dirty="0" err="1" smtClean="0">
+                <a:solidFill>
+                  <a:srgbClr val="2B91AF"/>
+                </a:solidFill>
                 <a:latin typeface="Consolas" pitchFamily="49" charset="0"/>
                 <a:cs typeface="Consolas" pitchFamily="49" charset="0"/>
               </a:rPr>
@@ -15382,7 +15028,20 @@
                 <a:latin typeface="Consolas" pitchFamily="49" charset="0"/>
                 <a:cs typeface="Consolas" pitchFamily="49" charset="0"/>
               </a:rPr>
-              <a:t>){</a:t>
+              <a:t>)</a:t>
+            </a:r>
+            <a:br>
+              <a:rPr lang="en-US" sz="1400" dirty="0" smtClean="0">
+                <a:latin typeface="Consolas" pitchFamily="49" charset="0"/>
+                <a:cs typeface="Consolas" pitchFamily="49" charset="0"/>
+              </a:rPr>
+            </a:br>
+            <a:r>
+              <a:rPr lang="en-US" sz="1400" dirty="0" smtClean="0">
+                <a:latin typeface="Consolas" pitchFamily="49" charset="0"/>
+                <a:cs typeface="Consolas" pitchFamily="49" charset="0"/>
+              </a:rPr>
+              <a:t>	{</a:t>
             </a:r>
           </a:p>
           <a:p>
@@ -15399,7 +15058,7 @@
                 <a:latin typeface="Consolas" pitchFamily="49" charset="0"/>
                 <a:cs typeface="Consolas" pitchFamily="49" charset="0"/>
               </a:rPr>
-              <a:t>	_</a:t>
+              <a:t>		_</a:t>
             </a:r>
             <a:r>
               <a:rPr lang="en-US" sz="1400" dirty="0" err="1" smtClean="0">
@@ -15697,47 +15356,6 @@
               </a:rPr>
               <a:t>}</a:t>
             </a:r>
-          </a:p>
-        </p:txBody>
-      </p:sp>
-      <p:sp>
-        <p:nvSpPr>
-          <p:cNvPr id="15" name="TextBox 14"/>
-          <p:cNvSpPr txBox="1"/>
-          <p:nvPr/>
-        </p:nvSpPr>
-        <p:spPr>
-          <a:xfrm>
-            <a:off x="362263" y="4608483"/>
-            <a:ext cx="8240500" cy="584775"/>
-          </a:xfrm>
-          <a:prstGeom prst="rect">
-            <a:avLst/>
-          </a:prstGeom>
-          <a:noFill/>
-        </p:spPr>
-        <p:txBody>
-          <a:bodyPr wrap="square" rtlCol="0">
-            <a:spAutoFit/>
-          </a:bodyPr>
-          <a:lstStyle/>
-          <a:p>
-            <a:pPr>
-              <a:spcBef>
-                <a:spcPts val="600"/>
-              </a:spcBef>
-              <a:spcAft>
-                <a:spcPts val="400"/>
-              </a:spcAft>
-            </a:pPr>
-            <a:r>
-              <a:rPr lang="nb-NO" sz="1600" dirty="0" smtClean="0"/>
-              <a:t>Mulig løsning</a:t>
-            </a:r>
-            <a:br>
-              <a:rPr lang="nb-NO" sz="1600" dirty="0" smtClean="0"/>
-            </a:br>
-            <a:endParaRPr lang="nb-NO" sz="1600" dirty="0" smtClean="0"/>
           </a:p>
         </p:txBody>
       </p:sp>
@@ -16379,8 +15997,8 @@
         </p:nvSpPr>
         <p:spPr>
           <a:xfrm>
-            <a:off x="773723" y="1341070"/>
-            <a:ext cx="7957584" cy="2154436"/>
+            <a:off x="773723" y="920656"/>
+            <a:ext cx="7957584" cy="5232202"/>
           </a:xfrm>
           <a:prstGeom prst="rect">
             <a:avLst/>
@@ -16401,41 +16019,24 @@
                   <a:schemeClr val="bg1"/>
                 </a:solidFill>
               </a:rPr>
-              <a:t>Gjennomfør TDD Kataen som er laget av Roy Osherove (</a:t>
-            </a:r>
-            <a:r>
-              <a:rPr lang="nb-NO" sz="2000" u="sng" dirty="0" smtClean="0">
+              <a:t>I denne oppgaven har vi laget et solution som dere kan hente fra github.</a:t>
+            </a:r>
+          </a:p>
+          <a:p>
+            <a:endParaRPr lang="nb-NO" sz="2000" dirty="0">
+              <a:solidFill>
+                <a:schemeClr val="bg1"/>
+              </a:solidFill>
+            </a:endParaRPr>
+          </a:p>
+          <a:p>
+            <a:r>
+              <a:rPr lang="nb-NO" sz="2000" dirty="0" smtClean="0">
                 <a:solidFill>
                   <a:schemeClr val="bg1"/>
                 </a:solidFill>
-                <a:hlinkClick r:id="rId2"/>
-              </a:rPr>
-              <a:t>http://osherove.com/</a:t>
-            </a:r>
-            <a:r>
-              <a:rPr lang="nb-NO" sz="2000" dirty="0" smtClean="0">
-                <a:solidFill>
-                  <a:schemeClr val="bg1"/>
-                </a:solidFill>
-              </a:rPr>
-              <a:t>) som finnes </a:t>
-            </a:r>
-            <a:r>
-              <a:rPr lang="nb-NO" sz="2000" u="sng" dirty="0" smtClean="0">
-                <a:solidFill>
-                  <a:schemeClr val="bg1"/>
-                </a:solidFill>
-                <a:hlinkClick r:id="rId3"/>
-              </a:rPr>
-              <a:t>her.</a:t>
-            </a:r>
-            <a:r>
-              <a:rPr lang="nb-NO" sz="2000" dirty="0" smtClean="0">
-                <a:solidFill>
-                  <a:schemeClr val="bg1"/>
-                </a:solidFill>
-              </a:rPr>
-              <a:t> </a:t>
+              </a:rPr>
+              <a:t>Den ligger under </a:t>
             </a:r>
           </a:p>
           <a:p>
@@ -16447,48 +16048,157 @@
           </a:p>
           <a:p>
             <a:r>
+              <a:rPr lang="nb-NO" sz="2000" dirty="0">
+                <a:solidFill>
+                  <a:schemeClr val="bg1"/>
+                </a:solidFill>
+              </a:rPr>
+              <a:t>https://github.com/bekk/dotnetkurs/tree/master/tdd/Oppgaver</a:t>
+            </a:r>
+          </a:p>
+          <a:p>
+            <a:endParaRPr lang="nb-NO" sz="2000" dirty="0">
+              <a:solidFill>
+                <a:schemeClr val="bg1"/>
+              </a:solidFill>
+            </a:endParaRPr>
+          </a:p>
+          <a:p>
+            <a:r>
               <a:rPr lang="nb-NO" sz="2000" dirty="0" smtClean="0">
                 <a:solidFill>
                   <a:schemeClr val="bg1"/>
                 </a:solidFill>
               </a:rPr>
-              <a:t>Kataen går på å utvide funksjonaliteten til StringCalculator som ble opprettet i oppgave 1, løs èn og èn av oppgavene, prøv å ikke ”se fremover”.</a:t>
+              <a:t>og heter TDDInventory</a:t>
+            </a:r>
+          </a:p>
+          <a:p>
+            <a:endParaRPr lang="nb-NO" sz="2000" b="1" dirty="0">
+              <a:solidFill>
+                <a:schemeClr val="bg1"/>
+              </a:solidFill>
+            </a:endParaRPr>
+          </a:p>
+          <a:p>
+            <a:r>
+              <a:rPr lang="nb-NO" sz="2000" dirty="0" smtClean="0">
+                <a:solidFill>
+                  <a:schemeClr val="bg1"/>
+                </a:solidFill>
+              </a:rPr>
+              <a:t>Hent ned solution enten ved å fork’e repository eller last den ned.</a:t>
+            </a:r>
+          </a:p>
+          <a:p>
+            <a:endParaRPr lang="nb-NO" sz="2000" dirty="0">
+              <a:solidFill>
+                <a:schemeClr val="bg1"/>
+              </a:solidFill>
+            </a:endParaRPr>
+          </a:p>
+          <a:p>
+            <a:r>
+              <a:rPr lang="nb-NO" sz="2000" dirty="0" smtClean="0">
+                <a:solidFill>
+                  <a:schemeClr val="bg1"/>
+                </a:solidFill>
+              </a:rPr>
+              <a:t>Start med å se på klassen som heter </a:t>
+            </a:r>
+            <a:r>
+              <a:rPr lang="nb-NO" sz="2000" dirty="0" smtClean="0">
+                <a:solidFill>
+                  <a:schemeClr val="bg1"/>
+                </a:solidFill>
+                <a:latin typeface="Consolas" panose="020B0609020204030204" pitchFamily="49" charset="0"/>
+                <a:cs typeface="Consolas" panose="020B0609020204030204" pitchFamily="49" charset="0"/>
+              </a:rPr>
+              <a:t>InventoryService.cs</a:t>
+            </a:r>
+            <a:r>
+              <a:rPr lang="nb-NO" sz="2000" dirty="0" smtClean="0">
+                <a:solidFill>
+                  <a:schemeClr val="bg1"/>
+                </a:solidFill>
+              </a:rPr>
+              <a:t> for nærmere instrukser</a:t>
+            </a:r>
+            <a:r>
+              <a:rPr lang="nb-NO" sz="2000" dirty="0" smtClean="0">
+                <a:solidFill>
+                  <a:schemeClr val="bg1"/>
+                </a:solidFill>
+              </a:rPr>
+              <a:t>.</a:t>
+            </a:r>
+          </a:p>
+          <a:p>
+            <a:endParaRPr lang="nb-NO" sz="2000" dirty="0">
+              <a:solidFill>
+                <a:schemeClr val="bg1"/>
+              </a:solidFill>
+            </a:endParaRPr>
+          </a:p>
+          <a:p>
+            <a:r>
+              <a:rPr lang="nb-NO" sz="2000" dirty="0" smtClean="0">
+                <a:solidFill>
+                  <a:schemeClr val="bg1"/>
+                </a:solidFill>
+              </a:rPr>
+              <a:t>Visual Studio må være konfigurert til å laste ned pakker fra NuGet automatisk. (Tools-&gt; Library Package Manager</a:t>
+            </a:r>
+            <a:r>
+              <a:rPr lang="en-US" sz="2000" i="1" cap="all" spc="20" dirty="0">
+                <a:solidFill>
+                  <a:schemeClr val="bg1"/>
+                </a:solidFill>
+                <a:latin typeface="Georgia"/>
+                <a:ea typeface="+mj-ea"/>
+              </a:rPr>
+              <a:t> </a:t>
+            </a:r>
+            <a:r>
+              <a:rPr lang="en-US" sz="2000" i="1" cap="all" spc="20" dirty="0" smtClean="0">
+                <a:solidFill>
+                  <a:schemeClr val="bg1"/>
+                </a:solidFill>
+                <a:latin typeface="Georgia"/>
+                <a:ea typeface="+mj-ea"/>
+              </a:rPr>
+              <a:t>-&gt; </a:t>
+            </a:r>
+            <a:r>
+              <a:rPr lang="nb-NO" sz="2000" dirty="0">
+                <a:solidFill>
+                  <a:schemeClr val="bg1"/>
+                </a:solidFill>
+              </a:rPr>
+              <a:t>Package </a:t>
+            </a:r>
+            <a:r>
+              <a:rPr lang="nb-NO" sz="2000" dirty="0" smtClean="0">
+                <a:solidFill>
+                  <a:schemeClr val="bg1"/>
+                </a:solidFill>
+              </a:rPr>
+              <a:t>Manager Settings</a:t>
+            </a:r>
+            <a:r>
+              <a:rPr lang="en-US" sz="2000" i="1" cap="all" spc="20" dirty="0" smtClean="0">
+                <a:solidFill>
+                  <a:schemeClr val="bg1"/>
+                </a:solidFill>
+                <a:latin typeface="Georgia"/>
+                <a:ea typeface="+mj-ea"/>
+              </a:rPr>
+              <a:t> </a:t>
             </a:r>
             <a:endParaRPr lang="en-US" sz="2000" dirty="0" smtClean="0">
               <a:solidFill>
                 <a:schemeClr val="bg1"/>
               </a:solidFill>
-            </a:endParaRPr>
-          </a:p>
-          <a:p>
-            <a:pPr marL="457200" marR="0" lvl="0" indent="-457200" algn="just" defTabSz="457200" rtl="0" eaLnBrk="1" fontAlgn="auto" latinLnBrk="0" hangingPunct="1">
-              <a:lnSpc>
-                <a:spcPct val="100000"/>
-              </a:lnSpc>
-              <a:spcBef>
-                <a:spcPct val="0"/>
-              </a:spcBef>
-              <a:spcAft>
-                <a:spcPts val="0"/>
-              </a:spcAft>
-              <a:buClrTx/>
-              <a:buSzTx/>
-              <a:tabLst/>
-              <a:defRPr/>
-            </a:pPr>
-            <a:endParaRPr kumimoji="0" lang="en-US" sz="2000" b="0" i="1" u="none" strike="noStrike" kern="1200" cap="all" spc="20" normalizeH="0" baseline="0" noProof="0" dirty="0">
-              <a:ln>
-                <a:noFill/>
-              </a:ln>
-              <a:solidFill>
-                <a:schemeClr val="bg1"/>
-              </a:solidFill>
-              <a:effectLst/>
-              <a:uLnTx/>
-              <a:uFillTx/>
-              <a:latin typeface="Georgia"/>
-              <a:ea typeface="+mj-ea"/>
-              <a:cs typeface="Georgia"/>
             </a:endParaRPr>
           </a:p>
         </p:txBody>
@@ -17162,6 +16872,13 @@
   <p:transition>
     <p:fade thruBlk="1"/>
   </p:transition>
+  <p:timing>
+    <p:tnLst>
+      <p:par>
+        <p:cTn id="1" dur="indefinite" restart="never" nodeType="tmRoot"/>
+      </p:par>
+    </p:tnLst>
+  </p:timing>
 </p:sld>
 </file>
 
@@ -17195,7 +16912,7 @@
         <p:spPr>
           <a:xfrm>
             <a:off x="321623" y="418905"/>
-            <a:ext cx="1386598" cy="307777"/>
+            <a:ext cx="2322111" cy="307777"/>
           </a:xfrm>
         </p:spPr>
         <p:txBody>
@@ -17204,7 +16921,7 @@
           <a:p>
             <a:r>
               <a:rPr lang="nb-NO" dirty="0" smtClean="0"/>
-              <a:t>Ninject </a:t>
+              <a:t>IOC Container </a:t>
             </a:r>
             <a:endParaRPr lang="en-US" dirty="0"/>
           </a:p>
@@ -17242,7 +16959,7 @@
         </p:nvSpPr>
         <p:spPr>
           <a:xfrm>
-            <a:off x="5750169" y="4567897"/>
+            <a:off x="5750169" y="5282600"/>
             <a:ext cx="2098385" cy="545123"/>
           </a:xfrm>
           <a:prstGeom prst="roundRect">
@@ -17311,7 +17028,7 @@
         </p:nvSpPr>
         <p:spPr>
           <a:xfrm>
-            <a:off x="3384305" y="2022231"/>
+            <a:off x="3384305" y="2736934"/>
             <a:ext cx="1408233" cy="545123"/>
           </a:xfrm>
           <a:prstGeom prst="roundRect">
@@ -17383,7 +17100,7 @@
         </p:nvSpPr>
         <p:spPr>
           <a:xfrm>
-            <a:off x="2998175" y="3358662"/>
+            <a:off x="2998175" y="4073365"/>
             <a:ext cx="2180494" cy="545123"/>
           </a:xfrm>
           <a:prstGeom prst="roundRect">
@@ -17454,7 +17171,7 @@
         </p:nvSpPr>
         <p:spPr>
           <a:xfrm>
-            <a:off x="663595" y="4567897"/>
+            <a:off x="663595" y="5282600"/>
             <a:ext cx="2098385" cy="545123"/>
           </a:xfrm>
           <a:prstGeom prst="roundRect">
@@ -17505,7 +17222,7 @@
                   <a:schemeClr val="bg1"/>
                 </a:solidFill>
               </a:rPr>
-              <a:t>Ninject</a:t>
+              <a:t>IOC Container</a:t>
             </a:r>
             <a:endParaRPr lang="en-US" sz="1400" dirty="0" err="1" smtClean="0">
               <a:solidFill>
@@ -17526,7 +17243,7 @@
         </p:nvCxnSpPr>
         <p:spPr>
           <a:xfrm flipV="1">
-            <a:off x="4088422" y="2567354"/>
+            <a:off x="4088422" y="3282057"/>
             <a:ext cx="0" cy="791308"/>
           </a:xfrm>
           <a:prstGeom prst="straightConnector1">
@@ -17566,7 +17283,7 @@
         </p:nvCxnSpPr>
         <p:spPr>
           <a:xfrm flipH="1">
-            <a:off x="4792538" y="2294793"/>
+            <a:off x="4792538" y="3009496"/>
             <a:ext cx="2425924" cy="0"/>
           </a:xfrm>
           <a:prstGeom prst="straightConnector1">
@@ -17604,7 +17321,7 @@
         </p:nvCxnSpPr>
         <p:spPr>
           <a:xfrm flipV="1">
-            <a:off x="7218462" y="2294793"/>
+            <a:off x="7218462" y="3009496"/>
             <a:ext cx="0" cy="2273104"/>
           </a:xfrm>
           <a:prstGeom prst="line">
@@ -17643,7 +17360,7 @@
         </p:nvCxnSpPr>
         <p:spPr>
           <a:xfrm>
-            <a:off x="2761980" y="4840459"/>
+            <a:off x="2761980" y="5555162"/>
             <a:ext cx="2988189" cy="0"/>
           </a:xfrm>
           <a:prstGeom prst="straightConnector1">
@@ -17681,7 +17398,7 @@
         </p:nvSpPr>
         <p:spPr>
           <a:xfrm>
-            <a:off x="5064373" y="2083775"/>
+            <a:off x="5064373" y="2798478"/>
             <a:ext cx="1872758" cy="253916"/>
           </a:xfrm>
           <a:prstGeom prst="rect">
@@ -17723,7 +17440,7 @@
         </p:nvSpPr>
         <p:spPr>
           <a:xfrm>
-            <a:off x="3194551" y="4586543"/>
+            <a:off x="3194551" y="5301246"/>
             <a:ext cx="2406154" cy="253916"/>
           </a:xfrm>
           <a:prstGeom prst="rect">
@@ -17765,7 +17482,7 @@
         </p:nvCxnSpPr>
         <p:spPr>
           <a:xfrm>
-            <a:off x="1696915" y="3648808"/>
+            <a:off x="1696915" y="4363511"/>
             <a:ext cx="1301260" cy="0"/>
           </a:xfrm>
           <a:prstGeom prst="straightConnector1">
@@ -17803,7 +17520,7 @@
         </p:nvCxnSpPr>
         <p:spPr>
           <a:xfrm flipV="1">
-            <a:off x="1696915" y="3648808"/>
+            <a:off x="1696915" y="4363511"/>
             <a:ext cx="0" cy="919089"/>
           </a:xfrm>
           <a:prstGeom prst="line">
@@ -17839,7 +17556,7 @@
         </p:nvCxnSpPr>
         <p:spPr>
           <a:xfrm>
-            <a:off x="6445250" y="3631224"/>
+            <a:off x="6445250" y="4345927"/>
             <a:ext cx="0" cy="936673"/>
           </a:xfrm>
           <a:prstGeom prst="straightConnector1">
@@ -17879,7 +17596,7 @@
         </p:nvCxnSpPr>
         <p:spPr>
           <a:xfrm flipH="1">
-            <a:off x="5178669" y="3631224"/>
+            <a:off x="5178669" y="4345927"/>
             <a:ext cx="1266581" cy="0"/>
           </a:xfrm>
           <a:prstGeom prst="line">
@@ -17915,7 +17632,7 @@
         </p:nvSpPr>
         <p:spPr>
           <a:xfrm>
-            <a:off x="1682268" y="3394892"/>
+            <a:off x="1682268" y="4109595"/>
             <a:ext cx="1315907" cy="253916"/>
           </a:xfrm>
           <a:prstGeom prst="rect">
@@ -17953,8 +17670,8 @@
         </p:nvSpPr>
         <p:spPr>
           <a:xfrm>
-            <a:off x="536448" y="1249700"/>
-            <a:ext cx="2616422" cy="713016"/>
+            <a:off x="281620" y="999244"/>
+            <a:ext cx="5319085" cy="1836400"/>
           </a:xfrm>
           <a:prstGeom prst="rect">
             <a:avLst/>
@@ -17987,6 +17704,87 @@
               </a:rPr>
               <a:t>http://www.ninject.org/</a:t>
             </a:r>
+            <a:endParaRPr lang="en-US" sz="1600" dirty="0" smtClean="0"/>
+          </a:p>
+          <a:p>
+            <a:pPr>
+              <a:spcBef>
+                <a:spcPts val="600"/>
+              </a:spcBef>
+              <a:spcAft>
+                <a:spcPts val="400"/>
+              </a:spcAft>
+              <a:buFont typeface="Wingdings" pitchFamily="2" charset="2"/>
+              <a:buChar char="ü"/>
+            </a:pPr>
+            <a:r>
+              <a:rPr lang="en-US" sz="1600" dirty="0"/>
+              <a:t> </a:t>
+            </a:r>
+            <a:r>
+              <a:rPr lang="nb-NO" sz="1600" dirty="0">
+                <a:hlinkClick r:id="rId4"/>
+              </a:rPr>
+              <a:t>https://code.google.com/p/autofac</a:t>
+            </a:r>
+            <a:r>
+              <a:rPr lang="nb-NO" sz="1600" dirty="0" smtClean="0">
+                <a:hlinkClick r:id="rId4"/>
+              </a:rPr>
+              <a:t>/</a:t>
+            </a:r>
+            <a:endParaRPr lang="nb-NO" sz="1600" dirty="0" smtClean="0"/>
+          </a:p>
+          <a:p>
+            <a:pPr>
+              <a:spcBef>
+                <a:spcPts val="600"/>
+              </a:spcBef>
+              <a:spcAft>
+                <a:spcPts val="400"/>
+              </a:spcAft>
+              <a:buFont typeface="Wingdings" pitchFamily="2" charset="2"/>
+              <a:buChar char="ü"/>
+            </a:pPr>
+            <a:r>
+              <a:rPr lang="nb-NO" sz="1600" dirty="0"/>
+              <a:t> </a:t>
+            </a:r>
+            <a:r>
+              <a:rPr lang="nb-NO" sz="1600" dirty="0">
+                <a:hlinkClick r:id="rId5"/>
+              </a:rPr>
+              <a:t>http://docs.structuremap.net</a:t>
+            </a:r>
+            <a:r>
+              <a:rPr lang="nb-NO" sz="1600" dirty="0" smtClean="0">
+                <a:hlinkClick r:id="rId5"/>
+              </a:rPr>
+              <a:t>/</a:t>
+            </a:r>
+            <a:endParaRPr lang="nb-NO" sz="1600" dirty="0" smtClean="0"/>
+          </a:p>
+          <a:p>
+            <a:pPr>
+              <a:spcBef>
+                <a:spcPts val="600"/>
+              </a:spcBef>
+              <a:spcAft>
+                <a:spcPts val="400"/>
+              </a:spcAft>
+              <a:buFont typeface="Wingdings" pitchFamily="2" charset="2"/>
+              <a:buChar char="ü"/>
+            </a:pPr>
+            <a:r>
+              <a:rPr lang="nb-NO" sz="1600" dirty="0"/>
+              <a:t> </a:t>
+            </a:r>
+            <a:r>
+              <a:rPr lang="nb-NO" sz="1600" dirty="0">
+                <a:hlinkClick r:id="rId6"/>
+              </a:rPr>
+              <a:t>http://docs.castleproject.org/Windsor.MainPage.ashx</a:t>
+            </a:r>
             <a:endParaRPr lang="nb-NO" sz="1600" dirty="0" smtClean="0"/>
           </a:p>
           <a:p>
@@ -18012,6 +17810,13 @@
   <p:transition>
     <p:fade thruBlk="1"/>
   </p:transition>
+  <p:timing>
+    <p:tnLst>
+      <p:par>
+        <p:cTn id="1" dur="indefinite" restart="never" nodeType="tmRoot"/>
+      </p:par>
+    </p:tnLst>
+  </p:timing>
 </p:sld>
 </file>
 
@@ -18362,7 +18167,7 @@
 </file>
 
 <file path=ppt/slides/slide19.xml><?xml version="1.0" encoding="utf-8"?>
-<p:sld xmlns:a="http://schemas.openxmlformats.org/drawingml/2006/main" xmlns:r="http://schemas.openxmlformats.org/officeDocument/2006/relationships" xmlns:p="http://schemas.openxmlformats.org/presentationml/2006/main">
+<p:sld xmlns:a="http://schemas.openxmlformats.org/drawingml/2006/main" xmlns:r="http://schemas.openxmlformats.org/officeDocument/2006/relationships" xmlns:p="http://schemas.openxmlformats.org/presentationml/2006/main" show="0">
   <p:cSld>
     <p:spTree>
       <p:nvGrpSpPr>
@@ -18486,6 +18291,13 @@
   <p:transition>
     <p:fade thruBlk="1"/>
   </p:transition>
+  <p:timing>
+    <p:tnLst>
+      <p:par>
+        <p:cTn id="1" dur="indefinite" restart="never" nodeType="tmRoot"/>
+      </p:par>
+    </p:tnLst>
+  </p:timing>
 </p:sld>
 </file>
 
@@ -18640,7 +18452,7 @@
             </a:pPr>
             <a:r>
               <a:rPr lang="nb-NO" sz="1400" dirty="0" smtClean="0"/>
-              <a:t> Oppgave 1</a:t>
+              <a:t> Oppgave 1 (TDD Kata)</a:t>
             </a:r>
           </a:p>
           <a:p>
@@ -18655,8 +18467,12 @@
               <a:buChar char="ü"/>
             </a:pPr>
             <a:r>
+              <a:rPr lang="nb-NO" sz="1400" dirty="0"/>
+              <a:t> </a:t>
+            </a:r>
+            <a:r>
               <a:rPr lang="nb-NO" sz="1400" dirty="0" smtClean="0"/>
-              <a:t> Avhengigheter</a:t>
+              <a:t>Oppgave 2 (Stack)</a:t>
             </a:r>
           </a:p>
           <a:p>
@@ -18672,7 +18488,7 @@
             </a:pPr>
             <a:r>
               <a:rPr lang="nb-NO" sz="1400" dirty="0" smtClean="0"/>
-              <a:t> Oppgave 2</a:t>
+              <a:t> Avhengigheter</a:t>
             </a:r>
           </a:p>
           <a:p>
@@ -18688,8 +18504,9 @@
             </a:pPr>
             <a:r>
               <a:rPr lang="nb-NO" sz="1400" dirty="0" smtClean="0"/>
-              <a:t> TDD i MVC3</a:t>
-            </a:r>
+              <a:t> Oppgave 3 (TDDInventory)</a:t>
+            </a:r>
+            <a:endParaRPr lang="nb-NO" sz="1400" dirty="0"/>
           </a:p>
           <a:p>
             <a:pPr>
@@ -18704,7 +18521,7 @@
             </a:pPr>
             <a:r>
               <a:rPr lang="nb-NO" sz="1400" dirty="0" smtClean="0"/>
-              <a:t>Oppgave 3</a:t>
+              <a:t> Dependency Injection</a:t>
             </a:r>
           </a:p>
         </p:txBody>
@@ -18728,7 +18545,7 @@
 </file>
 
 <file path=ppt/slides/slide20.xml><?xml version="1.0" encoding="utf-8"?>
-<p:sld xmlns:a="http://schemas.openxmlformats.org/drawingml/2006/main" xmlns:r="http://schemas.openxmlformats.org/officeDocument/2006/relationships" xmlns:p="http://schemas.openxmlformats.org/presentationml/2006/main">
+<p:sld xmlns:a="http://schemas.openxmlformats.org/drawingml/2006/main" xmlns:r="http://schemas.openxmlformats.org/officeDocument/2006/relationships" xmlns:p="http://schemas.openxmlformats.org/presentationml/2006/main" show="0">
   <p:cSld>
     <p:spTree>
       <p:nvGrpSpPr>
@@ -20132,7 +19949,7 @@
 </file>
 
 <file path=ppt/slides/slide21.xml><?xml version="1.0" encoding="utf-8"?>
-<p:sld xmlns:a="http://schemas.openxmlformats.org/drawingml/2006/main" xmlns:r="http://schemas.openxmlformats.org/officeDocument/2006/relationships" xmlns:p="http://schemas.openxmlformats.org/presentationml/2006/main">
+<p:sld xmlns:a="http://schemas.openxmlformats.org/drawingml/2006/main" xmlns:r="http://schemas.openxmlformats.org/officeDocument/2006/relationships" xmlns:p="http://schemas.openxmlformats.org/presentationml/2006/main" show="0">
   <p:cSld>
     <p:spTree>
       <p:nvGrpSpPr>
@@ -20917,28 +20734,14 @@
                 <a:latin typeface="Consolas" pitchFamily="49" charset="0"/>
                 <a:cs typeface="Consolas" pitchFamily="49" charset="0"/>
               </a:rPr>
-              <a:t>.AreaEqual</a:t>
+              <a:t>.AreEqual</a:t>
             </a:r>
             <a:r>
               <a:rPr lang="en-US" sz="1400" dirty="0" smtClean="0">
                 <a:latin typeface="Consolas" pitchFamily="49" charset="0"/>
                 <a:cs typeface="Consolas" pitchFamily="49" charset="0"/>
               </a:rPr>
-              <a:t>(3,</a:t>
-            </a:r>
-            <a:r>
-              <a:rPr lang="en-US" sz="1400" dirty="0" smtClean="0">
-                <a:latin typeface="Consolas" pitchFamily="49" charset="0"/>
-                <a:cs typeface="Consolas" pitchFamily="49" charset="0"/>
-              </a:rPr>
-              <a:t> result);</a:t>
-            </a:r>
-            <a:r>
-              <a:rPr lang="en-US" sz="1400" dirty="0" smtClean="0">
-                <a:latin typeface="Consolas" pitchFamily="49" charset="0"/>
-                <a:cs typeface="Consolas" pitchFamily="49" charset="0"/>
-              </a:rPr>
-              <a:t>        </a:t>
+              <a:t>(3, result);        </a:t>
             </a:r>
             <a:br>
               <a:rPr lang="en-US" sz="1400" dirty="0" smtClean="0">
@@ -22132,13 +21935,8 @@
             </a:pPr>
             <a:r>
               <a:rPr lang="nb-NO" sz="1600" dirty="0" smtClean="0"/>
-              <a:t> Rapportering av </a:t>
-            </a:r>
-            <a:r>
-              <a:rPr lang="nb-NO" sz="1600" dirty="0" smtClean="0"/>
-              <a:t>testdekning</a:t>
-            </a:r>
-            <a:endParaRPr lang="nb-NO" sz="1600" dirty="0" smtClean="0"/>
+              <a:t> Rapportering av testdekning</a:t>
+            </a:r>
           </a:p>
           <a:p>
             <a:pPr>
@@ -22514,11 +22312,7 @@
           <a:p>
             <a:r>
               <a:rPr lang="nb-NO" dirty="0" smtClean="0"/>
-              <a:t>TDD i .</a:t>
-            </a:r>
-            <a:r>
-              <a:rPr lang="nb-NO" dirty="0" smtClean="0"/>
-              <a:t>NET forts</a:t>
+              <a:t>TDD i .NET forts</a:t>
             </a:r>
             <a:endParaRPr lang="en-US" dirty="0"/>
           </a:p>
@@ -22605,7 +22399,7 @@
             </a:pPr>
             <a:r>
               <a:rPr lang="nb-NO" sz="1600" dirty="0" smtClean="0"/>
-              <a:t>Fluent Assertions (Install-Package FluentAssertions)</a:t>
+              <a:t>Fluent Assertions (Install-Package FluentAssertions via NuGet)</a:t>
             </a:r>
             <a:endParaRPr lang="nb-NO" sz="1600" dirty="0"/>
           </a:p>

</xml_diff>

<commit_message>
Small change to slide
</commit_message>
<xml_diff>
--- a/tdd/TDD.pptx
+++ b/tdd/TDD.pptx
@@ -132,7 +132,7 @@
   </p:defaultTextStyle>
   <p:extLst>
     <p:ext uri="{EFAFB233-063F-42B5-8137-9DF3F51BA10A}">
-      <p15:sldGuideLst xmlns:p15="http://schemas.microsoft.com/office/powerpoint/2012/main" xmlns="">
+      <p15:sldGuideLst xmlns:p15="http://schemas.microsoft.com/office/powerpoint/2012/main">
         <p15:guide id="1" orient="horz" pos="4196">
           <p15:clr>
             <a:srgbClr val="A4A3A4"/>
@@ -166,7 +166,7 @@
       </p15:sldGuideLst>
     </p:ext>
     <p:ext uri="{2D200454-40CA-4A62-9FC3-DE9A4176ACB9}">
-      <p15:notesGuideLst xmlns:p15="http://schemas.microsoft.com/office/powerpoint/2012/main" xmlns="">
+      <p15:notesGuideLst xmlns:p15="http://schemas.microsoft.com/office/powerpoint/2012/main">
         <p15:guide id="1" orient="horz" pos="2880">
           <p15:clr>
             <a:srgbClr val="A4A3A4"/>
@@ -4119,15 +4119,13 @@
             </a:r>
             <a:r>
               <a:rPr lang="nb-NO" baseline="0" dirty="0" smtClean="0"/>
-              <a:t> the simplest thing that could possibly work – ikke implementere noe som ikke er spesifisert</a:t>
-            </a:r>
-          </a:p>
-          <a:p>
+              <a:t> the simplest thing that could possibly work – ikke implementere noe som ikke er </a:t>
+            </a:r>
             <a:r>
               <a:rPr lang="nb-NO" baseline="0" dirty="0" smtClean="0"/>
-              <a:t>DEMO: lag subtract i Calculator</a:t>
-            </a:r>
-            <a:endParaRPr lang="en-US" dirty="0"/>
+              <a:t>spesifisert</a:t>
+            </a:r>
+            <a:endParaRPr lang="nb-NO" baseline="0" dirty="0" smtClean="0"/>
           </a:p>
         </p:txBody>
       </p:sp>
@@ -4343,9 +4341,33 @@
         <p:spPr/>
         <p:txBody>
           <a:bodyPr>
-            <a:normAutofit/>
+            <a:normAutofit lnSpcReduction="10000"/>
           </a:bodyPr>
           <a:lstStyle/>
+          <a:p>
+            <a:pPr marL="0" marR="0" indent="0" algn="l" defTabSz="457200" rtl="0" eaLnBrk="1" fontAlgn="auto" latinLnBrk="0" hangingPunct="1">
+              <a:lnSpc>
+                <a:spcPct val="100000"/>
+              </a:lnSpc>
+              <a:spcBef>
+                <a:spcPts val="600"/>
+              </a:spcBef>
+              <a:spcAft>
+                <a:spcPts val="0"/>
+              </a:spcAft>
+              <a:buClrTx/>
+              <a:buSzTx/>
+              <a:buFontTx/>
+              <a:buNone/>
+              <a:tabLst/>
+              <a:defRPr/>
+            </a:pPr>
+            <a:r>
+              <a:rPr lang="nb-NO" sz="1600" baseline="0" dirty="0" smtClean="0"/>
+              <a:t>DEMO: lag subtract i Calculator</a:t>
+            </a:r>
+            <a:endParaRPr lang="nb-NO" sz="1600" dirty="0" smtClean="0"/>
+          </a:p>
           <a:p>
             <a:pPr>
               <a:spcBef>
@@ -4354,7 +4376,11 @@
             </a:pPr>
             <a:r>
               <a:rPr lang="nb-NO" sz="1600" dirty="0" smtClean="0"/>
-              <a:t>Deklarere en test</a:t>
+              <a:t>Deklarere </a:t>
+            </a:r>
+            <a:r>
+              <a:rPr lang="nb-NO" sz="1600" dirty="0" smtClean="0"/>
+              <a:t>en test</a:t>
             </a:r>
             <a:br>
               <a:rPr lang="nb-NO" sz="1600" dirty="0" smtClean="0"/>
@@ -21863,7 +21889,11 @@
             </a:pPr>
             <a:r>
               <a:rPr lang="nb-NO" sz="1600" dirty="0" smtClean="0"/>
-              <a:t> lettere å utvikle</a:t>
+              <a:t> lettere å </a:t>
+            </a:r>
+            <a:r>
+              <a:rPr lang="nb-NO" sz="1600" dirty="0" smtClean="0"/>
+              <a:t>stole på</a:t>
             </a:r>
             <a:endParaRPr lang="en-US" sz="1600" dirty="0" err="1" smtClean="0"/>
           </a:p>

</xml_diff>